<commit_message>
Prueba de caja blanca
Se agrega la respectiva prueba de caja blanca realizada en el proyecto, adicionalmente se agrega la documentación
</commit_message>
<xml_diff>
--- a/Cuarto_Trimestre/Pruebas/Prueba De Caja Blanca  Camino Basico.pptx
+++ b/Cuarto_Trimestre/Pruebas/Prueba De Caja Blanca  Camino Basico.pptx
@@ -5,8 +5,15 @@
     <p:sldMasterId id="2147483648" r:id="rId1"/>
   </p:sldMasterIdLst>
   <p:sldIdLst>
-    <p:sldId id="256" r:id="rId2"/>
-    <p:sldId id="257" r:id="rId3"/>
+    <p:sldId id="261" r:id="rId2"/>
+    <p:sldId id="258" r:id="rId3"/>
+    <p:sldId id="260" r:id="rId4"/>
+    <p:sldId id="262" r:id="rId5"/>
+    <p:sldId id="263" r:id="rId6"/>
+    <p:sldId id="264" r:id="rId7"/>
+    <p:sldId id="265" r:id="rId8"/>
+    <p:sldId id="266" r:id="rId9"/>
+    <p:sldId id="267" r:id="rId10"/>
   </p:sldIdLst>
   <p:sldSz cx="12192000" cy="6858000"/>
   <p:notesSz cx="6858000" cy="9144000"/>
@@ -170,7 +177,7 @@
           <a:noFill/>
           <a:extLst>
             <a:ext uri="{909E8E84-426E-40dd-AFC4-6F175D3DCCD1}">
-              <a14:hiddenFill xmlns:a14="http://schemas.microsoft.com/office/drawing/2010/main" xmlns="">
+              <a14:hiddenFill xmlns="" xmlns:a14="http://schemas.microsoft.com/office/drawing/2010/main">
                 <a:solidFill>
                   <a:srgbClr val="FFFFFF"/>
                 </a:solidFill>
@@ -229,7 +236,7 @@
             </a:ln>
             <a:extLst>
               <a:ext uri="{91240B29-F687-4f45-9708-019B960494DF}">
-                <a14:hiddenLine xmlns:a14="http://schemas.microsoft.com/office/drawing/2010/main" xmlns="" w="9525">
+                <a14:hiddenLine xmlns="" xmlns:a14="http://schemas.microsoft.com/office/drawing/2010/main" w="9525">
                   <a:solidFill>
                     <a:srgbClr val="000000"/>
                   </a:solidFill>
@@ -319,7 +326,7 @@
             </a:ln>
             <a:extLst>
               <a:ext uri="{91240B29-F687-4f45-9708-019B960494DF}">
-                <a14:hiddenLine xmlns:a14="http://schemas.microsoft.com/office/drawing/2010/main" xmlns="" w="9525">
+                <a14:hiddenLine xmlns="" xmlns:a14="http://schemas.microsoft.com/office/drawing/2010/main" w="9525">
                   <a:solidFill>
                     <a:srgbClr val="000000"/>
                   </a:solidFill>
@@ -409,7 +416,7 @@
             </a:ln>
             <a:extLst>
               <a:ext uri="{91240B29-F687-4f45-9708-019B960494DF}">
-                <a14:hiddenLine xmlns:a14="http://schemas.microsoft.com/office/drawing/2010/main" xmlns="" w="9525">
+                <a14:hiddenLine xmlns="" xmlns:a14="http://schemas.microsoft.com/office/drawing/2010/main" w="9525">
                   <a:solidFill>
                     <a:srgbClr val="000000"/>
                   </a:solidFill>
@@ -443,7 +450,7 @@
             </a:ln>
             <a:extLst>
               <a:ext uri="{91240B29-F687-4f45-9708-019B960494DF}">
-                <a14:hiddenLine xmlns:a14="http://schemas.microsoft.com/office/drawing/2010/main" xmlns="" w="9525">
+                <a14:hiddenLine xmlns="" xmlns:a14="http://schemas.microsoft.com/office/drawing/2010/main" w="9525">
                   <a:solidFill>
                     <a:srgbClr val="000000"/>
                   </a:solidFill>
@@ -533,7 +540,7 @@
             </a:ln>
             <a:extLst>
               <a:ext uri="{91240B29-F687-4f45-9708-019B960494DF}">
-                <a14:hiddenLine xmlns:a14="http://schemas.microsoft.com/office/drawing/2010/main" xmlns="" w="9525">
+                <a14:hiddenLine xmlns="" xmlns:a14="http://schemas.microsoft.com/office/drawing/2010/main" w="9525">
                   <a:solidFill>
                     <a:srgbClr val="000000"/>
                   </a:solidFill>
@@ -595,7 +602,7 @@
             </a:ln>
             <a:extLst>
               <a:ext uri="{91240B29-F687-4f45-9708-019B960494DF}">
-                <a14:hiddenLine xmlns:a14="http://schemas.microsoft.com/office/drawing/2010/main" xmlns="" w="9525">
+                <a14:hiddenLine xmlns="" xmlns:a14="http://schemas.microsoft.com/office/drawing/2010/main" w="9525">
                   <a:solidFill>
                     <a:srgbClr val="000000"/>
                   </a:solidFill>
@@ -657,7 +664,7 @@
             </a:ln>
             <a:extLst>
               <a:ext uri="{91240B29-F687-4f45-9708-019B960494DF}">
-                <a14:hiddenLine xmlns:a14="http://schemas.microsoft.com/office/drawing/2010/main" xmlns="" w="9525">
+                <a14:hiddenLine xmlns="" xmlns:a14="http://schemas.microsoft.com/office/drawing/2010/main" w="9525">
                   <a:solidFill>
                     <a:srgbClr val="000000"/>
                   </a:solidFill>
@@ -747,7 +754,7 @@
             </a:ln>
             <a:extLst>
               <a:ext uri="{91240B29-F687-4f45-9708-019B960494DF}">
-                <a14:hiddenLine xmlns:a14="http://schemas.microsoft.com/office/drawing/2010/main" xmlns="" w="9525">
+                <a14:hiddenLine xmlns="" xmlns:a14="http://schemas.microsoft.com/office/drawing/2010/main" w="9525">
                   <a:solidFill>
                     <a:srgbClr val="000000"/>
                   </a:solidFill>
@@ -809,7 +816,7 @@
             </a:ln>
             <a:extLst>
               <a:ext uri="{91240B29-F687-4f45-9708-019B960494DF}">
-                <a14:hiddenLine xmlns:a14="http://schemas.microsoft.com/office/drawing/2010/main" xmlns="" w="9525">
+                <a14:hiddenLine xmlns="" xmlns:a14="http://schemas.microsoft.com/office/drawing/2010/main" w="9525">
                   <a:solidFill>
                     <a:srgbClr val="000000"/>
                   </a:solidFill>
@@ -871,7 +878,7 @@
             </a:ln>
             <a:extLst>
               <a:ext uri="{91240B29-F687-4f45-9708-019B960494DF}">
-                <a14:hiddenLine xmlns:a14="http://schemas.microsoft.com/office/drawing/2010/main" xmlns="" w="9525">
+                <a14:hiddenLine xmlns="" xmlns:a14="http://schemas.microsoft.com/office/drawing/2010/main" w="9525">
                   <a:solidFill>
                     <a:srgbClr val="000000"/>
                   </a:solidFill>
@@ -961,7 +968,7 @@
             </a:ln>
             <a:extLst>
               <a:ext uri="{91240B29-F687-4f45-9708-019B960494DF}">
-                <a14:hiddenLine xmlns:a14="http://schemas.microsoft.com/office/drawing/2010/main" xmlns="" w="9525">
+                <a14:hiddenLine xmlns="" xmlns:a14="http://schemas.microsoft.com/office/drawing/2010/main" w="9525">
                   <a:solidFill>
                     <a:srgbClr val="000000"/>
                   </a:solidFill>
@@ -1051,7 +1058,7 @@
             </a:ln>
             <a:extLst>
               <a:ext uri="{91240B29-F687-4f45-9708-019B960494DF}">
-                <a14:hiddenLine xmlns:a14="http://schemas.microsoft.com/office/drawing/2010/main" xmlns="" w="9525">
+                <a14:hiddenLine xmlns="" xmlns:a14="http://schemas.microsoft.com/office/drawing/2010/main" w="9525">
                   <a:solidFill>
                     <a:srgbClr val="000000"/>
                   </a:solidFill>
@@ -1113,7 +1120,7 @@
             </a:ln>
             <a:extLst>
               <a:ext uri="{91240B29-F687-4f45-9708-019B960494DF}">
-                <a14:hiddenLine xmlns:a14="http://schemas.microsoft.com/office/drawing/2010/main" xmlns="" w="9525">
+                <a14:hiddenLine xmlns="" xmlns:a14="http://schemas.microsoft.com/office/drawing/2010/main" w="9525">
                   <a:solidFill>
                     <a:srgbClr val="000000"/>
                   </a:solidFill>
@@ -1223,7 +1230,7 @@
             </a:ln>
             <a:extLst>
               <a:ext uri="{91240B29-F687-4f45-9708-019B960494DF}">
-                <a14:hiddenLine xmlns:a14="http://schemas.microsoft.com/office/drawing/2010/main" xmlns="" w="9525">
+                <a14:hiddenLine xmlns="" xmlns:a14="http://schemas.microsoft.com/office/drawing/2010/main" w="9525">
                   <a:solidFill>
                     <a:srgbClr val="000000"/>
                   </a:solidFill>
@@ -1285,7 +1292,7 @@
             </a:ln>
             <a:extLst>
               <a:ext uri="{91240B29-F687-4f45-9708-019B960494DF}">
-                <a14:hiddenLine xmlns:a14="http://schemas.microsoft.com/office/drawing/2010/main" xmlns="" w="9525">
+                <a14:hiddenLine xmlns="" xmlns:a14="http://schemas.microsoft.com/office/drawing/2010/main" w="9525">
                   <a:solidFill>
                     <a:srgbClr val="000000"/>
                   </a:solidFill>
@@ -1375,7 +1382,7 @@
             </a:ln>
             <a:extLst>
               <a:ext uri="{91240B29-F687-4f45-9708-019B960494DF}">
-                <a14:hiddenLine xmlns:a14="http://schemas.microsoft.com/office/drawing/2010/main" xmlns="" w="9525">
+                <a14:hiddenLine xmlns="" xmlns:a14="http://schemas.microsoft.com/office/drawing/2010/main" w="9525">
                   <a:solidFill>
                     <a:srgbClr val="000000"/>
                   </a:solidFill>
@@ -1465,7 +1472,7 @@
             </a:ln>
             <a:extLst>
               <a:ext uri="{91240B29-F687-4f45-9708-019B960494DF}">
-                <a14:hiddenLine xmlns:a14="http://schemas.microsoft.com/office/drawing/2010/main" xmlns="" w="9525">
+                <a14:hiddenLine xmlns="" xmlns:a14="http://schemas.microsoft.com/office/drawing/2010/main" w="9525">
                   <a:solidFill>
                     <a:srgbClr val="000000"/>
                   </a:solidFill>
@@ -1527,7 +1534,7 @@
             </a:ln>
             <a:extLst>
               <a:ext uri="{91240B29-F687-4f45-9708-019B960494DF}">
-                <a14:hiddenLine xmlns:a14="http://schemas.microsoft.com/office/drawing/2010/main" xmlns="" w="9525">
+                <a14:hiddenLine xmlns="" xmlns:a14="http://schemas.microsoft.com/office/drawing/2010/main" w="9525">
                   <a:solidFill>
                     <a:srgbClr val="000000"/>
                   </a:solidFill>
@@ -1617,7 +1624,7 @@
             </a:ln>
             <a:extLst>
               <a:ext uri="{91240B29-F687-4f45-9708-019B960494DF}">
-                <a14:hiddenLine xmlns:a14="http://schemas.microsoft.com/office/drawing/2010/main" xmlns="" w="9525">
+                <a14:hiddenLine xmlns="" xmlns:a14="http://schemas.microsoft.com/office/drawing/2010/main" w="9525">
                   <a:solidFill>
                     <a:srgbClr val="000000"/>
                   </a:solidFill>
@@ -1707,7 +1714,7 @@
             </a:ln>
             <a:extLst>
               <a:ext uri="{91240B29-F687-4f45-9708-019B960494DF}">
-                <a14:hiddenLine xmlns:a14="http://schemas.microsoft.com/office/drawing/2010/main" xmlns="" w="9525">
+                <a14:hiddenLine xmlns="" xmlns:a14="http://schemas.microsoft.com/office/drawing/2010/main" w="9525">
                   <a:solidFill>
                     <a:srgbClr val="000000"/>
                   </a:solidFill>
@@ -1763,7 +1770,7 @@
             </a:ln>
             <a:extLst>
               <a:ext uri="{91240B29-F687-4f45-9708-019B960494DF}">
-                <a14:hiddenLine xmlns:a14="http://schemas.microsoft.com/office/drawing/2010/main" xmlns="" w="9525">
+                <a14:hiddenLine xmlns="" xmlns:a14="http://schemas.microsoft.com/office/drawing/2010/main" w="9525">
                   <a:solidFill>
                     <a:srgbClr val="000000"/>
                   </a:solidFill>
@@ -1853,7 +1860,7 @@
             </a:ln>
             <a:extLst>
               <a:ext uri="{91240B29-F687-4f45-9708-019B960494DF}">
-                <a14:hiddenLine xmlns:a14="http://schemas.microsoft.com/office/drawing/2010/main" xmlns="" w="9525">
+                <a14:hiddenLine xmlns="" xmlns:a14="http://schemas.microsoft.com/office/drawing/2010/main" w="9525">
                   <a:solidFill>
                     <a:srgbClr val="000000"/>
                   </a:solidFill>
@@ -1909,7 +1916,7 @@
             </a:ln>
             <a:extLst>
               <a:ext uri="{91240B29-F687-4f45-9708-019B960494DF}">
-                <a14:hiddenLine xmlns:a14="http://schemas.microsoft.com/office/drawing/2010/main" xmlns="" w="9525">
+                <a14:hiddenLine xmlns="" xmlns:a14="http://schemas.microsoft.com/office/drawing/2010/main" w="9525">
                   <a:solidFill>
                     <a:srgbClr val="000000"/>
                   </a:solidFill>
@@ -1999,7 +2006,7 @@
             </a:ln>
             <a:extLst>
               <a:ext uri="{91240B29-F687-4f45-9708-019B960494DF}">
-                <a14:hiddenLine xmlns:a14="http://schemas.microsoft.com/office/drawing/2010/main" xmlns="" w="9525">
+                <a14:hiddenLine xmlns="" xmlns:a14="http://schemas.microsoft.com/office/drawing/2010/main" w="9525">
                   <a:solidFill>
                     <a:srgbClr val="000000"/>
                   </a:solidFill>
@@ -2067,7 +2074,7 @@
             </a:ln>
             <a:extLst>
               <a:ext uri="{91240B29-F687-4f45-9708-019B960494DF}">
-                <a14:hiddenLine xmlns:a14="http://schemas.microsoft.com/office/drawing/2010/main" xmlns="" w="9525">
+                <a14:hiddenLine xmlns="" xmlns:a14="http://schemas.microsoft.com/office/drawing/2010/main" w="9525">
                   <a:solidFill>
                     <a:srgbClr val="000000"/>
                   </a:solidFill>
@@ -2157,7 +2164,7 @@
             </a:ln>
             <a:extLst>
               <a:ext uri="{91240B29-F687-4f45-9708-019B960494DF}">
-                <a14:hiddenLine xmlns:a14="http://schemas.microsoft.com/office/drawing/2010/main" xmlns="" w="9525">
+                <a14:hiddenLine xmlns="" xmlns:a14="http://schemas.microsoft.com/office/drawing/2010/main" w="9525">
                   <a:solidFill>
                     <a:srgbClr val="000000"/>
                   </a:solidFill>
@@ -2225,7 +2232,7 @@
             </a:ln>
             <a:extLst>
               <a:ext uri="{91240B29-F687-4f45-9708-019B960494DF}">
-                <a14:hiddenLine xmlns:a14="http://schemas.microsoft.com/office/drawing/2010/main" xmlns="" w="9525">
+                <a14:hiddenLine xmlns="" xmlns:a14="http://schemas.microsoft.com/office/drawing/2010/main" w="9525">
                   <a:solidFill>
                     <a:srgbClr val="000000"/>
                   </a:solidFill>
@@ -2315,7 +2322,7 @@
             </a:ln>
             <a:extLst>
               <a:ext uri="{91240B29-F687-4f45-9708-019B960494DF}">
-                <a14:hiddenLine xmlns:a14="http://schemas.microsoft.com/office/drawing/2010/main" xmlns="" w="9525">
+                <a14:hiddenLine xmlns="" xmlns:a14="http://schemas.microsoft.com/office/drawing/2010/main" w="9525">
                   <a:solidFill>
                     <a:srgbClr val="000000"/>
                   </a:solidFill>
@@ -2349,7 +2356,7 @@
             </a:ln>
             <a:extLst>
               <a:ext uri="{91240B29-F687-4f45-9708-019B960494DF}">
-                <a14:hiddenLine xmlns:a14="http://schemas.microsoft.com/office/drawing/2010/main" xmlns="" w="9525">
+                <a14:hiddenLine xmlns="" xmlns:a14="http://schemas.microsoft.com/office/drawing/2010/main" w="9525">
                   <a:solidFill>
                     <a:srgbClr val="000000"/>
                   </a:solidFill>
@@ -2439,7 +2446,7 @@
             </a:ln>
             <a:extLst>
               <a:ext uri="{91240B29-F687-4f45-9708-019B960494DF}">
-                <a14:hiddenLine xmlns:a14="http://schemas.microsoft.com/office/drawing/2010/main" xmlns="" w="9525">
+                <a14:hiddenLine xmlns="" xmlns:a14="http://schemas.microsoft.com/office/drawing/2010/main" w="9525">
                   <a:solidFill>
                     <a:srgbClr val="000000"/>
                   </a:solidFill>
@@ -2501,7 +2508,7 @@
             </a:ln>
             <a:extLst>
               <a:ext uri="{91240B29-F687-4f45-9708-019B960494DF}">
-                <a14:hiddenLine xmlns:a14="http://schemas.microsoft.com/office/drawing/2010/main" xmlns="" w="9525">
+                <a14:hiddenLine xmlns="" xmlns:a14="http://schemas.microsoft.com/office/drawing/2010/main" w="9525">
                   <a:solidFill>
                     <a:srgbClr val="000000"/>
                   </a:solidFill>
@@ -2563,7 +2570,7 @@
             </a:ln>
             <a:extLst>
               <a:ext uri="{91240B29-F687-4f45-9708-019B960494DF}">
-                <a14:hiddenLine xmlns:a14="http://schemas.microsoft.com/office/drawing/2010/main" xmlns="" w="9525">
+                <a14:hiddenLine xmlns="" xmlns:a14="http://schemas.microsoft.com/office/drawing/2010/main" w="9525">
                   <a:solidFill>
                     <a:srgbClr val="000000"/>
                   </a:solidFill>
@@ -2653,7 +2660,7 @@
             </a:ln>
             <a:extLst>
               <a:ext uri="{91240B29-F687-4f45-9708-019B960494DF}">
-                <a14:hiddenLine xmlns:a14="http://schemas.microsoft.com/office/drawing/2010/main" xmlns="" w="9525">
+                <a14:hiddenLine xmlns="" xmlns:a14="http://schemas.microsoft.com/office/drawing/2010/main" w="9525">
                   <a:solidFill>
                     <a:srgbClr val="000000"/>
                   </a:solidFill>
@@ -2721,7 +2728,7 @@
             </a:ln>
             <a:extLst>
               <a:ext uri="{91240B29-F687-4f45-9708-019B960494DF}">
-                <a14:hiddenLine xmlns:a14="http://schemas.microsoft.com/office/drawing/2010/main" xmlns="" w="9525">
+                <a14:hiddenLine xmlns="" xmlns:a14="http://schemas.microsoft.com/office/drawing/2010/main" w="9525">
                   <a:solidFill>
                     <a:srgbClr val="000000"/>
                   </a:solidFill>
@@ -2783,7 +2790,7 @@
             </a:ln>
             <a:extLst>
               <a:ext uri="{91240B29-F687-4f45-9708-019B960494DF}">
-                <a14:hiddenLine xmlns:a14="http://schemas.microsoft.com/office/drawing/2010/main" xmlns="" w="9525">
+                <a14:hiddenLine xmlns="" xmlns:a14="http://schemas.microsoft.com/office/drawing/2010/main" w="9525">
                   <a:solidFill>
                     <a:srgbClr val="000000"/>
                   </a:solidFill>
@@ -2873,7 +2880,7 @@
             </a:ln>
             <a:extLst>
               <a:ext uri="{91240B29-F687-4f45-9708-019B960494DF}">
-                <a14:hiddenLine xmlns:a14="http://schemas.microsoft.com/office/drawing/2010/main" xmlns="" w="9525">
+                <a14:hiddenLine xmlns="" xmlns:a14="http://schemas.microsoft.com/office/drawing/2010/main" w="9525">
                   <a:solidFill>
                     <a:srgbClr val="000000"/>
                   </a:solidFill>
@@ -2935,7 +2942,7 @@
             </a:ln>
             <a:extLst>
               <a:ext uri="{91240B29-F687-4f45-9708-019B960494DF}">
-                <a14:hiddenLine xmlns:a14="http://schemas.microsoft.com/office/drawing/2010/main" xmlns="" w="9525">
+                <a14:hiddenLine xmlns="" xmlns:a14="http://schemas.microsoft.com/office/drawing/2010/main" w="9525">
                   <a:solidFill>
                     <a:srgbClr val="000000"/>
                   </a:solidFill>
@@ -3025,7 +3032,7 @@
             </a:ln>
             <a:extLst>
               <a:ext uri="{91240B29-F687-4f45-9708-019B960494DF}">
-                <a14:hiddenLine xmlns:a14="http://schemas.microsoft.com/office/drawing/2010/main" xmlns="" w="9525">
+                <a14:hiddenLine xmlns="" xmlns:a14="http://schemas.microsoft.com/office/drawing/2010/main" w="9525">
                   <a:solidFill>
                     <a:srgbClr val="000000"/>
                   </a:solidFill>
@@ -3087,7 +3094,7 @@
             </a:ln>
             <a:extLst>
               <a:ext uri="{91240B29-F687-4f45-9708-019B960494DF}">
-                <a14:hiddenLine xmlns:a14="http://schemas.microsoft.com/office/drawing/2010/main" xmlns="" w="9525">
+                <a14:hiddenLine xmlns="" xmlns:a14="http://schemas.microsoft.com/office/drawing/2010/main" w="9525">
                   <a:solidFill>
                     <a:srgbClr val="000000"/>
                   </a:solidFill>
@@ -3177,7 +3184,7 @@
             </a:ln>
             <a:extLst>
               <a:ext uri="{91240B29-F687-4f45-9708-019B960494DF}">
-                <a14:hiddenLine xmlns:a14="http://schemas.microsoft.com/office/drawing/2010/main" xmlns="" w="9525">
+                <a14:hiddenLine xmlns="" xmlns:a14="http://schemas.microsoft.com/office/drawing/2010/main" w="9525">
                   <a:solidFill>
                     <a:srgbClr val="000000"/>
                   </a:solidFill>
@@ -3211,7 +3218,7 @@
             </a:ln>
             <a:extLst>
               <a:ext uri="{91240B29-F687-4f45-9708-019B960494DF}">
-                <a14:hiddenLine xmlns:a14="http://schemas.microsoft.com/office/drawing/2010/main" xmlns="" w="9525">
+                <a14:hiddenLine xmlns="" xmlns:a14="http://schemas.microsoft.com/office/drawing/2010/main" w="9525">
                   <a:solidFill>
                     <a:srgbClr val="000000"/>
                   </a:solidFill>
@@ -3276,7 +3283,7 @@
             </a:ln>
             <a:extLst>
               <a:ext uri="{91240B29-F687-4f45-9708-019B960494DF}">
-                <a14:hiddenLine xmlns:a14="http://schemas.microsoft.com/office/drawing/2010/main" xmlns="" w="9525">
+                <a14:hiddenLine xmlns="" xmlns:a14="http://schemas.microsoft.com/office/drawing/2010/main" w="9525">
                   <a:solidFill>
                     <a:srgbClr val="000000"/>
                   </a:solidFill>
@@ -3366,7 +3373,7 @@
             </a:ln>
             <a:extLst>
               <a:ext uri="{91240B29-F687-4f45-9708-019B960494DF}">
-                <a14:hiddenLine xmlns:a14="http://schemas.microsoft.com/office/drawing/2010/main" xmlns="" w="9525">
+                <a14:hiddenLine xmlns="" xmlns:a14="http://schemas.microsoft.com/office/drawing/2010/main" w="9525">
                   <a:solidFill>
                     <a:srgbClr val="000000"/>
                   </a:solidFill>
@@ -3428,7 +3435,7 @@
             </a:ln>
             <a:extLst>
               <a:ext uri="{91240B29-F687-4f45-9708-019B960494DF}">
-                <a14:hiddenLine xmlns:a14="http://schemas.microsoft.com/office/drawing/2010/main" xmlns="" w="9525">
+                <a14:hiddenLine xmlns="" xmlns:a14="http://schemas.microsoft.com/office/drawing/2010/main" w="9525">
                   <a:solidFill>
                     <a:srgbClr val="000000"/>
                   </a:solidFill>
@@ -3518,7 +3525,7 @@
             </a:ln>
             <a:extLst>
               <a:ext uri="{91240B29-F687-4f45-9708-019B960494DF}">
-                <a14:hiddenLine xmlns:a14="http://schemas.microsoft.com/office/drawing/2010/main" xmlns="" w="9525">
+                <a14:hiddenLine xmlns="" xmlns:a14="http://schemas.microsoft.com/office/drawing/2010/main" w="9525">
                   <a:solidFill>
                     <a:srgbClr val="000000"/>
                   </a:solidFill>
@@ -3608,7 +3615,7 @@
             </a:ln>
             <a:extLst>
               <a:ext uri="{91240B29-F687-4f45-9708-019B960494DF}">
-                <a14:hiddenLine xmlns:a14="http://schemas.microsoft.com/office/drawing/2010/main" xmlns="" w="9525">
+                <a14:hiddenLine xmlns="" xmlns:a14="http://schemas.microsoft.com/office/drawing/2010/main" w="9525">
                   <a:solidFill>
                     <a:srgbClr val="000000"/>
                   </a:solidFill>
@@ -3673,7 +3680,7 @@
             </a:ln>
             <a:extLst>
               <a:ext uri="{91240B29-F687-4f45-9708-019B960494DF}">
-                <a14:hiddenLine xmlns:a14="http://schemas.microsoft.com/office/drawing/2010/main" xmlns="" w="9525">
+                <a14:hiddenLine xmlns="" xmlns:a14="http://schemas.microsoft.com/office/drawing/2010/main" w="9525">
                   <a:solidFill>
                     <a:srgbClr val="000000"/>
                   </a:solidFill>
@@ -3735,7 +3742,7 @@
             </a:ln>
             <a:extLst>
               <a:ext uri="{91240B29-F687-4f45-9708-019B960494DF}">
-                <a14:hiddenLine xmlns:a14="http://schemas.microsoft.com/office/drawing/2010/main" xmlns="" w="9525">
+                <a14:hiddenLine xmlns="" xmlns:a14="http://schemas.microsoft.com/office/drawing/2010/main" w="9525">
                   <a:solidFill>
                     <a:srgbClr val="000000"/>
                   </a:solidFill>
@@ -3825,7 +3832,7 @@
             </a:ln>
             <a:extLst>
               <a:ext uri="{91240B29-F687-4f45-9708-019B960494DF}">
-                <a14:hiddenLine xmlns:a14="http://schemas.microsoft.com/office/drawing/2010/main" xmlns="" w="9525">
+                <a14:hiddenLine xmlns="" xmlns:a14="http://schemas.microsoft.com/office/drawing/2010/main" w="9525">
                   <a:solidFill>
                     <a:srgbClr val="000000"/>
                   </a:solidFill>
@@ -3915,7 +3922,7 @@
             </a:ln>
             <a:extLst>
               <a:ext uri="{91240B29-F687-4f45-9708-019B960494DF}">
-                <a14:hiddenLine xmlns:a14="http://schemas.microsoft.com/office/drawing/2010/main" xmlns="" w="9525">
+                <a14:hiddenLine xmlns="" xmlns:a14="http://schemas.microsoft.com/office/drawing/2010/main" w="9525">
                   <a:solidFill>
                     <a:srgbClr val="000000"/>
                   </a:solidFill>
@@ -3977,7 +3984,7 @@
             </a:ln>
             <a:extLst>
               <a:ext uri="{91240B29-F687-4f45-9708-019B960494DF}">
-                <a14:hiddenLine xmlns:a14="http://schemas.microsoft.com/office/drawing/2010/main" xmlns="" w="9525">
+                <a14:hiddenLine xmlns="" xmlns:a14="http://schemas.microsoft.com/office/drawing/2010/main" w="9525">
                   <a:solidFill>
                     <a:srgbClr val="000000"/>
                   </a:solidFill>
@@ -4097,7 +4104,7 @@
             </a:ln>
             <a:extLst>
               <a:ext uri="{91240B29-F687-4f45-9708-019B960494DF}">
-                <a14:hiddenLine xmlns:a14="http://schemas.microsoft.com/office/drawing/2010/main" xmlns="" w="9525">
+                <a14:hiddenLine xmlns="" xmlns:a14="http://schemas.microsoft.com/office/drawing/2010/main" w="9525">
                   <a:solidFill>
                     <a:srgbClr val="000000"/>
                   </a:solidFill>
@@ -4165,7 +4172,7 @@
             </a:ln>
             <a:extLst>
               <a:ext uri="{91240B29-F687-4f45-9708-019B960494DF}">
-                <a14:hiddenLine xmlns:a14="http://schemas.microsoft.com/office/drawing/2010/main" xmlns="" w="9525">
+                <a14:hiddenLine xmlns="" xmlns:a14="http://schemas.microsoft.com/office/drawing/2010/main" w="9525">
                   <a:solidFill>
                     <a:srgbClr val="000000"/>
                   </a:solidFill>
@@ -4255,7 +4262,7 @@
             </a:ln>
             <a:extLst>
               <a:ext uri="{91240B29-F687-4f45-9708-019B960494DF}">
-                <a14:hiddenLine xmlns:a14="http://schemas.microsoft.com/office/drawing/2010/main" xmlns="" w="9525">
+                <a14:hiddenLine xmlns="" xmlns:a14="http://schemas.microsoft.com/office/drawing/2010/main" w="9525">
                   <a:solidFill>
                     <a:srgbClr val="000000"/>
                   </a:solidFill>
@@ -4395,7 +4402,7 @@
           <a:p>
             <a:fld id="{48A87A34-81AB-432B-8DAE-1953F412C126}" type="datetimeFigureOut">
               <a:rPr lang="en-US" dirty="0"/>
-              <a:t>2/14/2020</a:t>
+              <a:t>9/10/2020</a:t>
             </a:fld>
             <a:endParaRPr lang="en-US" dirty="0"/>
           </a:p>
@@ -4657,7 +4664,7 @@
           <a:p>
             <a:fld id="{48A87A34-81AB-432B-8DAE-1953F412C126}" type="datetimeFigureOut">
               <a:rPr lang="en-US" dirty="0"/>
-              <a:t>2/14/2020</a:t>
+              <a:t>9/10/2020</a:t>
             </a:fld>
             <a:endParaRPr lang="en-US" dirty="0"/>
           </a:p>
@@ -4848,7 +4855,7 @@
           <a:p>
             <a:fld id="{48A87A34-81AB-432B-8DAE-1953F412C126}" type="datetimeFigureOut">
               <a:rPr lang="en-US" dirty="0"/>
-              <a:t>2/14/2020</a:t>
+              <a:t>9/10/2020</a:t>
             </a:fld>
             <a:endParaRPr lang="en-US" dirty="0"/>
           </a:p>
@@ -5106,7 +5113,7 @@
           <a:p>
             <a:fld id="{48A87A34-81AB-432B-8DAE-1953F412C126}" type="datetimeFigureOut">
               <a:rPr lang="en-US" dirty="0"/>
-              <a:t>2/14/2020</a:t>
+              <a:t>9/10/2020</a:t>
             </a:fld>
             <a:endParaRPr lang="en-US" dirty="0"/>
           </a:p>
@@ -5535,7 +5542,7 @@
           <a:p>
             <a:fld id="{48A87A34-81AB-432B-8DAE-1953F412C126}" type="datetimeFigureOut">
               <a:rPr lang="en-US" dirty="0"/>
-              <a:t>2/14/2020</a:t>
+              <a:t>9/10/2020</a:t>
             </a:fld>
             <a:endParaRPr lang="en-US" dirty="0"/>
           </a:p>
@@ -6076,7 +6083,7 @@
           <a:p>
             <a:fld id="{48A87A34-81AB-432B-8DAE-1953F412C126}" type="datetimeFigureOut">
               <a:rPr lang="en-US" dirty="0"/>
-              <a:t>2/14/2020</a:t>
+              <a:t>9/10/2020</a:t>
             </a:fld>
             <a:endParaRPr lang="en-US" dirty="0"/>
           </a:p>
@@ -6791,7 +6798,7 @@
           <a:p>
             <a:fld id="{48A87A34-81AB-432B-8DAE-1953F412C126}" type="datetimeFigureOut">
               <a:rPr lang="en-US" dirty="0"/>
-              <a:t>2/14/2020</a:t>
+              <a:t>9/10/2020</a:t>
             </a:fld>
             <a:endParaRPr lang="en-US" dirty="0"/>
           </a:p>
@@ -6956,7 +6963,7 @@
           <a:p>
             <a:fld id="{48A87A34-81AB-432B-8DAE-1953F412C126}" type="datetimeFigureOut">
               <a:rPr lang="en-US" dirty="0"/>
-              <a:t>2/14/2020</a:t>
+              <a:t>9/10/2020</a:t>
             </a:fld>
             <a:endParaRPr lang="en-US" dirty="0"/>
           </a:p>
@@ -7131,7 +7138,7 @@
           <a:p>
             <a:fld id="{48A87A34-81AB-432B-8DAE-1953F412C126}" type="datetimeFigureOut">
               <a:rPr lang="en-US" dirty="0"/>
-              <a:t>2/14/2020</a:t>
+              <a:t>9/10/2020</a:t>
             </a:fld>
             <a:endParaRPr lang="en-US" dirty="0"/>
           </a:p>
@@ -7296,7 +7303,7 @@
           <a:p>
             <a:fld id="{48A87A34-81AB-432B-8DAE-1953F412C126}" type="datetimeFigureOut">
               <a:rPr lang="en-US" dirty="0"/>
-              <a:t>2/14/2020</a:t>
+              <a:t>9/10/2020</a:t>
             </a:fld>
             <a:endParaRPr lang="en-US" dirty="0"/>
           </a:p>
@@ -7541,7 +7548,7 @@
           <a:p>
             <a:fld id="{48A87A34-81AB-432B-8DAE-1953F412C126}" type="datetimeFigureOut">
               <a:rPr lang="en-US" dirty="0"/>
-              <a:t>2/14/2020</a:t>
+              <a:t>9/10/2020</a:t>
             </a:fld>
             <a:endParaRPr lang="en-US" dirty="0"/>
           </a:p>
@@ -7768,7 +7775,7 @@
           <a:p>
             <a:fld id="{48A87A34-81AB-432B-8DAE-1953F412C126}" type="datetimeFigureOut">
               <a:rPr lang="en-US" dirty="0"/>
-              <a:t>2/14/2020</a:t>
+              <a:t>9/10/2020</a:t>
             </a:fld>
             <a:endParaRPr lang="en-US" dirty="0"/>
           </a:p>
@@ -8144,7 +8151,7 @@
           <a:p>
             <a:fld id="{48A87A34-81AB-432B-8DAE-1953F412C126}" type="datetimeFigureOut">
               <a:rPr lang="en-US" dirty="0"/>
-              <a:t>2/14/2020</a:t>
+              <a:t>9/10/2020</a:t>
             </a:fld>
             <a:endParaRPr lang="en-US" dirty="0"/>
           </a:p>
@@ -8257,7 +8264,7 @@
           <a:p>
             <a:fld id="{48A87A34-81AB-432B-8DAE-1953F412C126}" type="datetimeFigureOut">
               <a:rPr lang="en-US" dirty="0"/>
-              <a:t>2/14/2020</a:t>
+              <a:t>9/10/2020</a:t>
             </a:fld>
             <a:endParaRPr lang="en-US" dirty="0"/>
           </a:p>
@@ -8347,7 +8354,7 @@
           <a:p>
             <a:fld id="{48A87A34-81AB-432B-8DAE-1953F412C126}" type="datetimeFigureOut">
               <a:rPr lang="en-US" dirty="0"/>
-              <a:t>2/14/2020</a:t>
+              <a:t>9/10/2020</a:t>
             </a:fld>
             <a:endParaRPr lang="en-US" dirty="0"/>
           </a:p>
@@ -8591,7 +8598,7 @@
           <a:p>
             <a:fld id="{48A87A34-81AB-432B-8DAE-1953F412C126}" type="datetimeFigureOut">
               <a:rPr lang="en-US" dirty="0"/>
-              <a:t>2/14/2020</a:t>
+              <a:t>9/10/2020</a:t>
             </a:fld>
             <a:endParaRPr lang="en-US" dirty="0"/>
           </a:p>
@@ -8866,7 +8873,7 @@
           <a:p>
             <a:fld id="{48A87A34-81AB-432B-8DAE-1953F412C126}" type="datetimeFigureOut">
               <a:rPr lang="en-US" dirty="0"/>
-              <a:t>2/14/2020</a:t>
+              <a:t>9/10/2020</a:t>
             </a:fld>
             <a:endParaRPr lang="en-US" dirty="0"/>
           </a:p>
@@ -8984,7 +8991,7 @@
           <a:noFill/>
           <a:extLst>
             <a:ext uri="{909E8E84-426E-40dd-AFC4-6F175D3DCCD1}">
-              <a14:hiddenFill xmlns:a14="http://schemas.microsoft.com/office/drawing/2010/main" xmlns="">
+              <a14:hiddenFill xmlns="" xmlns:a14="http://schemas.microsoft.com/office/drawing/2010/main">
                 <a:solidFill>
                   <a:srgbClr val="FFFFFF"/>
                 </a:solidFill>
@@ -9058,7 +9065,7 @@
               </a:ln>
               <a:extLst>
                 <a:ext uri="{91240B29-F687-4f45-9708-019B960494DF}">
-                  <a14:hiddenLine xmlns:a14="http://schemas.microsoft.com/office/drawing/2010/main" xmlns="" w="9525">
+                  <a14:hiddenLine xmlns="" xmlns:a14="http://schemas.microsoft.com/office/drawing/2010/main" w="9525">
                     <a:solidFill>
                       <a:srgbClr val="000000"/>
                     </a:solidFill>
@@ -9148,7 +9155,7 @@
               </a:ln>
               <a:extLst>
                 <a:ext uri="{91240B29-F687-4f45-9708-019B960494DF}">
-                  <a14:hiddenLine xmlns:a14="http://schemas.microsoft.com/office/drawing/2010/main" xmlns="" w="9525">
+                  <a14:hiddenLine xmlns="" xmlns:a14="http://schemas.microsoft.com/office/drawing/2010/main" w="9525">
                     <a:solidFill>
                       <a:srgbClr val="000000"/>
                     </a:solidFill>
@@ -9238,7 +9245,7 @@
               </a:ln>
               <a:extLst>
                 <a:ext uri="{91240B29-F687-4f45-9708-019B960494DF}">
-                  <a14:hiddenLine xmlns:a14="http://schemas.microsoft.com/office/drawing/2010/main" xmlns="" w="9525">
+                  <a14:hiddenLine xmlns="" xmlns:a14="http://schemas.microsoft.com/office/drawing/2010/main" w="9525">
                     <a:solidFill>
                       <a:srgbClr val="000000"/>
                     </a:solidFill>
@@ -9300,7 +9307,7 @@
               </a:ln>
               <a:extLst>
                 <a:ext uri="{91240B29-F687-4f45-9708-019B960494DF}">
-                  <a14:hiddenLine xmlns:a14="http://schemas.microsoft.com/office/drawing/2010/main" xmlns="" w="9525">
+                  <a14:hiddenLine xmlns="" xmlns:a14="http://schemas.microsoft.com/office/drawing/2010/main" w="9525">
                     <a:solidFill>
                       <a:srgbClr val="000000"/>
                     </a:solidFill>
@@ -9390,7 +9397,7 @@
               </a:ln>
               <a:extLst>
                 <a:ext uri="{91240B29-F687-4f45-9708-019B960494DF}">
-                  <a14:hiddenLine xmlns:a14="http://schemas.microsoft.com/office/drawing/2010/main" xmlns="" w="9525">
+                  <a14:hiddenLine xmlns="" xmlns:a14="http://schemas.microsoft.com/office/drawing/2010/main" w="9525">
                     <a:solidFill>
                       <a:srgbClr val="000000"/>
                     </a:solidFill>
@@ -9452,7 +9459,7 @@
               </a:ln>
               <a:extLst>
                 <a:ext uri="{91240B29-F687-4f45-9708-019B960494DF}">
-                  <a14:hiddenLine xmlns:a14="http://schemas.microsoft.com/office/drawing/2010/main" xmlns="" w="9525">
+                  <a14:hiddenLine xmlns="" xmlns:a14="http://schemas.microsoft.com/office/drawing/2010/main" w="9525">
                     <a:solidFill>
                       <a:srgbClr val="000000"/>
                     </a:solidFill>
@@ -9514,7 +9521,7 @@
               </a:ln>
               <a:extLst>
                 <a:ext uri="{91240B29-F687-4f45-9708-019B960494DF}">
-                  <a14:hiddenLine xmlns:a14="http://schemas.microsoft.com/office/drawing/2010/main" xmlns="" w="9525">
+                  <a14:hiddenLine xmlns="" xmlns:a14="http://schemas.microsoft.com/office/drawing/2010/main" w="9525">
                     <a:solidFill>
                       <a:srgbClr val="000000"/>
                     </a:solidFill>
@@ -9604,7 +9611,7 @@
               </a:ln>
               <a:extLst>
                 <a:ext uri="{91240B29-F687-4f45-9708-019B960494DF}">
-                  <a14:hiddenLine xmlns:a14="http://schemas.microsoft.com/office/drawing/2010/main" xmlns="" w="9525">
+                  <a14:hiddenLine xmlns="" xmlns:a14="http://schemas.microsoft.com/office/drawing/2010/main" w="9525">
                     <a:solidFill>
                       <a:srgbClr val="000000"/>
                     </a:solidFill>
@@ -9694,7 +9701,7 @@
               </a:ln>
               <a:extLst>
                 <a:ext uri="{91240B29-F687-4f45-9708-019B960494DF}">
-                  <a14:hiddenLine xmlns:a14="http://schemas.microsoft.com/office/drawing/2010/main" xmlns="" w="9525">
+                  <a14:hiddenLine xmlns="" xmlns:a14="http://schemas.microsoft.com/office/drawing/2010/main" w="9525">
                     <a:solidFill>
                       <a:srgbClr val="000000"/>
                     </a:solidFill>
@@ -9756,7 +9763,7 @@
               </a:ln>
               <a:extLst>
                 <a:ext uri="{91240B29-F687-4f45-9708-019B960494DF}">
-                  <a14:hiddenLine xmlns:a14="http://schemas.microsoft.com/office/drawing/2010/main" xmlns="" w="9525">
+                  <a14:hiddenLine xmlns="" xmlns:a14="http://schemas.microsoft.com/office/drawing/2010/main" w="9525">
                     <a:solidFill>
                       <a:srgbClr val="000000"/>
                     </a:solidFill>
@@ -9866,7 +9873,7 @@
               </a:ln>
               <a:extLst>
                 <a:ext uri="{91240B29-F687-4f45-9708-019B960494DF}">
-                  <a14:hiddenLine xmlns:a14="http://schemas.microsoft.com/office/drawing/2010/main" xmlns="" w="9525">
+                  <a14:hiddenLine xmlns="" xmlns:a14="http://schemas.microsoft.com/office/drawing/2010/main" w="9525">
                     <a:solidFill>
                       <a:srgbClr val="000000"/>
                     </a:solidFill>
@@ -9950,7 +9957,7 @@
               </a:ln>
               <a:extLst>
                 <a:ext uri="{91240B29-F687-4f45-9708-019B960494DF}">
-                  <a14:hiddenLine xmlns:a14="http://schemas.microsoft.com/office/drawing/2010/main" xmlns="" w="9525">
+                  <a14:hiddenLine xmlns="" xmlns:a14="http://schemas.microsoft.com/office/drawing/2010/main" w="9525">
                     <a:solidFill>
                       <a:srgbClr val="000000"/>
                     </a:solidFill>
@@ -10012,7 +10019,7 @@
               </a:ln>
               <a:extLst>
                 <a:ext uri="{91240B29-F687-4f45-9708-019B960494DF}">
-                  <a14:hiddenLine xmlns:a14="http://schemas.microsoft.com/office/drawing/2010/main" xmlns="" w="9525">
+                  <a14:hiddenLine xmlns="" xmlns:a14="http://schemas.microsoft.com/office/drawing/2010/main" w="9525">
                     <a:solidFill>
                       <a:srgbClr val="000000"/>
                     </a:solidFill>
@@ -10074,7 +10081,7 @@
               </a:ln>
               <a:extLst>
                 <a:ext uri="{91240B29-F687-4f45-9708-019B960494DF}">
-                  <a14:hiddenLine xmlns:a14="http://schemas.microsoft.com/office/drawing/2010/main" xmlns="" w="9525">
+                  <a14:hiddenLine xmlns="" xmlns:a14="http://schemas.microsoft.com/office/drawing/2010/main" w="9525">
                     <a:solidFill>
                       <a:srgbClr val="000000"/>
                     </a:solidFill>
@@ -10164,7 +10171,7 @@
               </a:ln>
               <a:extLst>
                 <a:ext uri="{91240B29-F687-4f45-9708-019B960494DF}">
-                  <a14:hiddenLine xmlns:a14="http://schemas.microsoft.com/office/drawing/2010/main" xmlns="" w="9525">
+                  <a14:hiddenLine xmlns="" xmlns:a14="http://schemas.microsoft.com/office/drawing/2010/main" w="9525">
                     <a:solidFill>
                       <a:srgbClr val="000000"/>
                     </a:solidFill>
@@ -10198,7 +10205,7 @@
               </a:ln>
               <a:extLst>
                 <a:ext uri="{91240B29-F687-4f45-9708-019B960494DF}">
-                  <a14:hiddenLine xmlns:a14="http://schemas.microsoft.com/office/drawing/2010/main" xmlns="" w="9525">
+                  <a14:hiddenLine xmlns="" xmlns:a14="http://schemas.microsoft.com/office/drawing/2010/main" w="9525">
                     <a:solidFill>
                       <a:srgbClr val="000000"/>
                     </a:solidFill>
@@ -10263,7 +10270,7 @@
               </a:ln>
               <a:extLst>
                 <a:ext uri="{91240B29-F687-4f45-9708-019B960494DF}">
-                  <a14:hiddenLine xmlns:a14="http://schemas.microsoft.com/office/drawing/2010/main" xmlns="" w="9525">
+                  <a14:hiddenLine xmlns="" xmlns:a14="http://schemas.microsoft.com/office/drawing/2010/main" w="9525">
                     <a:solidFill>
                       <a:srgbClr val="000000"/>
                     </a:solidFill>
@@ -10353,7 +10360,7 @@
               </a:ln>
               <a:extLst>
                 <a:ext uri="{91240B29-F687-4f45-9708-019B960494DF}">
-                  <a14:hiddenLine xmlns:a14="http://schemas.microsoft.com/office/drawing/2010/main" xmlns="" w="9525">
+                  <a14:hiddenLine xmlns="" xmlns:a14="http://schemas.microsoft.com/office/drawing/2010/main" w="9525">
                     <a:solidFill>
                       <a:srgbClr val="000000"/>
                     </a:solidFill>
@@ -10415,7 +10422,7 @@
               </a:ln>
               <a:extLst>
                 <a:ext uri="{91240B29-F687-4f45-9708-019B960494DF}">
-                  <a14:hiddenLine xmlns:a14="http://schemas.microsoft.com/office/drawing/2010/main" xmlns="" w="9525">
+                  <a14:hiddenLine xmlns="" xmlns:a14="http://schemas.microsoft.com/office/drawing/2010/main" w="9525">
                     <a:solidFill>
                       <a:srgbClr val="000000"/>
                     </a:solidFill>
@@ -10505,7 +10512,7 @@
               </a:ln>
               <a:extLst>
                 <a:ext uri="{91240B29-F687-4f45-9708-019B960494DF}">
-                  <a14:hiddenLine xmlns:a14="http://schemas.microsoft.com/office/drawing/2010/main" xmlns="" w="9525">
+                  <a14:hiddenLine xmlns="" xmlns:a14="http://schemas.microsoft.com/office/drawing/2010/main" w="9525">
                     <a:solidFill>
                       <a:srgbClr val="000000"/>
                     </a:solidFill>
@@ -10570,7 +10577,7 @@
               </a:ln>
               <a:extLst>
                 <a:ext uri="{91240B29-F687-4f45-9708-019B960494DF}">
-                  <a14:hiddenLine xmlns:a14="http://schemas.microsoft.com/office/drawing/2010/main" xmlns="" w="9525">
+                  <a14:hiddenLine xmlns="" xmlns:a14="http://schemas.microsoft.com/office/drawing/2010/main" w="9525">
                     <a:solidFill>
                       <a:srgbClr val="000000"/>
                     </a:solidFill>
@@ -10632,7 +10639,7 @@
               </a:ln>
               <a:extLst>
                 <a:ext uri="{91240B29-F687-4f45-9708-019B960494DF}">
-                  <a14:hiddenLine xmlns:a14="http://schemas.microsoft.com/office/drawing/2010/main" xmlns="" w="9525">
+                  <a14:hiddenLine xmlns="" xmlns:a14="http://schemas.microsoft.com/office/drawing/2010/main" w="9525">
                     <a:solidFill>
                       <a:srgbClr val="000000"/>
                     </a:solidFill>
@@ -10722,7 +10729,7 @@
               </a:ln>
               <a:extLst>
                 <a:ext uri="{91240B29-F687-4f45-9708-019B960494DF}">
-                  <a14:hiddenLine xmlns:a14="http://schemas.microsoft.com/office/drawing/2010/main" xmlns="" w="9525">
+                  <a14:hiddenLine xmlns="" xmlns:a14="http://schemas.microsoft.com/office/drawing/2010/main" w="9525">
                     <a:solidFill>
                       <a:srgbClr val="000000"/>
                     </a:solidFill>
@@ -10812,7 +10819,7 @@
               </a:ln>
               <a:extLst>
                 <a:ext uri="{91240B29-F687-4f45-9708-019B960494DF}">
-                  <a14:hiddenLine xmlns:a14="http://schemas.microsoft.com/office/drawing/2010/main" xmlns="" w="9525">
+                  <a14:hiddenLine xmlns="" xmlns:a14="http://schemas.microsoft.com/office/drawing/2010/main" w="9525">
                     <a:solidFill>
                       <a:srgbClr val="000000"/>
                     </a:solidFill>
@@ -10877,7 +10884,7 @@
               </a:ln>
               <a:extLst>
                 <a:ext uri="{91240B29-F687-4f45-9708-019B960494DF}">
-                  <a14:hiddenLine xmlns:a14="http://schemas.microsoft.com/office/drawing/2010/main" xmlns="" w="9525">
+                  <a14:hiddenLine xmlns="" xmlns:a14="http://schemas.microsoft.com/office/drawing/2010/main" w="9525">
                     <a:solidFill>
                       <a:srgbClr val="000000"/>
                     </a:solidFill>
@@ -10997,7 +11004,7 @@
               </a:ln>
               <a:extLst>
                 <a:ext uri="{91240B29-F687-4f45-9708-019B960494DF}">
-                  <a14:hiddenLine xmlns:a14="http://schemas.microsoft.com/office/drawing/2010/main" xmlns="" w="9525">
+                  <a14:hiddenLine xmlns="" xmlns:a14="http://schemas.microsoft.com/office/drawing/2010/main" w="9525">
                     <a:solidFill>
                       <a:srgbClr val="000000"/>
                     </a:solidFill>
@@ -11078,7 +11085,7 @@
               </a:ln>
               <a:extLst>
                 <a:ext uri="{91240B29-F687-4f45-9708-019B960494DF}">
-                  <a14:hiddenLine xmlns:a14="http://schemas.microsoft.com/office/drawing/2010/main" xmlns="" w="9525">
+                  <a14:hiddenLine xmlns="" xmlns:a14="http://schemas.microsoft.com/office/drawing/2010/main" w="9525">
                     <a:solidFill>
                       <a:srgbClr val="000000"/>
                     </a:solidFill>
@@ -11193,7 +11200,7 @@
               </a:ln>
               <a:extLst>
                 <a:ext uri="{91240B29-F687-4f45-9708-019B960494DF}">
-                  <a14:hiddenLine xmlns:a14="http://schemas.microsoft.com/office/drawing/2010/main" xmlns="" w="9525">
+                  <a14:hiddenLine xmlns="" xmlns:a14="http://schemas.microsoft.com/office/drawing/2010/main" w="9525">
                     <a:solidFill>
                       <a:srgbClr val="000000"/>
                     </a:solidFill>
@@ -11283,7 +11290,7 @@
               </a:ln>
               <a:extLst>
                 <a:ext uri="{91240B29-F687-4f45-9708-019B960494DF}">
-                  <a14:hiddenLine xmlns:a14="http://schemas.microsoft.com/office/drawing/2010/main" xmlns="" w="9525">
+                  <a14:hiddenLine xmlns="" xmlns:a14="http://schemas.microsoft.com/office/drawing/2010/main" w="9525">
                     <a:solidFill>
                       <a:srgbClr val="000000"/>
                     </a:solidFill>
@@ -11348,7 +11355,7 @@
               </a:ln>
               <a:extLst>
                 <a:ext uri="{91240B29-F687-4f45-9708-019B960494DF}">
-                  <a14:hiddenLine xmlns:a14="http://schemas.microsoft.com/office/drawing/2010/main" xmlns="" w="9525">
+                  <a14:hiddenLine xmlns="" xmlns:a14="http://schemas.microsoft.com/office/drawing/2010/main" w="9525">
                     <a:solidFill>
                       <a:srgbClr val="000000"/>
                     </a:solidFill>
@@ -11438,7 +11445,7 @@
               </a:ln>
               <a:extLst>
                 <a:ext uri="{91240B29-F687-4f45-9708-019B960494DF}">
-                  <a14:hiddenLine xmlns:a14="http://schemas.microsoft.com/office/drawing/2010/main" xmlns="" w="9525">
+                  <a14:hiddenLine xmlns="" xmlns:a14="http://schemas.microsoft.com/office/drawing/2010/main" w="9525">
                     <a:solidFill>
                       <a:srgbClr val="000000"/>
                     </a:solidFill>
@@ -11506,7 +11513,7 @@
               </a:ln>
               <a:extLst>
                 <a:ext uri="{91240B29-F687-4f45-9708-019B960494DF}">
-                  <a14:hiddenLine xmlns:a14="http://schemas.microsoft.com/office/drawing/2010/main" xmlns="" w="9525">
+                  <a14:hiddenLine xmlns="" xmlns:a14="http://schemas.microsoft.com/office/drawing/2010/main" w="9525">
                     <a:solidFill>
                       <a:srgbClr val="000000"/>
                     </a:solidFill>
@@ -11596,7 +11603,7 @@
               </a:ln>
               <a:extLst>
                 <a:ext uri="{91240B29-F687-4f45-9708-019B960494DF}">
-                  <a14:hiddenLine xmlns:a14="http://schemas.microsoft.com/office/drawing/2010/main" xmlns="" w="9525">
+                  <a14:hiddenLine xmlns="" xmlns:a14="http://schemas.microsoft.com/office/drawing/2010/main" w="9525">
                     <a:solidFill>
                       <a:srgbClr val="000000"/>
                     </a:solidFill>
@@ -11664,7 +11671,7 @@
               </a:ln>
               <a:extLst>
                 <a:ext uri="{91240B29-F687-4f45-9708-019B960494DF}">
-                  <a14:hiddenLine xmlns:a14="http://schemas.microsoft.com/office/drawing/2010/main" xmlns="" w="9525">
+                  <a14:hiddenLine xmlns="" xmlns:a14="http://schemas.microsoft.com/office/drawing/2010/main" w="9525">
                     <a:solidFill>
                       <a:srgbClr val="000000"/>
                     </a:solidFill>
@@ -11754,7 +11761,7 @@
               </a:ln>
               <a:extLst>
                 <a:ext uri="{91240B29-F687-4f45-9708-019B960494DF}">
-                  <a14:hiddenLine xmlns:a14="http://schemas.microsoft.com/office/drawing/2010/main" xmlns="" w="9525">
+                  <a14:hiddenLine xmlns="" xmlns:a14="http://schemas.microsoft.com/office/drawing/2010/main" w="9525">
                     <a:solidFill>
                       <a:srgbClr val="000000"/>
                     </a:solidFill>
@@ -11788,7 +11795,7 @@
               </a:ln>
               <a:extLst>
                 <a:ext uri="{91240B29-F687-4f45-9708-019B960494DF}">
-                  <a14:hiddenLine xmlns:a14="http://schemas.microsoft.com/office/drawing/2010/main" xmlns="" w="9525">
+                  <a14:hiddenLine xmlns="" xmlns:a14="http://schemas.microsoft.com/office/drawing/2010/main" w="9525">
                     <a:solidFill>
                       <a:srgbClr val="000000"/>
                     </a:solidFill>
@@ -11929,7 +11936,7 @@
             <a:fld id="{48A87A34-81AB-432B-8DAE-1953F412C126}" type="datetimeFigureOut">
               <a:rPr lang="en-US" dirty="0"/>
               <a:pPr/>
-              <a:t>2/14/2020</a:t>
+              <a:t>9/10/2020</a:t>
             </a:fld>
             <a:endParaRPr lang="en-US" dirty="0"/>
           </a:p>
@@ -12345,12 +12352,295 @@
           <a:chExt cx="0" cy="0"/>
         </a:xfrm>
       </p:grpSpPr>
+      <p:sp>
+        <p:nvSpPr>
+          <p:cNvPr id="2" name="Título 1">
+            <a:extLst>
+              <a:ext uri="{FF2B5EF4-FFF2-40B4-BE49-F238E27FC236}">
+                <a16:creationId xmlns:a16="http://schemas.microsoft.com/office/drawing/2014/main" id="{C6EAAA9D-39F1-4044-B932-57134CF6E9F5}"/>
+              </a:ext>
+            </a:extLst>
+          </p:cNvPr>
+          <p:cNvSpPr>
+            <a:spLocks noGrp="1"/>
+          </p:cNvSpPr>
+          <p:nvPr>
+            <p:ph type="ctrTitle"/>
+          </p:nvPr>
+        </p:nvSpPr>
+        <p:spPr/>
+        <p:txBody>
+          <a:bodyPr/>
+          <a:lstStyle/>
+          <a:p>
+            <a:pPr algn="ctr"/>
+            <a:r>
+              <a:rPr lang="es-ES" dirty="0"/>
+              <a:t>Prueba de caja blanca </a:t>
+            </a:r>
+            <a:br>
+              <a:rPr lang="es-ES" dirty="0"/>
+            </a:br>
+            <a:r>
+              <a:rPr lang="es-ES" dirty="0"/>
+              <a:t>– </a:t>
+            </a:r>
+            <a:br>
+              <a:rPr lang="es-ES" dirty="0"/>
+            </a:br>
+            <a:r>
+              <a:rPr lang="es-ES" dirty="0"/>
+              <a:t>camino básico </a:t>
+            </a:r>
+            <a:endParaRPr lang="es-CO" dirty="0"/>
+          </a:p>
+        </p:txBody>
+      </p:sp>
+      <p:sp>
+        <p:nvSpPr>
+          <p:cNvPr id="3" name="Subtítulo 2">
+            <a:extLst>
+              <a:ext uri="{FF2B5EF4-FFF2-40B4-BE49-F238E27FC236}">
+                <a16:creationId xmlns:a16="http://schemas.microsoft.com/office/drawing/2014/main" id="{6DF57B68-10A7-45EC-BE16-B9F850C60B2E}"/>
+              </a:ext>
+            </a:extLst>
+          </p:cNvPr>
+          <p:cNvSpPr>
+            <a:spLocks noGrp="1"/>
+          </p:cNvSpPr>
+          <p:nvPr>
+            <p:ph type="subTitle" idx="1"/>
+          </p:nvPr>
+        </p:nvSpPr>
+        <p:spPr>
+          <a:xfrm>
+            <a:off x="1876424" y="3602037"/>
+            <a:ext cx="7665141" cy="3010798"/>
+          </a:xfrm>
+        </p:spPr>
+        <p:txBody>
+          <a:bodyPr>
+            <a:normAutofit fontScale="32500" lnSpcReduction="20000"/>
+          </a:bodyPr>
+          <a:lstStyle/>
+          <a:p>
+            <a:r>
+              <a:rPr lang="es-ES" sz="5500" dirty="0">
+                <a:solidFill>
+                  <a:schemeClr val="accent2">
+                    <a:lumMod val="40000"/>
+                    <a:lumOff val="60000"/>
+                  </a:schemeClr>
+                </a:solidFill>
+              </a:rPr>
+              <a:t>Grupo DE proyecto sigi Dana`s:</a:t>
+            </a:r>
+          </a:p>
+          <a:p>
+            <a:endParaRPr lang="es-ES" sz="5500" dirty="0">
+              <a:solidFill>
+                <a:schemeClr val="accent2">
+                  <a:lumMod val="40000"/>
+                  <a:lumOff val="60000"/>
+                </a:schemeClr>
+              </a:solidFill>
+            </a:endParaRPr>
+          </a:p>
+          <a:p>
+            <a:pPr marL="114300" marR="150495">
+              <a:spcAft>
+                <a:spcPts val="0"/>
+              </a:spcAft>
+            </a:pPr>
+            <a:r>
+              <a:rPr lang="es-ES" sz="5500" dirty="0">
+                <a:solidFill>
+                  <a:schemeClr val="accent2">
+                    <a:lumMod val="60000"/>
+                    <a:lumOff val="40000"/>
+                  </a:schemeClr>
+                </a:solidFill>
+                <a:effectLst/>
+                <a:latin typeface="Tw Cen MT (Cuerpo)"/>
+                <a:ea typeface="Times New Roman" panose="02020603050405020304" pitchFamily="18" charset="0"/>
+              </a:rPr>
+              <a:t>CAMILO ALEJANDRO PEREZ NINO</a:t>
+            </a:r>
+            <a:endParaRPr lang="es-CO" sz="5500" dirty="0">
+              <a:solidFill>
+                <a:schemeClr val="accent2">
+                  <a:lumMod val="60000"/>
+                  <a:lumOff val="40000"/>
+                </a:schemeClr>
+              </a:solidFill>
+              <a:effectLst/>
+              <a:latin typeface="Tw Cen MT (Cuerpo)"/>
+              <a:ea typeface="Times New Roman" panose="02020603050405020304" pitchFamily="18" charset="0"/>
+            </a:endParaRPr>
+          </a:p>
+          <a:p>
+            <a:pPr marL="114300" marR="150495">
+              <a:spcAft>
+                <a:spcPts val="0"/>
+              </a:spcAft>
+            </a:pPr>
+            <a:r>
+              <a:rPr lang="es-ES" sz="5500" dirty="0">
+                <a:solidFill>
+                  <a:schemeClr val="accent2">
+                    <a:lumMod val="60000"/>
+                    <a:lumOff val="40000"/>
+                  </a:schemeClr>
+                </a:solidFill>
+                <a:effectLst/>
+                <a:latin typeface="Tw Cen MT (Cuerpo)"/>
+                <a:ea typeface="Times New Roman" panose="02020603050405020304" pitchFamily="18" charset="0"/>
+              </a:rPr>
+              <a:t>LUIS ANDERSON TIQUE PINTO</a:t>
+            </a:r>
+            <a:endParaRPr lang="es-CO" sz="5500" dirty="0">
+              <a:solidFill>
+                <a:schemeClr val="accent2">
+                  <a:lumMod val="60000"/>
+                  <a:lumOff val="40000"/>
+                </a:schemeClr>
+              </a:solidFill>
+              <a:latin typeface="Tw Cen MT (Cuerpo)"/>
+              <a:ea typeface="Times New Roman" panose="02020603050405020304" pitchFamily="18" charset="0"/>
+            </a:endParaRPr>
+          </a:p>
+          <a:p>
+            <a:pPr marL="114300" marR="150495">
+              <a:spcAft>
+                <a:spcPts val="0"/>
+              </a:spcAft>
+            </a:pPr>
+            <a:r>
+              <a:rPr lang="es-ES" sz="5500" dirty="0">
+                <a:solidFill>
+                  <a:schemeClr val="accent2">
+                    <a:lumMod val="60000"/>
+                    <a:lumOff val="40000"/>
+                  </a:schemeClr>
+                </a:solidFill>
+                <a:effectLst/>
+                <a:latin typeface="Tw Cen MT (Cuerpo)"/>
+                <a:ea typeface="Times New Roman" panose="02020603050405020304" pitchFamily="18" charset="0"/>
+              </a:rPr>
+              <a:t>CRISTIAN VALENTIN AFRICANO BALLESTEROS</a:t>
+            </a:r>
+            <a:endParaRPr lang="es-CO" sz="5500" dirty="0">
+              <a:solidFill>
+                <a:schemeClr val="accent2">
+                  <a:lumMod val="60000"/>
+                  <a:lumOff val="40000"/>
+                </a:schemeClr>
+              </a:solidFill>
+              <a:latin typeface="Tw Cen MT (Cuerpo)"/>
+              <a:ea typeface="Times New Roman" panose="02020603050405020304" pitchFamily="18" charset="0"/>
+            </a:endParaRPr>
+          </a:p>
+          <a:p>
+            <a:pPr marL="114300" marR="150495">
+              <a:spcAft>
+                <a:spcPts val="0"/>
+              </a:spcAft>
+            </a:pPr>
+            <a:r>
+              <a:rPr lang="es-ES" sz="5500" dirty="0">
+                <a:solidFill>
+                  <a:schemeClr val="accent2">
+                    <a:lumMod val="60000"/>
+                    <a:lumOff val="40000"/>
+                  </a:schemeClr>
+                </a:solidFill>
+                <a:effectLst/>
+                <a:latin typeface="Tw Cen MT (Cuerpo)"/>
+                <a:ea typeface="Times New Roman" panose="02020603050405020304" pitchFamily="18" charset="0"/>
+              </a:rPr>
+              <a:t>STIVEN DANIEL MELO GUAYZAN</a:t>
+            </a:r>
+          </a:p>
+          <a:p>
+            <a:pPr marL="114300" marR="150495">
+              <a:spcAft>
+                <a:spcPts val="0"/>
+              </a:spcAft>
+            </a:pPr>
+            <a:r>
+              <a:rPr lang="es-ES" sz="5500" dirty="0">
+                <a:solidFill>
+                  <a:schemeClr val="accent2">
+                    <a:lumMod val="60000"/>
+                    <a:lumOff val="40000"/>
+                  </a:schemeClr>
+                </a:solidFill>
+                <a:effectLst/>
+                <a:latin typeface="Tw Cen MT (Cuerpo)"/>
+                <a:ea typeface="Times New Roman" panose="02020603050405020304" pitchFamily="18" charset="0"/>
+              </a:rPr>
+              <a:t>GEFREY RAFAEL MUÑOS TORRES</a:t>
+            </a:r>
+            <a:endParaRPr lang="es-CO" sz="5500" dirty="0">
+              <a:solidFill>
+                <a:schemeClr val="accent2">
+                  <a:lumMod val="60000"/>
+                  <a:lumOff val="40000"/>
+                </a:schemeClr>
+              </a:solidFill>
+              <a:effectLst/>
+              <a:latin typeface="Tw Cen MT (Cuerpo)"/>
+              <a:ea typeface="Times New Roman" panose="02020603050405020304" pitchFamily="18" charset="0"/>
+            </a:endParaRPr>
+          </a:p>
+          <a:p>
+            <a:endParaRPr lang="es-CO" dirty="0">
+              <a:solidFill>
+                <a:schemeClr val="accent2">
+                  <a:lumMod val="40000"/>
+                  <a:lumOff val="60000"/>
+                </a:schemeClr>
+              </a:solidFill>
+            </a:endParaRPr>
+          </a:p>
+        </p:txBody>
+      </p:sp>
+    </p:spTree>
+    <p:extLst>
+      <p:ext uri="{BB962C8B-B14F-4D97-AF65-F5344CB8AC3E}">
+        <p14:creationId xmlns:p14="http://schemas.microsoft.com/office/powerpoint/2010/main" val="3948864875"/>
+      </p:ext>
+    </p:extLst>
+  </p:cSld>
+  <p:clrMapOvr>
+    <a:masterClrMapping/>
+  </p:clrMapOvr>
+</p:sld>
+</file>
+
+<file path=ppt/slides/slide2.xml><?xml version="1.0" encoding="utf-8"?>
+<p:sld xmlns:a="http://schemas.openxmlformats.org/drawingml/2006/main" xmlns:r="http://schemas.openxmlformats.org/officeDocument/2006/relationships" xmlns:p="http://schemas.openxmlformats.org/presentationml/2006/main">
+  <p:cSld>
+    <p:spTree>
+      <p:nvGrpSpPr>
+        <p:cNvPr id="1" name=""/>
+        <p:cNvGrpSpPr/>
+        <p:nvPr/>
+      </p:nvGrpSpPr>
+      <p:grpSpPr>
+        <a:xfrm>
+          <a:off x="0" y="0"/>
+          <a:ext cx="0" cy="0"/>
+          <a:chOff x="0" y="0"/>
+          <a:chExt cx="0" cy="0"/>
+        </a:xfrm>
+      </p:grpSpPr>
       <p:pic>
         <p:nvPicPr>
-          <p:cNvPr id="4" name="Imagen 3">
+          <p:cNvPr id="2" name="Imagen 1">
             <a:extLst>
               <a:ext uri="{FF2B5EF4-FFF2-40B4-BE49-F238E27FC236}">
-                <a16:creationId xmlns:a16="http://schemas.microsoft.com/office/drawing/2014/main" id="{951AFA33-FC3A-457A-8189-0189F74C3C75}"/>
+                <a16:creationId xmlns:a16="http://schemas.microsoft.com/office/drawing/2014/main" id="{E81B1BB2-CE8C-47BB-8704-BCBE3B94421B}"/>
               </a:ext>
             </a:extLst>
           </p:cNvPr>
@@ -12360,21 +12650,15 @@
           <p:nvPr/>
         </p:nvPicPr>
         <p:blipFill>
-          <a:blip r:embed="rId2">
-            <a:extLst>
-              <a:ext uri="{28A0092B-C50C-407E-A947-70E740481C1C}">
-                <a14:useLocalDpi xmlns:a14="http://schemas.microsoft.com/office/drawing/2010/main" val="0"/>
-              </a:ext>
-            </a:extLst>
-          </a:blip>
+          <a:blip r:embed="rId2"/>
           <a:stretch>
             <a:fillRect/>
           </a:stretch>
         </p:blipFill>
         <p:spPr>
           <a:xfrm>
-            <a:off x="783116" y="99812"/>
-            <a:ext cx="10625768" cy="6658376"/>
+            <a:off x="870354" y="269741"/>
+            <a:ext cx="10327733" cy="6395026"/>
           </a:xfrm>
           <a:prstGeom prst="rect">
             <a:avLst/>
@@ -12383,10 +12667,10 @@
       </p:pic>
       <p:sp>
         <p:nvSpPr>
-          <p:cNvPr id="5" name="Elipse 4">
+          <p:cNvPr id="3" name="Elipse 2">
             <a:extLst>
               <a:ext uri="{FF2B5EF4-FFF2-40B4-BE49-F238E27FC236}">
-                <a16:creationId xmlns:a16="http://schemas.microsoft.com/office/drawing/2014/main" id="{8C02225B-93D8-4989-AE2E-38D2E68A6C82}"/>
+                <a16:creationId xmlns:a16="http://schemas.microsoft.com/office/drawing/2014/main" id="{7023CD6C-A063-442D-85A3-06B77BAF8CB6}"/>
               </a:ext>
             </a:extLst>
           </p:cNvPr>
@@ -12395,7 +12679,7 @@
         </p:nvSpPr>
         <p:spPr>
           <a:xfrm>
-            <a:off x="3271235" y="231821"/>
+            <a:off x="2515861" y="193233"/>
             <a:ext cx="386366" cy="412124"/>
           </a:xfrm>
           <a:prstGeom prst="ellipse">
@@ -12435,10 +12719,10 @@
       </p:sp>
       <p:sp>
         <p:nvSpPr>
-          <p:cNvPr id="6" name="Elipse 5">
+          <p:cNvPr id="15" name="Elipse 14">
             <a:extLst>
               <a:ext uri="{FF2B5EF4-FFF2-40B4-BE49-F238E27FC236}">
-                <a16:creationId xmlns:a16="http://schemas.microsoft.com/office/drawing/2014/main" id="{4645E912-1EC0-42F9-BD68-C664F0D15FAC}"/>
+                <a16:creationId xmlns:a16="http://schemas.microsoft.com/office/drawing/2014/main" id="{46701AAC-2E3F-413F-82E5-71D0482C4EC1}"/>
               </a:ext>
             </a:extLst>
           </p:cNvPr>
@@ -12447,7 +12731,7 @@
         </p:nvSpPr>
         <p:spPr>
           <a:xfrm>
-            <a:off x="8494559" y="4340180"/>
+            <a:off x="9070726" y="487817"/>
             <a:ext cx="386366" cy="412124"/>
           </a:xfrm>
           <a:prstGeom prst="ellipse">
@@ -12480,17 +12764,17 @@
             <a:pPr algn="ctr"/>
             <a:r>
               <a:rPr lang="es-CO" b="1" dirty="0"/>
-              <a:t>F</a:t>
+              <a:t>B</a:t>
             </a:r>
           </a:p>
         </p:txBody>
       </p:sp>
       <p:sp>
         <p:nvSpPr>
-          <p:cNvPr id="7" name="Elipse 6">
+          <p:cNvPr id="17" name="Elipse 16">
             <a:extLst>
               <a:ext uri="{FF2B5EF4-FFF2-40B4-BE49-F238E27FC236}">
-                <a16:creationId xmlns:a16="http://schemas.microsoft.com/office/drawing/2014/main" id="{774A39F8-802E-4001-BCA9-E1EA4A19E771}"/>
+                <a16:creationId xmlns:a16="http://schemas.microsoft.com/office/drawing/2014/main" id="{C8680488-3869-4E43-811D-58886C2E72D0}"/>
               </a:ext>
             </a:extLst>
           </p:cNvPr>
@@ -12499,7 +12783,7 @@
         </p:nvSpPr>
         <p:spPr>
           <a:xfrm>
-            <a:off x="6284891" y="3815366"/>
+            <a:off x="4075077" y="1189991"/>
             <a:ext cx="386366" cy="412124"/>
           </a:xfrm>
           <a:prstGeom prst="ellipse">
@@ -12532,17 +12816,17 @@
             <a:pPr algn="ctr"/>
             <a:r>
               <a:rPr lang="es-CO" b="1" dirty="0"/>
-              <a:t>E</a:t>
+              <a:t>C</a:t>
             </a:r>
           </a:p>
         </p:txBody>
       </p:sp>
       <p:sp>
         <p:nvSpPr>
-          <p:cNvPr id="8" name="Elipse 7">
+          <p:cNvPr id="19" name="Elipse 18">
             <a:extLst>
               <a:ext uri="{FF2B5EF4-FFF2-40B4-BE49-F238E27FC236}">
-                <a16:creationId xmlns:a16="http://schemas.microsoft.com/office/drawing/2014/main" id="{95011292-EAF0-497E-8F9A-1065514D61F5}"/>
+                <a16:creationId xmlns:a16="http://schemas.microsoft.com/office/drawing/2014/main" id="{E965B9A8-6D37-4533-8815-925BC70A73C4}"/>
               </a:ext>
             </a:extLst>
           </p:cNvPr>
@@ -12551,7 +12835,7 @@
         </p:nvSpPr>
         <p:spPr>
           <a:xfrm>
-            <a:off x="8377709" y="2105697"/>
+            <a:off x="7344193" y="1509349"/>
             <a:ext cx="386366" cy="412124"/>
           </a:xfrm>
           <a:prstGeom prst="ellipse">
@@ -12591,10 +12875,10 @@
       </p:sp>
       <p:sp>
         <p:nvSpPr>
-          <p:cNvPr id="9" name="Elipse 8">
+          <p:cNvPr id="21" name="Elipse 20">
             <a:extLst>
               <a:ext uri="{FF2B5EF4-FFF2-40B4-BE49-F238E27FC236}">
-                <a16:creationId xmlns:a16="http://schemas.microsoft.com/office/drawing/2014/main" id="{D9481148-954B-46D2-900B-825BC38317FE}"/>
+                <a16:creationId xmlns:a16="http://schemas.microsoft.com/office/drawing/2014/main" id="{F2A05FF7-ADAA-4783-8081-5F2E6CAB57FF}"/>
               </a:ext>
             </a:extLst>
           </p:cNvPr>
@@ -12603,7 +12887,7 @@
         </p:nvSpPr>
         <p:spPr>
           <a:xfrm>
-            <a:off x="4326869" y="1693573"/>
+            <a:off x="3581448" y="2052827"/>
             <a:ext cx="386366" cy="412124"/>
           </a:xfrm>
           <a:prstGeom prst="ellipse">
@@ -12636,17 +12920,17 @@
             <a:pPr algn="ctr"/>
             <a:r>
               <a:rPr lang="es-CO" b="1" dirty="0"/>
-              <a:t>C</a:t>
+              <a:t>E</a:t>
             </a:r>
           </a:p>
         </p:txBody>
       </p:sp>
       <p:sp>
         <p:nvSpPr>
-          <p:cNvPr id="10" name="Elipse 9">
+          <p:cNvPr id="23" name="Elipse 22">
             <a:extLst>
               <a:ext uri="{FF2B5EF4-FFF2-40B4-BE49-F238E27FC236}">
-                <a16:creationId xmlns:a16="http://schemas.microsoft.com/office/drawing/2014/main" id="{023D911A-424C-461B-80B6-4CA0487C92F6}"/>
+                <a16:creationId xmlns:a16="http://schemas.microsoft.com/office/drawing/2014/main" id="{A5043F80-E0D8-4252-9EA6-8139DC19EC8B}"/>
               </a:ext>
             </a:extLst>
           </p:cNvPr>
@@ -12655,7 +12939,7 @@
         </p:nvSpPr>
         <p:spPr>
           <a:xfrm>
-            <a:off x="9256257" y="643945"/>
+            <a:off x="6872091" y="2447275"/>
             <a:ext cx="386366" cy="412124"/>
           </a:xfrm>
           <a:prstGeom prst="ellipse">
@@ -12688,17 +12972,17 @@
             <a:pPr algn="ctr"/>
             <a:r>
               <a:rPr lang="es-CO" b="1" dirty="0"/>
-              <a:t>B</a:t>
+              <a:t>F</a:t>
             </a:r>
           </a:p>
         </p:txBody>
       </p:sp>
       <p:sp>
         <p:nvSpPr>
-          <p:cNvPr id="11" name="Elipse 10">
+          <p:cNvPr id="25" name="Elipse 24">
             <a:extLst>
               <a:ext uri="{FF2B5EF4-FFF2-40B4-BE49-F238E27FC236}">
-                <a16:creationId xmlns:a16="http://schemas.microsoft.com/office/drawing/2014/main" id="{B1FAF409-45B6-43C7-A9C7-D05D3A9C54CE}"/>
+                <a16:creationId xmlns:a16="http://schemas.microsoft.com/office/drawing/2014/main" id="{8F1E8319-105C-4780-A5C5-F121FDBA5CA7}"/>
               </a:ext>
             </a:extLst>
           </p:cNvPr>
@@ -12707,7 +12991,7 @@
         </p:nvSpPr>
         <p:spPr>
           <a:xfrm>
-            <a:off x="8488119" y="5224531"/>
+            <a:off x="3967814" y="3006018"/>
             <a:ext cx="386366" cy="412124"/>
           </a:xfrm>
           <a:prstGeom prst="ellipse">
@@ -12747,10 +13031,10 @@
       </p:sp>
       <p:sp>
         <p:nvSpPr>
-          <p:cNvPr id="12" name="Elipse 11">
+          <p:cNvPr id="27" name="Elipse 26">
             <a:extLst>
               <a:ext uri="{FF2B5EF4-FFF2-40B4-BE49-F238E27FC236}">
-                <a16:creationId xmlns:a16="http://schemas.microsoft.com/office/drawing/2014/main" id="{0A602384-DF4B-4943-AECA-4C0103D46FE0}"/>
+                <a16:creationId xmlns:a16="http://schemas.microsoft.com/office/drawing/2014/main" id="{F14E222C-D8D5-44F8-AA42-BA262176321E}"/>
               </a:ext>
             </a:extLst>
           </p:cNvPr>
@@ -12759,8 +13043,8 @@
         </p:nvSpPr>
         <p:spPr>
           <a:xfrm>
-            <a:off x="2049887" y="5885645"/>
-            <a:ext cx="744827" cy="734095"/>
+            <a:off x="7065274" y="3324006"/>
+            <a:ext cx="386366" cy="412124"/>
           </a:xfrm>
           <a:prstGeom prst="ellipse">
             <a:avLst/>
@@ -12791,16 +13075,228 @@
           <a:p>
             <a:pPr algn="ctr"/>
             <a:r>
+              <a:rPr lang="es-ES" b="1" dirty="0"/>
+              <a:t>H</a:t>
+            </a:r>
+            <a:endParaRPr lang="es-CO" b="1" dirty="0"/>
+          </a:p>
+        </p:txBody>
+      </p:sp>
+      <p:sp>
+        <p:nvSpPr>
+          <p:cNvPr id="29" name="Elipse 28">
+            <a:extLst>
+              <a:ext uri="{FF2B5EF4-FFF2-40B4-BE49-F238E27FC236}">
+                <a16:creationId xmlns:a16="http://schemas.microsoft.com/office/drawing/2014/main" id="{9D12CFB5-AA2A-4C19-A5E7-6C09EEC04F66}"/>
+              </a:ext>
+            </a:extLst>
+          </p:cNvPr>
+          <p:cNvSpPr/>
+          <p:nvPr/>
+        </p:nvSpPr>
+        <p:spPr>
+          <a:xfrm>
+            <a:off x="10935280" y="4159816"/>
+            <a:ext cx="386366" cy="412124"/>
+          </a:xfrm>
+          <a:prstGeom prst="ellipse">
+            <a:avLst/>
+          </a:prstGeom>
+          <a:solidFill>
+            <a:srgbClr val="59AFD5"/>
+          </a:solidFill>
+        </p:spPr>
+        <p:style>
+          <a:lnRef idx="2">
+            <a:schemeClr val="accent1">
+              <a:shade val="50000"/>
+            </a:schemeClr>
+          </a:lnRef>
+          <a:fillRef idx="1">
+            <a:schemeClr val="accent1"/>
+          </a:fillRef>
+          <a:effectRef idx="0">
+            <a:schemeClr val="accent1"/>
+          </a:effectRef>
+          <a:fontRef idx="minor">
+            <a:schemeClr val="lt1"/>
+          </a:fontRef>
+        </p:style>
+        <p:txBody>
+          <a:bodyPr rtlCol="0" anchor="ctr"/>
+          <a:lstStyle/>
+          <a:p>
+            <a:pPr algn="ctr"/>
+            <a:r>
+              <a:rPr lang="es-ES" b="1" dirty="0"/>
+              <a:t>I</a:t>
+            </a:r>
+            <a:endParaRPr lang="es-CO" b="1" dirty="0"/>
+          </a:p>
+        </p:txBody>
+      </p:sp>
+      <p:sp>
+        <p:nvSpPr>
+          <p:cNvPr id="31" name="Elipse 30">
+            <a:extLst>
+              <a:ext uri="{FF2B5EF4-FFF2-40B4-BE49-F238E27FC236}">
+                <a16:creationId xmlns:a16="http://schemas.microsoft.com/office/drawing/2014/main" id="{20FA27B0-7018-4970-92AD-7C0E633750B8}"/>
+              </a:ext>
+            </a:extLst>
+          </p:cNvPr>
+          <p:cNvSpPr/>
+          <p:nvPr/>
+        </p:nvSpPr>
+        <p:spPr>
+          <a:xfrm>
+            <a:off x="7258457" y="4830871"/>
+            <a:ext cx="386366" cy="412124"/>
+          </a:xfrm>
+          <a:prstGeom prst="ellipse">
+            <a:avLst/>
+          </a:prstGeom>
+          <a:solidFill>
+            <a:srgbClr val="59AFD5"/>
+          </a:solidFill>
+        </p:spPr>
+        <p:style>
+          <a:lnRef idx="2">
+            <a:schemeClr val="accent1">
+              <a:shade val="50000"/>
+            </a:schemeClr>
+          </a:lnRef>
+          <a:fillRef idx="1">
+            <a:schemeClr val="accent1"/>
+          </a:fillRef>
+          <a:effectRef idx="0">
+            <a:schemeClr val="accent1"/>
+          </a:effectRef>
+          <a:fontRef idx="minor">
+            <a:schemeClr val="lt1"/>
+          </a:fontRef>
+        </p:style>
+        <p:txBody>
+          <a:bodyPr rtlCol="0" anchor="ctr"/>
+          <a:lstStyle/>
+          <a:p>
+            <a:pPr algn="ctr"/>
+            <a:r>
+              <a:rPr lang="es-ES" b="1" dirty="0"/>
+              <a:t>J</a:t>
+            </a:r>
+            <a:endParaRPr lang="es-CO" b="1" dirty="0"/>
+          </a:p>
+        </p:txBody>
+      </p:sp>
+      <p:sp>
+        <p:nvSpPr>
+          <p:cNvPr id="37" name="Elipse 36">
+            <a:extLst>
+              <a:ext uri="{FF2B5EF4-FFF2-40B4-BE49-F238E27FC236}">
+                <a16:creationId xmlns:a16="http://schemas.microsoft.com/office/drawing/2014/main" id="{CA097CDD-3A1B-484D-A8B8-449DDCB2B0F9}"/>
+              </a:ext>
+            </a:extLst>
+          </p:cNvPr>
+          <p:cNvSpPr/>
+          <p:nvPr/>
+        </p:nvSpPr>
+        <p:spPr>
+          <a:xfrm>
+            <a:off x="2155953" y="6051346"/>
+            <a:ext cx="719816" cy="702613"/>
+          </a:xfrm>
+          <a:prstGeom prst="ellipse">
+            <a:avLst/>
+          </a:prstGeom>
+          <a:solidFill>
+            <a:srgbClr val="59AFD5"/>
+          </a:solidFill>
+        </p:spPr>
+        <p:style>
+          <a:lnRef idx="2">
+            <a:schemeClr val="accent1">
+              <a:shade val="50000"/>
+            </a:schemeClr>
+          </a:lnRef>
+          <a:fillRef idx="1">
+            <a:schemeClr val="accent1"/>
+          </a:fillRef>
+          <a:effectRef idx="0">
+            <a:schemeClr val="accent1"/>
+          </a:effectRef>
+          <a:fontRef idx="minor">
+            <a:schemeClr val="lt1"/>
+          </a:fontRef>
+        </p:style>
+        <p:txBody>
+          <a:bodyPr rtlCol="0" anchor="ctr"/>
+          <a:lstStyle/>
+          <a:p>
+            <a:pPr algn="ctr"/>
+            <a:r>
               <a:rPr lang="es-CO" b="1" dirty="0"/>
               <a:t>FIN</a:t>
             </a:r>
+          </a:p>
+        </p:txBody>
+      </p:sp>
+      <p:sp>
+        <p:nvSpPr>
+          <p:cNvPr id="43" name="Elipse 42">
+            <a:extLst>
+              <a:ext uri="{FF2B5EF4-FFF2-40B4-BE49-F238E27FC236}">
+                <a16:creationId xmlns:a16="http://schemas.microsoft.com/office/drawing/2014/main" id="{1E222403-CC1D-4B4A-8CE7-309B15CA39B1}"/>
+              </a:ext>
+            </a:extLst>
+          </p:cNvPr>
+          <p:cNvSpPr/>
+          <p:nvPr/>
+        </p:nvSpPr>
+        <p:spPr>
+          <a:xfrm>
+            <a:off x="7174403" y="5501540"/>
+            <a:ext cx="386366" cy="412124"/>
+          </a:xfrm>
+          <a:prstGeom prst="ellipse">
+            <a:avLst/>
+          </a:prstGeom>
+          <a:solidFill>
+            <a:srgbClr val="59AFD5"/>
+          </a:solidFill>
+        </p:spPr>
+        <p:style>
+          <a:lnRef idx="2">
+            <a:schemeClr val="accent1">
+              <a:shade val="50000"/>
+            </a:schemeClr>
+          </a:lnRef>
+          <a:fillRef idx="1">
+            <a:schemeClr val="accent1"/>
+          </a:fillRef>
+          <a:effectRef idx="0">
+            <a:schemeClr val="accent1"/>
+          </a:effectRef>
+          <a:fontRef idx="minor">
+            <a:schemeClr val="lt1"/>
+          </a:fontRef>
+        </p:style>
+        <p:txBody>
+          <a:bodyPr rtlCol="0" anchor="ctr"/>
+          <a:lstStyle/>
+          <a:p>
+            <a:pPr algn="ctr"/>
+            <a:r>
+              <a:rPr lang="es-ES" b="1" dirty="0"/>
+              <a:t>K</a:t>
+            </a:r>
+            <a:endParaRPr lang="es-CO" b="1" dirty="0"/>
           </a:p>
         </p:txBody>
       </p:sp>
     </p:spTree>
     <p:extLst>
       <p:ext uri="{BB962C8B-B14F-4D97-AF65-F5344CB8AC3E}">
-        <p14:creationId xmlns:p14="http://schemas.microsoft.com/office/powerpoint/2010/main" val="187487109"/>
+        <p14:creationId xmlns:p14="http://schemas.microsoft.com/office/powerpoint/2010/main" val="1943764173"/>
       </p:ext>
     </p:extLst>
   </p:cSld>
@@ -12810,7 +13306,7 @@
 </p:sld>
 </file>
 
-<file path=ppt/slides/slide2.xml><?xml version="1.0" encoding="utf-8"?>
+<file path=ppt/slides/slide3.xml><?xml version="1.0" encoding="utf-8"?>
 <p:sld xmlns:a="http://schemas.openxmlformats.org/drawingml/2006/main" xmlns:r="http://schemas.openxmlformats.org/officeDocument/2006/relationships" xmlns:p="http://schemas.openxmlformats.org/presentationml/2006/main">
   <p:cSld>
     <p:spTree>
@@ -12841,7 +13337,7 @@
         </p:nvSpPr>
         <p:spPr>
           <a:xfrm>
-            <a:off x="2588738" y="520917"/>
+            <a:off x="1517069" y="308861"/>
             <a:ext cx="785610" cy="772731"/>
           </a:xfrm>
           <a:prstGeom prst="ellipse">
@@ -12881,10 +13377,10 @@
       </p:sp>
       <p:sp>
         <p:nvSpPr>
-          <p:cNvPr id="5" name="Elipse 4">
+          <p:cNvPr id="6" name="Elipse 5">
             <a:extLst>
               <a:ext uri="{FF2B5EF4-FFF2-40B4-BE49-F238E27FC236}">
-                <a16:creationId xmlns:a16="http://schemas.microsoft.com/office/drawing/2014/main" id="{59FA24D4-D244-4D4B-8D4D-DEE3A59D1F74}"/>
+                <a16:creationId xmlns:a16="http://schemas.microsoft.com/office/drawing/2014/main" id="{E36477F1-E99E-438C-A9A1-A778573B1636}"/>
               </a:ext>
             </a:extLst>
           </p:cNvPr>
@@ -12893,7 +13389,7 @@
         </p:nvSpPr>
         <p:spPr>
           <a:xfrm>
-            <a:off x="1408990" y="1441059"/>
+            <a:off x="9474715" y="5701207"/>
             <a:ext cx="785610" cy="772731"/>
           </a:xfrm>
           <a:prstGeom prst="ellipse">
@@ -12925,61 +13421,10 @@
           <a:p>
             <a:pPr algn="ctr"/>
             <a:r>
-              <a:rPr lang="es-CO" sz="3600" b="1" dirty="0"/>
-              <a:t>B</a:t>
+              <a:rPr lang="es-ES" sz="3600" b="1" dirty="0"/>
+              <a:t>K</a:t>
             </a:r>
-          </a:p>
-        </p:txBody>
-      </p:sp>
-      <p:sp>
-        <p:nvSpPr>
-          <p:cNvPr id="6" name="Elipse 5">
-            <a:extLst>
-              <a:ext uri="{FF2B5EF4-FFF2-40B4-BE49-F238E27FC236}">
-                <a16:creationId xmlns:a16="http://schemas.microsoft.com/office/drawing/2014/main" id="{E36477F1-E99E-438C-A9A1-A778573B1636}"/>
-              </a:ext>
-            </a:extLst>
-          </p:cNvPr>
-          <p:cNvSpPr/>
-          <p:nvPr/>
-        </p:nvSpPr>
-        <p:spPr>
-          <a:xfrm>
-            <a:off x="2627221" y="5454075"/>
-            <a:ext cx="785610" cy="772731"/>
-          </a:xfrm>
-          <a:prstGeom prst="ellipse">
-            <a:avLst/>
-          </a:prstGeom>
-          <a:solidFill>
-            <a:srgbClr val="59AFD5"/>
-          </a:solidFill>
-        </p:spPr>
-        <p:style>
-          <a:lnRef idx="2">
-            <a:schemeClr val="accent1">
-              <a:shade val="50000"/>
-            </a:schemeClr>
-          </a:lnRef>
-          <a:fillRef idx="1">
-            <a:schemeClr val="accent1"/>
-          </a:fillRef>
-          <a:effectRef idx="0">
-            <a:schemeClr val="accent1"/>
-          </a:effectRef>
-          <a:fontRef idx="minor">
-            <a:schemeClr val="lt1"/>
-          </a:fontRef>
-        </p:style>
-        <p:txBody>
-          <a:bodyPr rtlCol="0" anchor="ctr"/>
-          <a:lstStyle/>
-          <a:p>
-            <a:pPr algn="ctr"/>
-            <a:r>
-              <a:rPr lang="es-CO" sz="3600" b="1" dirty="0"/>
-              <a:t>F</a:t>
-            </a:r>
+            <a:endParaRPr lang="es-CO" sz="3600" b="1" dirty="0"/>
           </a:p>
         </p:txBody>
       </p:sp>
@@ -12997,7 +13442,7 @@
         </p:nvSpPr>
         <p:spPr>
           <a:xfrm>
-            <a:off x="3934514" y="384062"/>
+            <a:off x="3121081" y="185279"/>
             <a:ext cx="1191278" cy="1019896"/>
           </a:xfrm>
           <a:prstGeom prst="ellipse">
@@ -13035,386 +13480,6 @@
           </a:p>
         </p:txBody>
       </p:sp>
-      <p:sp>
-        <p:nvSpPr>
-          <p:cNvPr id="8" name="Elipse 7">
-            <a:extLst>
-              <a:ext uri="{FF2B5EF4-FFF2-40B4-BE49-F238E27FC236}">
-                <a16:creationId xmlns:a16="http://schemas.microsoft.com/office/drawing/2014/main" id="{CF7B74A8-B86E-4D8A-85DC-A3EBDC91F131}"/>
-              </a:ext>
-            </a:extLst>
-          </p:cNvPr>
-          <p:cNvSpPr/>
-          <p:nvPr/>
-        </p:nvSpPr>
-        <p:spPr>
-          <a:xfrm>
-            <a:off x="1408990" y="4607150"/>
-            <a:ext cx="785610" cy="772731"/>
-          </a:xfrm>
-          <a:prstGeom prst="ellipse">
-            <a:avLst/>
-          </a:prstGeom>
-          <a:solidFill>
-            <a:srgbClr val="59AFD5"/>
-          </a:solidFill>
-        </p:spPr>
-        <p:style>
-          <a:lnRef idx="2">
-            <a:schemeClr val="accent1">
-              <a:shade val="50000"/>
-            </a:schemeClr>
-          </a:lnRef>
-          <a:fillRef idx="1">
-            <a:schemeClr val="accent1"/>
-          </a:fillRef>
-          <a:effectRef idx="0">
-            <a:schemeClr val="accent1"/>
-          </a:effectRef>
-          <a:fontRef idx="minor">
-            <a:schemeClr val="lt1"/>
-          </a:fontRef>
-        </p:style>
-        <p:txBody>
-          <a:bodyPr rtlCol="0" anchor="ctr"/>
-          <a:lstStyle/>
-          <a:p>
-            <a:pPr algn="ctr"/>
-            <a:r>
-              <a:rPr lang="es-CO" sz="3600" b="1" dirty="0"/>
-              <a:t>G</a:t>
-            </a:r>
-          </a:p>
-        </p:txBody>
-      </p:sp>
-      <p:sp>
-        <p:nvSpPr>
-          <p:cNvPr id="9" name="Elipse 8">
-            <a:extLst>
-              <a:ext uri="{FF2B5EF4-FFF2-40B4-BE49-F238E27FC236}">
-                <a16:creationId xmlns:a16="http://schemas.microsoft.com/office/drawing/2014/main" id="{F2E05579-3A88-4EEB-B98B-FBB94F09813A}"/>
-              </a:ext>
-            </a:extLst>
-          </p:cNvPr>
-          <p:cNvSpPr/>
-          <p:nvPr/>
-        </p:nvSpPr>
-        <p:spPr>
-          <a:xfrm>
-            <a:off x="3934514" y="2913302"/>
-            <a:ext cx="785610" cy="772731"/>
-          </a:xfrm>
-          <a:prstGeom prst="ellipse">
-            <a:avLst/>
-          </a:prstGeom>
-          <a:solidFill>
-            <a:srgbClr val="59AFD5"/>
-          </a:solidFill>
-        </p:spPr>
-        <p:style>
-          <a:lnRef idx="2">
-            <a:schemeClr val="accent1">
-              <a:shade val="50000"/>
-            </a:schemeClr>
-          </a:lnRef>
-          <a:fillRef idx="1">
-            <a:schemeClr val="accent1"/>
-          </a:fillRef>
-          <a:effectRef idx="0">
-            <a:schemeClr val="accent1"/>
-          </a:effectRef>
-          <a:fontRef idx="minor">
-            <a:schemeClr val="lt1"/>
-          </a:fontRef>
-        </p:style>
-        <p:txBody>
-          <a:bodyPr rtlCol="0" anchor="ctr"/>
-          <a:lstStyle/>
-          <a:p>
-            <a:pPr algn="ctr"/>
-            <a:r>
-              <a:rPr lang="es-CO" sz="3600" b="1" dirty="0"/>
-              <a:t>D</a:t>
-            </a:r>
-          </a:p>
-        </p:txBody>
-      </p:sp>
-      <p:sp>
-        <p:nvSpPr>
-          <p:cNvPr id="10" name="Elipse 9">
-            <a:extLst>
-              <a:ext uri="{FF2B5EF4-FFF2-40B4-BE49-F238E27FC236}">
-                <a16:creationId xmlns:a16="http://schemas.microsoft.com/office/drawing/2014/main" id="{1A765EF9-FEA2-43B0-885A-5DA23772492A}"/>
-              </a:ext>
-            </a:extLst>
-          </p:cNvPr>
-          <p:cNvSpPr/>
-          <p:nvPr/>
-        </p:nvSpPr>
-        <p:spPr>
-          <a:xfrm>
-            <a:off x="2625632" y="3760227"/>
-            <a:ext cx="785610" cy="772731"/>
-          </a:xfrm>
-          <a:prstGeom prst="ellipse">
-            <a:avLst/>
-          </a:prstGeom>
-          <a:solidFill>
-            <a:srgbClr val="59AFD5"/>
-          </a:solidFill>
-        </p:spPr>
-        <p:style>
-          <a:lnRef idx="2">
-            <a:schemeClr val="accent1">
-              <a:shade val="50000"/>
-            </a:schemeClr>
-          </a:lnRef>
-          <a:fillRef idx="1">
-            <a:schemeClr val="accent1"/>
-          </a:fillRef>
-          <a:effectRef idx="0">
-            <a:schemeClr val="accent1"/>
-          </a:effectRef>
-          <a:fontRef idx="minor">
-            <a:schemeClr val="lt1"/>
-          </a:fontRef>
-        </p:style>
-        <p:txBody>
-          <a:bodyPr rtlCol="0" anchor="ctr"/>
-          <a:lstStyle/>
-          <a:p>
-            <a:pPr algn="ctr"/>
-            <a:r>
-              <a:rPr lang="es-CO" sz="3600" b="1" dirty="0"/>
-              <a:t>E</a:t>
-            </a:r>
-          </a:p>
-        </p:txBody>
-      </p:sp>
-      <p:sp>
-        <p:nvSpPr>
-          <p:cNvPr id="11" name="Elipse 10">
-            <a:extLst>
-              <a:ext uri="{FF2B5EF4-FFF2-40B4-BE49-F238E27FC236}">
-                <a16:creationId xmlns:a16="http://schemas.microsoft.com/office/drawing/2014/main" id="{1ABF6033-3E97-4BD6-AAC2-9603DE17F7C7}"/>
-              </a:ext>
-            </a:extLst>
-          </p:cNvPr>
-          <p:cNvSpPr/>
-          <p:nvPr/>
-        </p:nvSpPr>
-        <p:spPr>
-          <a:xfrm>
-            <a:off x="2591405" y="2066379"/>
-            <a:ext cx="785610" cy="772731"/>
-          </a:xfrm>
-          <a:prstGeom prst="ellipse">
-            <a:avLst/>
-          </a:prstGeom>
-          <a:solidFill>
-            <a:srgbClr val="59AFD5"/>
-          </a:solidFill>
-        </p:spPr>
-        <p:style>
-          <a:lnRef idx="2">
-            <a:schemeClr val="accent1">
-              <a:shade val="50000"/>
-            </a:schemeClr>
-          </a:lnRef>
-          <a:fillRef idx="1">
-            <a:schemeClr val="accent1"/>
-          </a:fillRef>
-          <a:effectRef idx="0">
-            <a:schemeClr val="accent1"/>
-          </a:effectRef>
-          <a:fontRef idx="minor">
-            <a:schemeClr val="lt1"/>
-          </a:fontRef>
-        </p:style>
-        <p:txBody>
-          <a:bodyPr rtlCol="0" anchor="ctr"/>
-          <a:lstStyle/>
-          <a:p>
-            <a:pPr algn="ctr"/>
-            <a:r>
-              <a:rPr lang="es-CO" sz="3600" b="1" dirty="0"/>
-              <a:t>C</a:t>
-            </a:r>
-          </a:p>
-        </p:txBody>
-      </p:sp>
-      <p:cxnSp>
-        <p:nvCxnSpPr>
-          <p:cNvPr id="12" name="Conector recto de flecha 11">
-            <a:extLst>
-              <a:ext uri="{FF2B5EF4-FFF2-40B4-BE49-F238E27FC236}">
-                <a16:creationId xmlns:a16="http://schemas.microsoft.com/office/drawing/2014/main" id="{D11908C1-71DE-4720-AD8A-CEB39AF9C00D}"/>
-              </a:ext>
-            </a:extLst>
-          </p:cNvPr>
-          <p:cNvCxnSpPr>
-            <a:cxnSpLocks/>
-            <a:stCxn id="4" idx="3"/>
-            <a:endCxn id="5" idx="7"/>
-          </p:cNvCxnSpPr>
-          <p:nvPr/>
-        </p:nvCxnSpPr>
-        <p:spPr>
-          <a:xfrm flipH="1">
-            <a:off x="2079550" y="1180484"/>
-            <a:ext cx="624238" cy="373739"/>
-          </a:xfrm>
-          <a:prstGeom prst="straightConnector1">
-            <a:avLst/>
-          </a:prstGeom>
-          <a:ln w="57150">
-            <a:tailEnd type="triangle"/>
-          </a:ln>
-        </p:spPr>
-        <p:style>
-          <a:lnRef idx="1">
-            <a:schemeClr val="accent1"/>
-          </a:lnRef>
-          <a:fillRef idx="0">
-            <a:schemeClr val="accent1"/>
-          </a:fillRef>
-          <a:effectRef idx="0">
-            <a:schemeClr val="accent1"/>
-          </a:effectRef>
-          <a:fontRef idx="minor">
-            <a:schemeClr val="tx1"/>
-          </a:fontRef>
-        </p:style>
-      </p:cxnSp>
-      <p:cxnSp>
-        <p:nvCxnSpPr>
-          <p:cNvPr id="13" name="Conector recto de flecha 12">
-            <a:extLst>
-              <a:ext uri="{FF2B5EF4-FFF2-40B4-BE49-F238E27FC236}">
-                <a16:creationId xmlns:a16="http://schemas.microsoft.com/office/drawing/2014/main" id="{9BE40026-E216-47FC-95E5-FA6BF5C1451A}"/>
-              </a:ext>
-            </a:extLst>
-          </p:cNvPr>
-          <p:cNvCxnSpPr>
-            <a:cxnSpLocks/>
-            <a:stCxn id="11" idx="4"/>
-            <a:endCxn id="10" idx="0"/>
-          </p:cNvCxnSpPr>
-          <p:nvPr/>
-        </p:nvCxnSpPr>
-        <p:spPr>
-          <a:xfrm>
-            <a:off x="2984210" y="2839110"/>
-            <a:ext cx="34227" cy="921117"/>
-          </a:xfrm>
-          <a:prstGeom prst="straightConnector1">
-            <a:avLst/>
-          </a:prstGeom>
-          <a:ln w="57150">
-            <a:tailEnd type="triangle"/>
-          </a:ln>
-        </p:spPr>
-        <p:style>
-          <a:lnRef idx="1">
-            <a:schemeClr val="accent1"/>
-          </a:lnRef>
-          <a:fillRef idx="0">
-            <a:schemeClr val="accent1"/>
-          </a:fillRef>
-          <a:effectRef idx="0">
-            <a:schemeClr val="accent1"/>
-          </a:effectRef>
-          <a:fontRef idx="minor">
-            <a:schemeClr val="tx1"/>
-          </a:fontRef>
-        </p:style>
-      </p:cxnSp>
-      <p:cxnSp>
-        <p:nvCxnSpPr>
-          <p:cNvPr id="14" name="Conector recto de flecha 13">
-            <a:extLst>
-              <a:ext uri="{FF2B5EF4-FFF2-40B4-BE49-F238E27FC236}">
-                <a16:creationId xmlns:a16="http://schemas.microsoft.com/office/drawing/2014/main" id="{C41BF827-9DC6-415F-88D8-9CD975CC70D8}"/>
-              </a:ext>
-            </a:extLst>
-          </p:cNvPr>
-          <p:cNvCxnSpPr>
-            <a:cxnSpLocks/>
-            <a:stCxn id="11" idx="5"/>
-            <a:endCxn id="9" idx="1"/>
-          </p:cNvCxnSpPr>
-          <p:nvPr/>
-        </p:nvCxnSpPr>
-        <p:spPr>
-          <a:xfrm>
-            <a:off x="3261965" y="2725946"/>
-            <a:ext cx="787599" cy="300520"/>
-          </a:xfrm>
-          <a:prstGeom prst="straightConnector1">
-            <a:avLst/>
-          </a:prstGeom>
-          <a:ln w="57150">
-            <a:tailEnd type="triangle"/>
-          </a:ln>
-        </p:spPr>
-        <p:style>
-          <a:lnRef idx="1">
-            <a:schemeClr val="accent1"/>
-          </a:lnRef>
-          <a:fillRef idx="0">
-            <a:schemeClr val="accent1"/>
-          </a:fillRef>
-          <a:effectRef idx="0">
-            <a:schemeClr val="accent1"/>
-          </a:effectRef>
-          <a:fontRef idx="minor">
-            <a:schemeClr val="tx1"/>
-          </a:fontRef>
-        </p:style>
-      </p:cxnSp>
-      <p:cxnSp>
-        <p:nvCxnSpPr>
-          <p:cNvPr id="15" name="Conector recto de flecha 14">
-            <a:extLst>
-              <a:ext uri="{FF2B5EF4-FFF2-40B4-BE49-F238E27FC236}">
-                <a16:creationId xmlns:a16="http://schemas.microsoft.com/office/drawing/2014/main" id="{1D2393EC-7A67-4C4C-8FA1-6CB522189BE9}"/>
-              </a:ext>
-            </a:extLst>
-          </p:cNvPr>
-          <p:cNvCxnSpPr>
-            <a:cxnSpLocks/>
-            <a:stCxn id="4" idx="4"/>
-            <a:endCxn id="11" idx="0"/>
-          </p:cNvCxnSpPr>
-          <p:nvPr/>
-        </p:nvCxnSpPr>
-        <p:spPr>
-          <a:xfrm>
-            <a:off x="2981543" y="1293648"/>
-            <a:ext cx="2667" cy="772731"/>
-          </a:xfrm>
-          <a:prstGeom prst="straightConnector1">
-            <a:avLst/>
-          </a:prstGeom>
-          <a:ln w="57150">
-            <a:tailEnd type="triangle"/>
-          </a:ln>
-        </p:spPr>
-        <p:style>
-          <a:lnRef idx="1">
-            <a:schemeClr val="accent1"/>
-          </a:lnRef>
-          <a:fillRef idx="0">
-            <a:schemeClr val="accent1"/>
-          </a:fillRef>
-          <a:effectRef idx="0">
-            <a:schemeClr val="accent1"/>
-          </a:effectRef>
-          <a:fontRef idx="minor">
-            <a:schemeClr val="tx1"/>
-          </a:fontRef>
-        </p:style>
-      </p:cxnSp>
       <p:cxnSp>
         <p:nvCxnSpPr>
           <p:cNvPr id="16" name="Conector recto de flecha 15">
@@ -13432,95 +13497,9 @@
           <p:nvPr/>
         </p:nvCxnSpPr>
         <p:spPr>
-          <a:xfrm flipV="1">
-            <a:off x="3374348" y="894010"/>
-            <a:ext cx="560166" cy="13273"/>
-          </a:xfrm>
-          <a:prstGeom prst="straightConnector1">
-            <a:avLst/>
-          </a:prstGeom>
-          <a:ln w="57150">
-            <a:tailEnd type="triangle"/>
-          </a:ln>
-        </p:spPr>
-        <p:style>
-          <a:lnRef idx="1">
-            <a:schemeClr val="accent1"/>
-          </a:lnRef>
-          <a:fillRef idx="0">
-            <a:schemeClr val="accent1"/>
-          </a:fillRef>
-          <a:effectRef idx="0">
-            <a:schemeClr val="accent1"/>
-          </a:effectRef>
-          <a:fontRef idx="minor">
-            <a:schemeClr val="tx1"/>
-          </a:fontRef>
-        </p:style>
-      </p:cxnSp>
-      <p:cxnSp>
-        <p:nvCxnSpPr>
-          <p:cNvPr id="17" name="Conector recto de flecha 16">
-            <a:extLst>
-              <a:ext uri="{FF2B5EF4-FFF2-40B4-BE49-F238E27FC236}">
-                <a16:creationId xmlns:a16="http://schemas.microsoft.com/office/drawing/2014/main" id="{D769B66B-99F0-4175-B3D9-DC0D53424858}"/>
-              </a:ext>
-            </a:extLst>
-          </p:cNvPr>
-          <p:cNvCxnSpPr>
-            <a:cxnSpLocks/>
-            <a:stCxn id="10" idx="4"/>
-            <a:endCxn id="6" idx="0"/>
-          </p:cNvCxnSpPr>
-          <p:nvPr/>
-        </p:nvCxnSpPr>
-        <p:spPr>
           <a:xfrm>
-            <a:off x="3018437" y="4532958"/>
-            <a:ext cx="1589" cy="921117"/>
-          </a:xfrm>
-          <a:prstGeom prst="straightConnector1">
-            <a:avLst/>
-          </a:prstGeom>
-          <a:ln w="57150">
-            <a:tailEnd type="triangle"/>
-          </a:ln>
-        </p:spPr>
-        <p:style>
-          <a:lnRef idx="1">
-            <a:schemeClr val="accent1"/>
-          </a:lnRef>
-          <a:fillRef idx="0">
-            <a:schemeClr val="accent1"/>
-          </a:fillRef>
-          <a:effectRef idx="0">
-            <a:schemeClr val="accent1"/>
-          </a:effectRef>
-          <a:fontRef idx="minor">
-            <a:schemeClr val="tx1"/>
-          </a:fontRef>
-        </p:style>
-      </p:cxnSp>
-      <p:cxnSp>
-        <p:nvCxnSpPr>
-          <p:cNvPr id="18" name="Conector recto de flecha 17">
-            <a:extLst>
-              <a:ext uri="{FF2B5EF4-FFF2-40B4-BE49-F238E27FC236}">
-                <a16:creationId xmlns:a16="http://schemas.microsoft.com/office/drawing/2014/main" id="{B966A150-5A23-4E16-B8A7-73ABA89BF761}"/>
-              </a:ext>
-            </a:extLst>
-          </p:cNvPr>
-          <p:cNvCxnSpPr>
-            <a:cxnSpLocks/>
-            <a:stCxn id="10" idx="3"/>
-            <a:endCxn id="8" idx="7"/>
-          </p:cNvCxnSpPr>
-          <p:nvPr/>
-        </p:nvCxnSpPr>
-        <p:spPr>
-          <a:xfrm flipH="1">
-            <a:off x="2079550" y="4419794"/>
-            <a:ext cx="661132" cy="300520"/>
+            <a:off x="2302679" y="695227"/>
+            <a:ext cx="818402" cy="0"/>
           </a:xfrm>
           <a:prstGeom prst="straightConnector1">
             <a:avLst/>
@@ -13562,13 +13541,13 @@
         </p:nvCxnSpPr>
         <p:spPr>
           <a:xfrm rot="5400000" flipH="1">
-            <a:off x="144620" y="3351401"/>
-            <a:ext cx="5319523" cy="431288"/>
+            <a:off x="2802939" y="-590642"/>
+            <a:ext cx="5778711" cy="8350451"/>
           </a:xfrm>
           <a:prstGeom prst="bentConnector4">
             <a:avLst>
-              <a:gd name="adj1" fmla="val -4297"/>
-              <a:gd name="adj2" fmla="val 469534"/>
+              <a:gd name="adj1" fmla="val -3956"/>
+              <a:gd name="adj2" fmla="val 102738"/>
             </a:avLst>
           </a:prstGeom>
           <a:ln w="57150">
@@ -13590,26 +13569,186 @@
           </a:fontRef>
         </p:style>
       </p:cxnSp>
+      <p:sp>
+        <p:nvSpPr>
+          <p:cNvPr id="27" name="CuadroTexto 26">
+            <a:extLst>
+              <a:ext uri="{FF2B5EF4-FFF2-40B4-BE49-F238E27FC236}">
+                <a16:creationId xmlns:a16="http://schemas.microsoft.com/office/drawing/2014/main" id="{20C54CF5-A29B-4917-94D6-F41CA8DFE1AC}"/>
+              </a:ext>
+            </a:extLst>
+          </p:cNvPr>
+          <p:cNvSpPr txBox="1"/>
+          <p:nvPr/>
+        </p:nvSpPr>
+        <p:spPr>
+          <a:xfrm>
+            <a:off x="5383370" y="384062"/>
+            <a:ext cx="5933987" cy="523220"/>
+          </a:xfrm>
+          <a:prstGeom prst="rect">
+            <a:avLst/>
+          </a:prstGeom>
+        </p:spPr>
+        <p:style>
+          <a:lnRef idx="0">
+            <a:schemeClr val="accent2"/>
+          </a:lnRef>
+          <a:fillRef idx="3">
+            <a:schemeClr val="accent2"/>
+          </a:fillRef>
+          <a:effectRef idx="3">
+            <a:schemeClr val="accent2"/>
+          </a:effectRef>
+          <a:fontRef idx="minor">
+            <a:schemeClr val="lt1"/>
+          </a:fontRef>
+        </p:style>
+        <p:txBody>
+          <a:bodyPr wrap="square" rtlCol="0">
+            <a:spAutoFit/>
+          </a:bodyPr>
+          <a:lstStyle/>
+          <a:p>
+            <a:r>
+              <a:rPr lang="es-CO" sz="2800" b="1" dirty="0">
+                <a:solidFill>
+                  <a:schemeClr val="tx1">
+                    <a:lumMod val="95000"/>
+                  </a:schemeClr>
+                </a:solidFill>
+              </a:rPr>
+              <a:t>V(Registro Cliente) = 17 – 12 + 2 = 7</a:t>
+            </a:r>
+          </a:p>
+        </p:txBody>
+      </p:sp>
+      <p:sp>
+        <p:nvSpPr>
+          <p:cNvPr id="2" name="Elipse 1">
+            <a:extLst>
+              <a:ext uri="{FF2B5EF4-FFF2-40B4-BE49-F238E27FC236}">
+                <a16:creationId xmlns:a16="http://schemas.microsoft.com/office/drawing/2014/main" id="{4ADBCD03-6A7E-426D-9E63-04E919C84375}"/>
+              </a:ext>
+            </a:extLst>
+          </p:cNvPr>
+          <p:cNvSpPr/>
+          <p:nvPr/>
+        </p:nvSpPr>
+        <p:spPr>
+          <a:xfrm>
+            <a:off x="3161912" y="1589624"/>
+            <a:ext cx="785610" cy="772731"/>
+          </a:xfrm>
+          <a:prstGeom prst="ellipse">
+            <a:avLst/>
+          </a:prstGeom>
+          <a:solidFill>
+            <a:srgbClr val="59AFD5"/>
+          </a:solidFill>
+        </p:spPr>
+        <p:style>
+          <a:lnRef idx="2">
+            <a:schemeClr val="accent1">
+              <a:shade val="50000"/>
+            </a:schemeClr>
+          </a:lnRef>
+          <a:fillRef idx="1">
+            <a:schemeClr val="accent1"/>
+          </a:fillRef>
+          <a:effectRef idx="0">
+            <a:schemeClr val="accent1"/>
+          </a:effectRef>
+          <a:fontRef idx="minor">
+            <a:schemeClr val="lt1"/>
+          </a:fontRef>
+        </p:style>
+        <p:txBody>
+          <a:bodyPr rtlCol="0" anchor="ctr"/>
+          <a:lstStyle/>
+          <a:p>
+            <a:pPr algn="ctr"/>
+            <a:r>
+              <a:rPr lang="es-ES" sz="3600" b="1" dirty="0"/>
+              <a:t>C</a:t>
+            </a:r>
+            <a:endParaRPr lang="es-CO" sz="3600" b="1" dirty="0"/>
+          </a:p>
+        </p:txBody>
+      </p:sp>
+      <p:sp>
+        <p:nvSpPr>
+          <p:cNvPr id="26" name="Elipse 25">
+            <a:extLst>
+              <a:ext uri="{FF2B5EF4-FFF2-40B4-BE49-F238E27FC236}">
+                <a16:creationId xmlns:a16="http://schemas.microsoft.com/office/drawing/2014/main" id="{F26B5301-1536-4150-9DFB-7654CE3D6AFF}"/>
+              </a:ext>
+            </a:extLst>
+          </p:cNvPr>
+          <p:cNvSpPr/>
+          <p:nvPr/>
+        </p:nvSpPr>
+        <p:spPr>
+          <a:xfrm>
+            <a:off x="1657077" y="2037907"/>
+            <a:ext cx="785610" cy="772731"/>
+          </a:xfrm>
+          <a:prstGeom prst="ellipse">
+            <a:avLst/>
+          </a:prstGeom>
+          <a:solidFill>
+            <a:srgbClr val="59AFD5"/>
+          </a:solidFill>
+        </p:spPr>
+        <p:style>
+          <a:lnRef idx="2">
+            <a:schemeClr val="accent1">
+              <a:shade val="50000"/>
+            </a:schemeClr>
+          </a:lnRef>
+          <a:fillRef idx="1">
+            <a:schemeClr val="accent1"/>
+          </a:fillRef>
+          <a:effectRef idx="0">
+            <a:schemeClr val="accent1"/>
+          </a:effectRef>
+          <a:fontRef idx="minor">
+            <a:schemeClr val="lt1"/>
+          </a:fontRef>
+        </p:style>
+        <p:txBody>
+          <a:bodyPr rtlCol="0" anchor="ctr"/>
+          <a:lstStyle/>
+          <a:p>
+            <a:pPr algn="ctr"/>
+            <a:r>
+              <a:rPr lang="es-ES" sz="3600" b="1" dirty="0"/>
+              <a:t>B</a:t>
+            </a:r>
+            <a:endParaRPr lang="es-CO" sz="3600" b="1" dirty="0"/>
+          </a:p>
+        </p:txBody>
+      </p:sp>
       <p:cxnSp>
         <p:nvCxnSpPr>
-          <p:cNvPr id="20" name="Conector recto de flecha 19">
+          <p:cNvPr id="47" name="Conector recto de flecha 46">
             <a:extLst>
               <a:ext uri="{FF2B5EF4-FFF2-40B4-BE49-F238E27FC236}">
-                <a16:creationId xmlns:a16="http://schemas.microsoft.com/office/drawing/2014/main" id="{18D4391E-BDFD-4A8A-9388-6CADB336AE7C}"/>
+                <a16:creationId xmlns:a16="http://schemas.microsoft.com/office/drawing/2014/main" id="{13219820-62D4-4B5B-87D7-1E944F72B6FD}"/>
               </a:ext>
             </a:extLst>
           </p:cNvPr>
           <p:cNvCxnSpPr>
             <a:cxnSpLocks/>
-            <a:stCxn id="9" idx="3"/>
-            <a:endCxn id="10" idx="7"/>
+            <a:stCxn id="4" idx="5"/>
+            <a:endCxn id="2" idx="1"/>
           </p:cNvCxnSpPr>
           <p:nvPr/>
         </p:nvCxnSpPr>
         <p:spPr>
-          <a:xfrm flipH="1">
-            <a:off x="3296192" y="3572869"/>
-            <a:ext cx="753372" cy="300522"/>
+          <a:xfrm>
+            <a:off x="2187629" y="968428"/>
+            <a:ext cx="1089333" cy="734360"/>
           </a:xfrm>
           <a:prstGeom prst="straightConnector1">
             <a:avLst/>
@@ -13635,24 +13774,24 @@
       </p:cxnSp>
       <p:cxnSp>
         <p:nvCxnSpPr>
-          <p:cNvPr id="21" name="Conector recto de flecha 20">
+          <p:cNvPr id="50" name="Conector recto de flecha 49">
             <a:extLst>
               <a:ext uri="{FF2B5EF4-FFF2-40B4-BE49-F238E27FC236}">
-                <a16:creationId xmlns:a16="http://schemas.microsoft.com/office/drawing/2014/main" id="{36F04BAB-16F5-430F-8565-263F6420E05C}"/>
+                <a16:creationId xmlns:a16="http://schemas.microsoft.com/office/drawing/2014/main" id="{C81A098B-8973-4851-96C3-C0A06C14E3A3}"/>
               </a:ext>
             </a:extLst>
           </p:cNvPr>
           <p:cNvCxnSpPr>
             <a:cxnSpLocks/>
-            <a:stCxn id="5" idx="6"/>
-            <a:endCxn id="11" idx="1"/>
+            <a:stCxn id="4" idx="4"/>
+            <a:endCxn id="26" idx="0"/>
           </p:cNvCxnSpPr>
           <p:nvPr/>
         </p:nvCxnSpPr>
         <p:spPr>
           <a:xfrm>
-            <a:off x="2194600" y="1827425"/>
-            <a:ext cx="511855" cy="352118"/>
+            <a:off x="1909874" y="1081592"/>
+            <a:ext cx="140008" cy="956315"/>
           </a:xfrm>
           <a:prstGeom prst="straightConnector1">
             <a:avLst/>
@@ -13678,24 +13817,22 @@
       </p:cxnSp>
       <p:cxnSp>
         <p:nvCxnSpPr>
-          <p:cNvPr id="22" name="Conector recto de flecha 21">
+          <p:cNvPr id="55" name="Conector recto de flecha 54">
             <a:extLst>
               <a:ext uri="{FF2B5EF4-FFF2-40B4-BE49-F238E27FC236}">
-                <a16:creationId xmlns:a16="http://schemas.microsoft.com/office/drawing/2014/main" id="{9401EFDA-A0B6-42EB-A028-2965C8DC2460}"/>
+                <a16:creationId xmlns:a16="http://schemas.microsoft.com/office/drawing/2014/main" id="{CFEB8D81-F81F-4E52-9F80-597CE554BA94}"/>
               </a:ext>
             </a:extLst>
           </p:cNvPr>
           <p:cNvCxnSpPr>
             <a:cxnSpLocks/>
-            <a:stCxn id="8" idx="5"/>
-            <a:endCxn id="6" idx="1"/>
           </p:cNvCxnSpPr>
           <p:nvPr/>
         </p:nvCxnSpPr>
         <p:spPr>
-          <a:xfrm>
-            <a:off x="2079550" y="5266717"/>
-            <a:ext cx="662721" cy="300522"/>
+          <a:xfrm flipV="1">
+            <a:off x="2455227" y="2105696"/>
+            <a:ext cx="773069" cy="212640"/>
           </a:xfrm>
           <a:prstGeom prst="straightConnector1">
             <a:avLst/>
@@ -13721,10 +13858,757 @@
       </p:cxnSp>
       <p:sp>
         <p:nvSpPr>
-          <p:cNvPr id="27" name="CuadroTexto 26">
+          <p:cNvPr id="61" name="Elipse 60">
             <a:extLst>
               <a:ext uri="{FF2B5EF4-FFF2-40B4-BE49-F238E27FC236}">
-                <a16:creationId xmlns:a16="http://schemas.microsoft.com/office/drawing/2014/main" id="{20C54CF5-A29B-4917-94D6-F41CA8DFE1AC}"/>
+                <a16:creationId xmlns:a16="http://schemas.microsoft.com/office/drawing/2014/main" id="{0CDFB850-BD8A-4723-9C50-8266F7FB16A9}"/>
+              </a:ext>
+            </a:extLst>
+          </p:cNvPr>
+          <p:cNvSpPr/>
+          <p:nvPr/>
+        </p:nvSpPr>
+        <p:spPr>
+          <a:xfrm>
+            <a:off x="4570030" y="2622559"/>
+            <a:ext cx="785610" cy="772731"/>
+          </a:xfrm>
+          <a:prstGeom prst="ellipse">
+            <a:avLst/>
+          </a:prstGeom>
+          <a:solidFill>
+            <a:srgbClr val="59AFD5"/>
+          </a:solidFill>
+        </p:spPr>
+        <p:style>
+          <a:lnRef idx="2">
+            <a:schemeClr val="accent1">
+              <a:shade val="50000"/>
+            </a:schemeClr>
+          </a:lnRef>
+          <a:fillRef idx="1">
+            <a:schemeClr val="accent1"/>
+          </a:fillRef>
+          <a:effectRef idx="0">
+            <a:schemeClr val="accent1"/>
+          </a:effectRef>
+          <a:fontRef idx="minor">
+            <a:schemeClr val="lt1"/>
+          </a:fontRef>
+        </p:style>
+        <p:txBody>
+          <a:bodyPr rtlCol="0" anchor="ctr"/>
+          <a:lstStyle/>
+          <a:p>
+            <a:pPr algn="ctr"/>
+            <a:r>
+              <a:rPr lang="es-ES" sz="3600" b="1" dirty="0"/>
+              <a:t>E</a:t>
+            </a:r>
+            <a:endParaRPr lang="es-CO" sz="3600" b="1" dirty="0"/>
+          </a:p>
+        </p:txBody>
+      </p:sp>
+      <p:sp>
+        <p:nvSpPr>
+          <p:cNvPr id="62" name="Elipse 61">
+            <a:extLst>
+              <a:ext uri="{FF2B5EF4-FFF2-40B4-BE49-F238E27FC236}">
+                <a16:creationId xmlns:a16="http://schemas.microsoft.com/office/drawing/2014/main" id="{E0EE9E57-1B40-4345-8476-059503705284}"/>
+              </a:ext>
+            </a:extLst>
+          </p:cNvPr>
+          <p:cNvSpPr/>
+          <p:nvPr/>
+        </p:nvSpPr>
+        <p:spPr>
+          <a:xfrm>
+            <a:off x="4540460" y="1089503"/>
+            <a:ext cx="785610" cy="772731"/>
+          </a:xfrm>
+          <a:prstGeom prst="ellipse">
+            <a:avLst/>
+          </a:prstGeom>
+          <a:solidFill>
+            <a:srgbClr val="59AFD5"/>
+          </a:solidFill>
+        </p:spPr>
+        <p:style>
+          <a:lnRef idx="2">
+            <a:schemeClr val="accent1">
+              <a:shade val="50000"/>
+            </a:schemeClr>
+          </a:lnRef>
+          <a:fillRef idx="1">
+            <a:schemeClr val="accent1"/>
+          </a:fillRef>
+          <a:effectRef idx="0">
+            <a:schemeClr val="accent1"/>
+          </a:effectRef>
+          <a:fontRef idx="minor">
+            <a:schemeClr val="lt1"/>
+          </a:fontRef>
+        </p:style>
+        <p:txBody>
+          <a:bodyPr rtlCol="0" anchor="ctr"/>
+          <a:lstStyle/>
+          <a:p>
+            <a:pPr algn="ctr"/>
+            <a:r>
+              <a:rPr lang="es-ES" sz="3600" b="1" dirty="0"/>
+              <a:t>D</a:t>
+            </a:r>
+            <a:endParaRPr lang="es-CO" sz="3600" b="1" dirty="0"/>
+          </a:p>
+        </p:txBody>
+      </p:sp>
+      <p:cxnSp>
+        <p:nvCxnSpPr>
+          <p:cNvPr id="63" name="Conector recto de flecha 62">
+            <a:extLst>
+              <a:ext uri="{FF2B5EF4-FFF2-40B4-BE49-F238E27FC236}">
+                <a16:creationId xmlns:a16="http://schemas.microsoft.com/office/drawing/2014/main" id="{6AD11482-8C16-4B61-AD76-2A93B7838AF3}"/>
+              </a:ext>
+            </a:extLst>
+          </p:cNvPr>
+          <p:cNvCxnSpPr>
+            <a:cxnSpLocks/>
+            <a:stCxn id="2" idx="5"/>
+            <a:endCxn id="61" idx="1"/>
+          </p:cNvCxnSpPr>
+          <p:nvPr/>
+        </p:nvCxnSpPr>
+        <p:spPr>
+          <a:xfrm>
+            <a:off x="3832472" y="2249191"/>
+            <a:ext cx="852608" cy="486532"/>
+          </a:xfrm>
+          <a:prstGeom prst="straightConnector1">
+            <a:avLst/>
+          </a:prstGeom>
+          <a:ln w="57150">
+            <a:tailEnd type="triangle"/>
+          </a:ln>
+        </p:spPr>
+        <p:style>
+          <a:lnRef idx="1">
+            <a:schemeClr val="accent1"/>
+          </a:lnRef>
+          <a:fillRef idx="0">
+            <a:schemeClr val="accent1"/>
+          </a:fillRef>
+          <a:effectRef idx="0">
+            <a:schemeClr val="accent1"/>
+          </a:effectRef>
+          <a:fontRef idx="minor">
+            <a:schemeClr val="tx1"/>
+          </a:fontRef>
+        </p:style>
+      </p:cxnSp>
+      <p:cxnSp>
+        <p:nvCxnSpPr>
+          <p:cNvPr id="64" name="Conector recto de flecha 63">
+            <a:extLst>
+              <a:ext uri="{FF2B5EF4-FFF2-40B4-BE49-F238E27FC236}">
+                <a16:creationId xmlns:a16="http://schemas.microsoft.com/office/drawing/2014/main" id="{8CC860F1-F21A-4259-9493-4213A8396B2B}"/>
+              </a:ext>
+            </a:extLst>
+          </p:cNvPr>
+          <p:cNvCxnSpPr>
+            <a:cxnSpLocks/>
+            <a:stCxn id="2" idx="7"/>
+            <a:endCxn id="62" idx="2"/>
+          </p:cNvCxnSpPr>
+          <p:nvPr/>
+        </p:nvCxnSpPr>
+        <p:spPr>
+          <a:xfrm flipV="1">
+            <a:off x="3832472" y="1475869"/>
+            <a:ext cx="707988" cy="226919"/>
+          </a:xfrm>
+          <a:prstGeom prst="straightConnector1">
+            <a:avLst/>
+          </a:prstGeom>
+          <a:ln w="57150">
+            <a:tailEnd type="triangle"/>
+          </a:ln>
+        </p:spPr>
+        <p:style>
+          <a:lnRef idx="1">
+            <a:schemeClr val="accent1"/>
+          </a:lnRef>
+          <a:fillRef idx="0">
+            <a:schemeClr val="accent1"/>
+          </a:fillRef>
+          <a:effectRef idx="0">
+            <a:schemeClr val="accent1"/>
+          </a:effectRef>
+          <a:fontRef idx="minor">
+            <a:schemeClr val="tx1"/>
+          </a:fontRef>
+        </p:style>
+      </p:cxnSp>
+      <p:cxnSp>
+        <p:nvCxnSpPr>
+          <p:cNvPr id="65" name="Conector recto de flecha 64">
+            <a:extLst>
+              <a:ext uri="{FF2B5EF4-FFF2-40B4-BE49-F238E27FC236}">
+                <a16:creationId xmlns:a16="http://schemas.microsoft.com/office/drawing/2014/main" id="{EE51E7A3-FEF4-48A1-A6A2-A1BA27B3BCEC}"/>
+              </a:ext>
+            </a:extLst>
+          </p:cNvPr>
+          <p:cNvCxnSpPr>
+            <a:cxnSpLocks/>
+            <a:stCxn id="62" idx="4"/>
+            <a:endCxn id="61" idx="0"/>
+          </p:cNvCxnSpPr>
+          <p:nvPr/>
+        </p:nvCxnSpPr>
+        <p:spPr>
+          <a:xfrm>
+            <a:off x="4933265" y="1862234"/>
+            <a:ext cx="29570" cy="760325"/>
+          </a:xfrm>
+          <a:prstGeom prst="straightConnector1">
+            <a:avLst/>
+          </a:prstGeom>
+          <a:ln w="57150">
+            <a:tailEnd type="triangle"/>
+          </a:ln>
+        </p:spPr>
+        <p:style>
+          <a:lnRef idx="1">
+            <a:schemeClr val="accent1"/>
+          </a:lnRef>
+          <a:fillRef idx="0">
+            <a:schemeClr val="accent1"/>
+          </a:fillRef>
+          <a:effectRef idx="0">
+            <a:schemeClr val="accent1"/>
+          </a:effectRef>
+          <a:fontRef idx="minor">
+            <a:schemeClr val="tx1"/>
+          </a:fontRef>
+        </p:style>
+      </p:cxnSp>
+      <p:sp>
+        <p:nvSpPr>
+          <p:cNvPr id="67" name="Elipse 66">
+            <a:extLst>
+              <a:ext uri="{FF2B5EF4-FFF2-40B4-BE49-F238E27FC236}">
+                <a16:creationId xmlns:a16="http://schemas.microsoft.com/office/drawing/2014/main" id="{03461D0D-787C-407D-A9F5-753190599C16}"/>
+              </a:ext>
+            </a:extLst>
+          </p:cNvPr>
+          <p:cNvSpPr/>
+          <p:nvPr/>
+        </p:nvSpPr>
+        <p:spPr>
+          <a:xfrm>
+            <a:off x="6071188" y="3539670"/>
+            <a:ext cx="785610" cy="772731"/>
+          </a:xfrm>
+          <a:prstGeom prst="ellipse">
+            <a:avLst/>
+          </a:prstGeom>
+          <a:solidFill>
+            <a:srgbClr val="59AFD5"/>
+          </a:solidFill>
+        </p:spPr>
+        <p:style>
+          <a:lnRef idx="2">
+            <a:schemeClr val="accent1">
+              <a:shade val="50000"/>
+            </a:schemeClr>
+          </a:lnRef>
+          <a:fillRef idx="1">
+            <a:schemeClr val="accent1"/>
+          </a:fillRef>
+          <a:effectRef idx="0">
+            <a:schemeClr val="accent1"/>
+          </a:effectRef>
+          <a:fontRef idx="minor">
+            <a:schemeClr val="lt1"/>
+          </a:fontRef>
+        </p:style>
+        <p:txBody>
+          <a:bodyPr rtlCol="0" anchor="ctr"/>
+          <a:lstStyle/>
+          <a:p>
+            <a:pPr algn="ctr"/>
+            <a:r>
+              <a:rPr lang="es-ES" sz="3600" b="1" dirty="0"/>
+              <a:t>G</a:t>
+            </a:r>
+            <a:endParaRPr lang="es-CO" sz="3600" b="1" dirty="0"/>
+          </a:p>
+        </p:txBody>
+      </p:sp>
+      <p:sp>
+        <p:nvSpPr>
+          <p:cNvPr id="68" name="Elipse 67">
+            <a:extLst>
+              <a:ext uri="{FF2B5EF4-FFF2-40B4-BE49-F238E27FC236}">
+                <a16:creationId xmlns:a16="http://schemas.microsoft.com/office/drawing/2014/main" id="{8C2232F5-D5B7-41F1-A930-4AFC03B28D74}"/>
+              </a:ext>
+            </a:extLst>
+          </p:cNvPr>
+          <p:cNvSpPr/>
+          <p:nvPr/>
+        </p:nvSpPr>
+        <p:spPr>
+          <a:xfrm>
+            <a:off x="4596449" y="4022827"/>
+            <a:ext cx="785610" cy="772731"/>
+          </a:xfrm>
+          <a:prstGeom prst="ellipse">
+            <a:avLst/>
+          </a:prstGeom>
+          <a:solidFill>
+            <a:srgbClr val="59AFD5"/>
+          </a:solidFill>
+        </p:spPr>
+        <p:style>
+          <a:lnRef idx="2">
+            <a:schemeClr val="accent1">
+              <a:shade val="50000"/>
+            </a:schemeClr>
+          </a:lnRef>
+          <a:fillRef idx="1">
+            <a:schemeClr val="accent1"/>
+          </a:fillRef>
+          <a:effectRef idx="0">
+            <a:schemeClr val="accent1"/>
+          </a:effectRef>
+          <a:fontRef idx="minor">
+            <a:schemeClr val="lt1"/>
+          </a:fontRef>
+        </p:style>
+        <p:txBody>
+          <a:bodyPr rtlCol="0" anchor="ctr"/>
+          <a:lstStyle/>
+          <a:p>
+            <a:pPr algn="ctr"/>
+            <a:r>
+              <a:rPr lang="es-ES" sz="3600" b="1" dirty="0"/>
+              <a:t>F</a:t>
+            </a:r>
+            <a:endParaRPr lang="es-CO" sz="3600" b="1" dirty="0"/>
+          </a:p>
+        </p:txBody>
+      </p:sp>
+      <p:cxnSp>
+        <p:nvCxnSpPr>
+          <p:cNvPr id="69" name="Conector recto de flecha 68">
+            <a:extLst>
+              <a:ext uri="{FF2B5EF4-FFF2-40B4-BE49-F238E27FC236}">
+                <a16:creationId xmlns:a16="http://schemas.microsoft.com/office/drawing/2014/main" id="{A22B4693-2491-46CF-B7DE-6B64EBC65C8D}"/>
+              </a:ext>
+            </a:extLst>
+          </p:cNvPr>
+          <p:cNvCxnSpPr>
+            <a:cxnSpLocks/>
+            <a:endCxn id="67" idx="1"/>
+          </p:cNvCxnSpPr>
+          <p:nvPr/>
+        </p:nvCxnSpPr>
+        <p:spPr>
+          <a:xfrm>
+            <a:off x="5356967" y="3203492"/>
+            <a:ext cx="829271" cy="449342"/>
+          </a:xfrm>
+          <a:prstGeom prst="straightConnector1">
+            <a:avLst/>
+          </a:prstGeom>
+          <a:ln w="57150">
+            <a:tailEnd type="triangle"/>
+          </a:ln>
+        </p:spPr>
+        <p:style>
+          <a:lnRef idx="1">
+            <a:schemeClr val="accent1"/>
+          </a:lnRef>
+          <a:fillRef idx="0">
+            <a:schemeClr val="accent1"/>
+          </a:fillRef>
+          <a:effectRef idx="0">
+            <a:schemeClr val="accent1"/>
+          </a:effectRef>
+          <a:fontRef idx="minor">
+            <a:schemeClr val="tx1"/>
+          </a:fontRef>
+        </p:style>
+      </p:cxnSp>
+      <p:cxnSp>
+        <p:nvCxnSpPr>
+          <p:cNvPr id="70" name="Conector recto de flecha 69">
+            <a:extLst>
+              <a:ext uri="{FF2B5EF4-FFF2-40B4-BE49-F238E27FC236}">
+                <a16:creationId xmlns:a16="http://schemas.microsoft.com/office/drawing/2014/main" id="{D822786F-297E-4CF5-8793-94B9F7C1E3AC}"/>
+              </a:ext>
+            </a:extLst>
+          </p:cNvPr>
+          <p:cNvCxnSpPr>
+            <a:cxnSpLocks/>
+            <a:stCxn id="61" idx="4"/>
+            <a:endCxn id="68" idx="0"/>
+          </p:cNvCxnSpPr>
+          <p:nvPr/>
+        </p:nvCxnSpPr>
+        <p:spPr>
+          <a:xfrm>
+            <a:off x="4962835" y="3395290"/>
+            <a:ext cx="26419" cy="627537"/>
+          </a:xfrm>
+          <a:prstGeom prst="straightConnector1">
+            <a:avLst/>
+          </a:prstGeom>
+          <a:ln w="57150">
+            <a:tailEnd type="triangle"/>
+          </a:ln>
+        </p:spPr>
+        <p:style>
+          <a:lnRef idx="1">
+            <a:schemeClr val="accent1"/>
+          </a:lnRef>
+          <a:fillRef idx="0">
+            <a:schemeClr val="accent1"/>
+          </a:fillRef>
+          <a:effectRef idx="0">
+            <a:schemeClr val="accent1"/>
+          </a:effectRef>
+          <a:fontRef idx="minor">
+            <a:schemeClr val="tx1"/>
+          </a:fontRef>
+        </p:style>
+      </p:cxnSp>
+      <p:cxnSp>
+        <p:nvCxnSpPr>
+          <p:cNvPr id="71" name="Conector recto de flecha 70">
+            <a:extLst>
+              <a:ext uri="{FF2B5EF4-FFF2-40B4-BE49-F238E27FC236}">
+                <a16:creationId xmlns:a16="http://schemas.microsoft.com/office/drawing/2014/main" id="{59341026-34A2-47E0-A417-1417406DB254}"/>
+              </a:ext>
+            </a:extLst>
+          </p:cNvPr>
+          <p:cNvCxnSpPr>
+            <a:cxnSpLocks/>
+            <a:stCxn id="68" idx="6"/>
+            <a:endCxn id="67" idx="3"/>
+          </p:cNvCxnSpPr>
+          <p:nvPr/>
+        </p:nvCxnSpPr>
+        <p:spPr>
+          <a:xfrm flipV="1">
+            <a:off x="5382059" y="4199237"/>
+            <a:ext cx="804179" cy="209956"/>
+          </a:xfrm>
+          <a:prstGeom prst="straightConnector1">
+            <a:avLst/>
+          </a:prstGeom>
+          <a:ln w="57150">
+            <a:tailEnd type="triangle"/>
+          </a:ln>
+        </p:spPr>
+        <p:style>
+          <a:lnRef idx="1">
+            <a:schemeClr val="accent1"/>
+          </a:lnRef>
+          <a:fillRef idx="0">
+            <a:schemeClr val="accent1"/>
+          </a:fillRef>
+          <a:effectRef idx="0">
+            <a:schemeClr val="accent1"/>
+          </a:effectRef>
+          <a:fontRef idx="minor">
+            <a:schemeClr val="tx1"/>
+          </a:fontRef>
+        </p:style>
+      </p:cxnSp>
+      <p:sp>
+        <p:nvSpPr>
+          <p:cNvPr id="72" name="Elipse 71">
+            <a:extLst>
+              <a:ext uri="{FF2B5EF4-FFF2-40B4-BE49-F238E27FC236}">
+                <a16:creationId xmlns:a16="http://schemas.microsoft.com/office/drawing/2014/main" id="{1781D101-AB6A-41C8-B176-7EFA6544C41F}"/>
+              </a:ext>
+            </a:extLst>
+          </p:cNvPr>
+          <p:cNvSpPr/>
+          <p:nvPr/>
+        </p:nvSpPr>
+        <p:spPr>
+          <a:xfrm>
+            <a:off x="7509098" y="4569361"/>
+            <a:ext cx="785610" cy="772731"/>
+          </a:xfrm>
+          <a:prstGeom prst="ellipse">
+            <a:avLst/>
+          </a:prstGeom>
+          <a:solidFill>
+            <a:srgbClr val="59AFD5"/>
+          </a:solidFill>
+        </p:spPr>
+        <p:style>
+          <a:lnRef idx="2">
+            <a:schemeClr val="accent1">
+              <a:shade val="50000"/>
+            </a:schemeClr>
+          </a:lnRef>
+          <a:fillRef idx="1">
+            <a:schemeClr val="accent1"/>
+          </a:fillRef>
+          <a:effectRef idx="0">
+            <a:schemeClr val="accent1"/>
+          </a:effectRef>
+          <a:fontRef idx="minor">
+            <a:schemeClr val="lt1"/>
+          </a:fontRef>
+        </p:style>
+        <p:txBody>
+          <a:bodyPr rtlCol="0" anchor="ctr"/>
+          <a:lstStyle/>
+          <a:p>
+            <a:pPr algn="ctr"/>
+            <a:r>
+              <a:rPr lang="es-ES" sz="3600" b="1" dirty="0"/>
+              <a:t>I</a:t>
+            </a:r>
+            <a:endParaRPr lang="es-CO" sz="3600" b="1" dirty="0"/>
+          </a:p>
+        </p:txBody>
+      </p:sp>
+      <p:sp>
+        <p:nvSpPr>
+          <p:cNvPr id="79" name="Elipse 78">
+            <a:extLst>
+              <a:ext uri="{FF2B5EF4-FFF2-40B4-BE49-F238E27FC236}">
+                <a16:creationId xmlns:a16="http://schemas.microsoft.com/office/drawing/2014/main" id="{76876DF7-F263-4D84-A51F-598169C77906}"/>
+              </a:ext>
+            </a:extLst>
+          </p:cNvPr>
+          <p:cNvSpPr/>
+          <p:nvPr/>
+        </p:nvSpPr>
+        <p:spPr>
+          <a:xfrm>
+            <a:off x="7440652" y="2984840"/>
+            <a:ext cx="785610" cy="772731"/>
+          </a:xfrm>
+          <a:prstGeom prst="ellipse">
+            <a:avLst/>
+          </a:prstGeom>
+          <a:solidFill>
+            <a:srgbClr val="59AFD5"/>
+          </a:solidFill>
+        </p:spPr>
+        <p:style>
+          <a:lnRef idx="2">
+            <a:schemeClr val="accent1">
+              <a:shade val="50000"/>
+            </a:schemeClr>
+          </a:lnRef>
+          <a:fillRef idx="1">
+            <a:schemeClr val="accent1"/>
+          </a:fillRef>
+          <a:effectRef idx="0">
+            <a:schemeClr val="accent1"/>
+          </a:effectRef>
+          <a:fontRef idx="minor">
+            <a:schemeClr val="lt1"/>
+          </a:fontRef>
+        </p:style>
+        <p:txBody>
+          <a:bodyPr rtlCol="0" anchor="ctr"/>
+          <a:lstStyle/>
+          <a:p>
+            <a:pPr algn="ctr"/>
+            <a:r>
+              <a:rPr lang="es-ES" sz="3600" b="1" dirty="0"/>
+              <a:t>H</a:t>
+            </a:r>
+            <a:endParaRPr lang="es-CO" sz="3600" b="1" dirty="0"/>
+          </a:p>
+        </p:txBody>
+      </p:sp>
+      <p:cxnSp>
+        <p:nvCxnSpPr>
+          <p:cNvPr id="83" name="Conector recto de flecha 82">
+            <a:extLst>
+              <a:ext uri="{FF2B5EF4-FFF2-40B4-BE49-F238E27FC236}">
+                <a16:creationId xmlns:a16="http://schemas.microsoft.com/office/drawing/2014/main" id="{32D77297-B168-4D54-BD73-FCFB0F1BB6CA}"/>
+              </a:ext>
+            </a:extLst>
+          </p:cNvPr>
+          <p:cNvCxnSpPr>
+            <a:cxnSpLocks/>
+            <a:stCxn id="67" idx="5"/>
+            <a:endCxn id="72" idx="1"/>
+          </p:cNvCxnSpPr>
+          <p:nvPr/>
+        </p:nvCxnSpPr>
+        <p:spPr>
+          <a:xfrm>
+            <a:off x="6741748" y="4199237"/>
+            <a:ext cx="882400" cy="483288"/>
+          </a:xfrm>
+          <a:prstGeom prst="straightConnector1">
+            <a:avLst/>
+          </a:prstGeom>
+          <a:ln w="57150">
+            <a:tailEnd type="triangle"/>
+          </a:ln>
+        </p:spPr>
+        <p:style>
+          <a:lnRef idx="1">
+            <a:schemeClr val="accent1"/>
+          </a:lnRef>
+          <a:fillRef idx="0">
+            <a:schemeClr val="accent1"/>
+          </a:fillRef>
+          <a:effectRef idx="0">
+            <a:schemeClr val="accent1"/>
+          </a:effectRef>
+          <a:fontRef idx="minor">
+            <a:schemeClr val="tx1"/>
+          </a:fontRef>
+        </p:style>
+      </p:cxnSp>
+      <p:cxnSp>
+        <p:nvCxnSpPr>
+          <p:cNvPr id="84" name="Conector recto de flecha 83">
+            <a:extLst>
+              <a:ext uri="{FF2B5EF4-FFF2-40B4-BE49-F238E27FC236}">
+                <a16:creationId xmlns:a16="http://schemas.microsoft.com/office/drawing/2014/main" id="{9DF72DC5-ABDD-42AC-9474-B084F7766418}"/>
+              </a:ext>
+            </a:extLst>
+          </p:cNvPr>
+          <p:cNvCxnSpPr>
+            <a:cxnSpLocks/>
+            <a:stCxn id="67" idx="7"/>
+            <a:endCxn id="79" idx="2"/>
+          </p:cNvCxnSpPr>
+          <p:nvPr/>
+        </p:nvCxnSpPr>
+        <p:spPr>
+          <a:xfrm flipV="1">
+            <a:off x="6741748" y="3371206"/>
+            <a:ext cx="698904" cy="281628"/>
+          </a:xfrm>
+          <a:prstGeom prst="straightConnector1">
+            <a:avLst/>
+          </a:prstGeom>
+          <a:ln w="57150">
+            <a:tailEnd type="triangle"/>
+          </a:ln>
+        </p:spPr>
+        <p:style>
+          <a:lnRef idx="1">
+            <a:schemeClr val="accent1"/>
+          </a:lnRef>
+          <a:fillRef idx="0">
+            <a:schemeClr val="accent1"/>
+          </a:fillRef>
+          <a:effectRef idx="0">
+            <a:schemeClr val="accent1"/>
+          </a:effectRef>
+          <a:fontRef idx="minor">
+            <a:schemeClr val="tx1"/>
+          </a:fontRef>
+        </p:style>
+      </p:cxnSp>
+      <p:cxnSp>
+        <p:nvCxnSpPr>
+          <p:cNvPr id="85" name="Conector recto de flecha 84">
+            <a:extLst>
+              <a:ext uri="{FF2B5EF4-FFF2-40B4-BE49-F238E27FC236}">
+                <a16:creationId xmlns:a16="http://schemas.microsoft.com/office/drawing/2014/main" id="{82142836-9743-4B82-825E-FF0B97F4CE9A}"/>
+              </a:ext>
+            </a:extLst>
+          </p:cNvPr>
+          <p:cNvCxnSpPr>
+            <a:cxnSpLocks/>
+            <a:stCxn id="79" idx="4"/>
+            <a:endCxn id="72" idx="0"/>
+          </p:cNvCxnSpPr>
+          <p:nvPr/>
+        </p:nvCxnSpPr>
+        <p:spPr>
+          <a:xfrm>
+            <a:off x="7833457" y="3757571"/>
+            <a:ext cx="68446" cy="811790"/>
+          </a:xfrm>
+          <a:prstGeom prst="straightConnector1">
+            <a:avLst/>
+          </a:prstGeom>
+          <a:ln w="57150">
+            <a:tailEnd type="triangle"/>
+          </a:ln>
+        </p:spPr>
+        <p:style>
+          <a:lnRef idx="1">
+            <a:schemeClr val="accent1"/>
+          </a:lnRef>
+          <a:fillRef idx="0">
+            <a:schemeClr val="accent1"/>
+          </a:fillRef>
+          <a:effectRef idx="0">
+            <a:schemeClr val="accent1"/>
+          </a:effectRef>
+          <a:fontRef idx="minor">
+            <a:schemeClr val="tx1"/>
+          </a:fontRef>
+        </p:style>
+      </p:cxnSp>
+      <p:cxnSp>
+        <p:nvCxnSpPr>
+          <p:cNvPr id="108" name="Conector recto de flecha 107">
+            <a:extLst>
+              <a:ext uri="{FF2B5EF4-FFF2-40B4-BE49-F238E27FC236}">
+                <a16:creationId xmlns:a16="http://schemas.microsoft.com/office/drawing/2014/main" id="{2DA71211-FC5D-45A1-8BF6-3AD9B533EBE2}"/>
+              </a:ext>
+            </a:extLst>
+          </p:cNvPr>
+          <p:cNvCxnSpPr>
+            <a:cxnSpLocks/>
+            <a:stCxn id="72" idx="6"/>
+            <a:endCxn id="6" idx="1"/>
+          </p:cNvCxnSpPr>
+          <p:nvPr/>
+        </p:nvCxnSpPr>
+        <p:spPr>
+          <a:xfrm>
+            <a:off x="8294708" y="4955727"/>
+            <a:ext cx="1295057" cy="858644"/>
+          </a:xfrm>
+          <a:prstGeom prst="straightConnector1">
+            <a:avLst/>
+          </a:prstGeom>
+          <a:ln w="57150">
+            <a:tailEnd type="triangle"/>
+          </a:ln>
+        </p:spPr>
+        <p:style>
+          <a:lnRef idx="1">
+            <a:schemeClr val="accent1"/>
+          </a:lnRef>
+          <a:fillRef idx="0">
+            <a:schemeClr val="accent1"/>
+          </a:fillRef>
+          <a:effectRef idx="0">
+            <a:schemeClr val="accent1"/>
+          </a:effectRef>
+          <a:fontRef idx="minor">
+            <a:schemeClr val="tx1"/>
+          </a:fontRef>
+        </p:style>
+      </p:cxnSp>
+      <p:sp>
+        <p:nvSpPr>
+          <p:cNvPr id="110" name="CuadroTexto 109">
+            <a:extLst>
+              <a:ext uri="{FF2B5EF4-FFF2-40B4-BE49-F238E27FC236}">
+                <a16:creationId xmlns:a16="http://schemas.microsoft.com/office/drawing/2014/main" id="{9F882F50-CAFA-4A84-A793-E2D3EDB7D17B}"/>
               </a:ext>
             </a:extLst>
           </p:cNvPr>
@@ -13733,61 +14617,7 @@
         </p:nvSpPr>
         <p:spPr>
           <a:xfrm>
-            <a:off x="5383370" y="384062"/>
-            <a:ext cx="5589429" cy="523220"/>
-          </a:xfrm>
-          <a:prstGeom prst="rect">
-            <a:avLst/>
-          </a:prstGeom>
-        </p:spPr>
-        <p:style>
-          <a:lnRef idx="0">
-            <a:schemeClr val="accent2"/>
-          </a:lnRef>
-          <a:fillRef idx="3">
-            <a:schemeClr val="accent2"/>
-          </a:fillRef>
-          <a:effectRef idx="3">
-            <a:schemeClr val="accent2"/>
-          </a:effectRef>
-          <a:fontRef idx="minor">
-            <a:schemeClr val="lt1"/>
-          </a:fontRef>
-        </p:style>
-        <p:txBody>
-          <a:bodyPr wrap="square" rtlCol="0">
-            <a:spAutoFit/>
-          </a:bodyPr>
-          <a:lstStyle/>
-          <a:p>
-            <a:r>
-              <a:rPr lang="es-CO" sz="2800" b="1" dirty="0">
-                <a:solidFill>
-                  <a:schemeClr val="tx1">
-                    <a:lumMod val="95000"/>
-                  </a:schemeClr>
-                </a:solidFill>
-              </a:rPr>
-              <a:t>V(Registra Cliente) = 11 – 8 + 2 = 5</a:t>
-            </a:r>
-          </a:p>
-        </p:txBody>
-      </p:sp>
-      <p:sp>
-        <p:nvSpPr>
-          <p:cNvPr id="1032" name="CuadroTexto 1031">
-            <a:extLst>
-              <a:ext uri="{FF2B5EF4-FFF2-40B4-BE49-F238E27FC236}">
-                <a16:creationId xmlns:a16="http://schemas.microsoft.com/office/drawing/2014/main" id="{8F2055B4-E2D8-475B-992B-C0306D7DBF2A}"/>
-              </a:ext>
-            </a:extLst>
-          </p:cNvPr>
-          <p:cNvSpPr txBox="1"/>
-          <p:nvPr/>
-        </p:nvSpPr>
-        <p:spPr>
-          <a:xfrm>
-            <a:off x="2193933" y="1034626"/>
+            <a:off x="2663651" y="999131"/>
             <a:ext cx="280422" cy="369332"/>
           </a:xfrm>
           <a:prstGeom prst="rect">
@@ -13808,17 +14638,17 @@
                 </a:solidFill>
                 <a:latin typeface="Algerian" panose="04020705040A02060702" pitchFamily="82" charset="0"/>
               </a:rPr>
-              <a:t>2</a:t>
+              <a:t>1</a:t>
             </a:r>
           </a:p>
         </p:txBody>
       </p:sp>
       <p:sp>
         <p:nvSpPr>
-          <p:cNvPr id="73" name="CuadroTexto 72">
+          <p:cNvPr id="112" name="CuadroTexto 111">
             <a:extLst>
               <a:ext uri="{FF2B5EF4-FFF2-40B4-BE49-F238E27FC236}">
-                <a16:creationId xmlns:a16="http://schemas.microsoft.com/office/drawing/2014/main" id="{8D934E90-6FB7-4A40-A92F-C5C157479CF0}"/>
+                <a16:creationId xmlns:a16="http://schemas.microsoft.com/office/drawing/2014/main" id="{A991D916-2469-4A1A-B6FD-726946720BFE}"/>
               </a:ext>
             </a:extLst>
           </p:cNvPr>
@@ -13827,7 +14657,7 @@
         </p:nvSpPr>
         <p:spPr>
           <a:xfrm>
-            <a:off x="2947254" y="1431332"/>
+            <a:off x="1657077" y="1416711"/>
             <a:ext cx="280422" cy="369332"/>
           </a:xfrm>
           <a:prstGeom prst="rect">
@@ -13842,23 +14672,29 @@
           <a:lstStyle/>
           <a:p>
             <a:r>
-              <a:rPr lang="es-CO" dirty="0">
+              <a:rPr lang="es-ES" dirty="0">
                 <a:solidFill>
                   <a:srgbClr val="FFC000"/>
                 </a:solidFill>
                 <a:latin typeface="Algerian" panose="04020705040A02060702" pitchFamily="82" charset="0"/>
               </a:rPr>
-              <a:t>1</a:t>
+              <a:t>2</a:t>
             </a:r>
+            <a:endParaRPr lang="es-CO" dirty="0">
+              <a:solidFill>
+                <a:srgbClr val="FFC000"/>
+              </a:solidFill>
+              <a:latin typeface="Algerian" panose="04020705040A02060702" pitchFamily="82" charset="0"/>
+            </a:endParaRPr>
           </a:p>
         </p:txBody>
       </p:sp>
       <p:sp>
         <p:nvSpPr>
-          <p:cNvPr id="74" name="CuadroTexto 73">
+          <p:cNvPr id="114" name="CuadroTexto 113">
             <a:extLst>
               <a:ext uri="{FF2B5EF4-FFF2-40B4-BE49-F238E27FC236}">
-                <a16:creationId xmlns:a16="http://schemas.microsoft.com/office/drawing/2014/main" id="{C42DD620-C09E-4BE0-9A85-5A3EBE45315A}"/>
+                <a16:creationId xmlns:a16="http://schemas.microsoft.com/office/drawing/2014/main" id="{72A30A86-12B5-476A-9844-D47118D1E44F}"/>
               </a:ext>
             </a:extLst>
           </p:cNvPr>
@@ -13867,7 +14703,7 @@
         </p:nvSpPr>
         <p:spPr>
           <a:xfrm>
-            <a:off x="2171740" y="1918650"/>
+            <a:off x="2709203" y="2323282"/>
             <a:ext cx="280422" cy="369332"/>
           </a:xfrm>
           <a:prstGeom prst="rect">
@@ -13882,7 +14718,7 @@
           <a:lstStyle/>
           <a:p>
             <a:r>
-              <a:rPr lang="es-CO" dirty="0">
+              <a:rPr lang="es-ES" dirty="0">
                 <a:solidFill>
                   <a:srgbClr val="FFC000"/>
                 </a:solidFill>
@@ -13890,15 +14726,21 @@
               </a:rPr>
               <a:t>3</a:t>
             </a:r>
+            <a:endParaRPr lang="es-CO" dirty="0">
+              <a:solidFill>
+                <a:srgbClr val="FFC000"/>
+              </a:solidFill>
+              <a:latin typeface="Algerian" panose="04020705040A02060702" pitchFamily="82" charset="0"/>
+            </a:endParaRPr>
           </a:p>
         </p:txBody>
       </p:sp>
       <p:sp>
         <p:nvSpPr>
-          <p:cNvPr id="75" name="CuadroTexto 74">
+          <p:cNvPr id="116" name="CuadroTexto 115">
             <a:extLst>
               <a:ext uri="{FF2B5EF4-FFF2-40B4-BE49-F238E27FC236}">
-                <a16:creationId xmlns:a16="http://schemas.microsoft.com/office/drawing/2014/main" id="{3D543C6A-3E5C-4EFC-A5F2-C67C35425A78}"/>
+                <a16:creationId xmlns:a16="http://schemas.microsoft.com/office/drawing/2014/main" id="{4FA6FEAE-D041-49D9-84D2-40F116240485}"/>
               </a:ext>
             </a:extLst>
           </p:cNvPr>
@@ -13907,7 +14749,7 @@
         </p:nvSpPr>
         <p:spPr>
           <a:xfrm>
-            <a:off x="2723823" y="3022794"/>
+            <a:off x="4024381" y="2457130"/>
             <a:ext cx="280422" cy="369332"/>
           </a:xfrm>
           <a:prstGeom prst="rect">
@@ -13922,7 +14764,7 @@
           <a:lstStyle/>
           <a:p>
             <a:r>
-              <a:rPr lang="es-CO" dirty="0">
+              <a:rPr lang="es-ES" dirty="0">
                 <a:solidFill>
                   <a:srgbClr val="FFC000"/>
                 </a:solidFill>
@@ -13930,15 +14772,21 @@
               </a:rPr>
               <a:t>4</a:t>
             </a:r>
+            <a:endParaRPr lang="es-CO" dirty="0">
+              <a:solidFill>
+                <a:srgbClr val="FFC000"/>
+              </a:solidFill>
+              <a:latin typeface="Algerian" panose="04020705040A02060702" pitchFamily="82" charset="0"/>
+            </a:endParaRPr>
           </a:p>
         </p:txBody>
       </p:sp>
       <p:sp>
         <p:nvSpPr>
-          <p:cNvPr id="76" name="CuadroTexto 75">
+          <p:cNvPr id="118" name="CuadroTexto 117">
             <a:extLst>
               <a:ext uri="{FF2B5EF4-FFF2-40B4-BE49-F238E27FC236}">
-                <a16:creationId xmlns:a16="http://schemas.microsoft.com/office/drawing/2014/main" id="{3B81F70F-3EC7-4D03-B311-8D3AAA1D72C8}"/>
+                <a16:creationId xmlns:a16="http://schemas.microsoft.com/office/drawing/2014/main" id="{C2F50404-7FAA-4774-913A-33286E9E46B0}"/>
               </a:ext>
             </a:extLst>
           </p:cNvPr>
@@ -13947,7 +14795,7 @@
         </p:nvSpPr>
         <p:spPr>
           <a:xfrm>
-            <a:off x="3475142" y="3374387"/>
+            <a:off x="3969334" y="1165626"/>
             <a:ext cx="280422" cy="369332"/>
           </a:xfrm>
           <a:prstGeom prst="rect">
@@ -13962,23 +14810,29 @@
           <a:lstStyle/>
           <a:p>
             <a:r>
-              <a:rPr lang="es-CO" dirty="0">
+              <a:rPr lang="es-ES" dirty="0">
                 <a:solidFill>
                   <a:srgbClr val="FFC000"/>
                 </a:solidFill>
                 <a:latin typeface="Algerian" panose="04020705040A02060702" pitchFamily="82" charset="0"/>
               </a:rPr>
-              <a:t>6</a:t>
+              <a:t>5</a:t>
             </a:r>
+            <a:endParaRPr lang="es-CO" dirty="0">
+              <a:solidFill>
+                <a:srgbClr val="FFC000"/>
+              </a:solidFill>
+              <a:latin typeface="Algerian" panose="04020705040A02060702" pitchFamily="82" charset="0"/>
+            </a:endParaRPr>
           </a:p>
         </p:txBody>
       </p:sp>
       <p:sp>
         <p:nvSpPr>
-          <p:cNvPr id="77" name="CuadroTexto 76">
+          <p:cNvPr id="120" name="CuadroTexto 119">
             <a:extLst>
               <a:ext uri="{FF2B5EF4-FFF2-40B4-BE49-F238E27FC236}">
-                <a16:creationId xmlns:a16="http://schemas.microsoft.com/office/drawing/2014/main" id="{F829550D-3D3B-4474-B629-A50E17EF90CA}"/>
+                <a16:creationId xmlns:a16="http://schemas.microsoft.com/office/drawing/2014/main" id="{C0BEF2F8-24FC-4455-A03F-95582F3D70FD}"/>
               </a:ext>
             </a:extLst>
           </p:cNvPr>
@@ -13987,7 +14841,7 @@
         </p:nvSpPr>
         <p:spPr>
           <a:xfrm>
-            <a:off x="3518783" y="2543970"/>
+            <a:off x="5630728" y="3000975"/>
             <a:ext cx="280422" cy="369332"/>
           </a:xfrm>
           <a:prstGeom prst="rect">
@@ -14002,23 +14856,29 @@
           <a:lstStyle/>
           <a:p>
             <a:r>
-              <a:rPr lang="es-CO" dirty="0">
+              <a:rPr lang="es-ES" dirty="0">
                 <a:solidFill>
                   <a:srgbClr val="FFC000"/>
                 </a:solidFill>
                 <a:latin typeface="Algerian" panose="04020705040A02060702" pitchFamily="82" charset="0"/>
               </a:rPr>
-              <a:t>5</a:t>
+              <a:t>7</a:t>
             </a:r>
+            <a:endParaRPr lang="es-CO" dirty="0">
+              <a:solidFill>
+                <a:srgbClr val="FFC000"/>
+              </a:solidFill>
+              <a:latin typeface="Algerian" panose="04020705040A02060702" pitchFamily="82" charset="0"/>
+            </a:endParaRPr>
           </a:p>
         </p:txBody>
       </p:sp>
       <p:sp>
         <p:nvSpPr>
-          <p:cNvPr id="78" name="CuadroTexto 77">
+          <p:cNvPr id="124" name="CuadroTexto 123">
             <a:extLst>
               <a:ext uri="{FF2B5EF4-FFF2-40B4-BE49-F238E27FC236}">
-                <a16:creationId xmlns:a16="http://schemas.microsoft.com/office/drawing/2014/main" id="{0E34F5AD-C094-4361-8F48-AC3FF12A1F68}"/>
+                <a16:creationId xmlns:a16="http://schemas.microsoft.com/office/drawing/2014/main" id="{0B1D6104-D700-4E80-AA38-52C93F103C33}"/>
               </a:ext>
             </a:extLst>
           </p:cNvPr>
@@ -14027,7 +14887,7 @@
         </p:nvSpPr>
         <p:spPr>
           <a:xfrm>
-            <a:off x="2709442" y="4806398"/>
+            <a:off x="5122207" y="1975115"/>
             <a:ext cx="280422" cy="369332"/>
           </a:xfrm>
           <a:prstGeom prst="rect">
@@ -14042,23 +14902,29 @@
           <a:lstStyle/>
           <a:p>
             <a:r>
-              <a:rPr lang="es-CO" dirty="0">
+              <a:rPr lang="es-ES" dirty="0">
                 <a:solidFill>
                   <a:srgbClr val="FFC000"/>
                 </a:solidFill>
                 <a:latin typeface="Algerian" panose="04020705040A02060702" pitchFamily="82" charset="0"/>
               </a:rPr>
-              <a:t>7</a:t>
+              <a:t>6</a:t>
             </a:r>
+            <a:endParaRPr lang="es-CO" dirty="0">
+              <a:solidFill>
+                <a:srgbClr val="FFC000"/>
+              </a:solidFill>
+              <a:latin typeface="Algerian" panose="04020705040A02060702" pitchFamily="82" charset="0"/>
+            </a:endParaRPr>
           </a:p>
         </p:txBody>
       </p:sp>
       <p:sp>
         <p:nvSpPr>
-          <p:cNvPr id="80" name="CuadroTexto 79">
+          <p:cNvPr id="126" name="CuadroTexto 125">
             <a:extLst>
               <a:ext uri="{FF2B5EF4-FFF2-40B4-BE49-F238E27FC236}">
-                <a16:creationId xmlns:a16="http://schemas.microsoft.com/office/drawing/2014/main" id="{FB14A98E-C9EF-42A9-9BB2-4955B2F6164A}"/>
+                <a16:creationId xmlns:a16="http://schemas.microsoft.com/office/drawing/2014/main" id="{3EBAEF25-1E51-4B3B-8635-2E1D9AC16A73}"/>
               </a:ext>
             </a:extLst>
           </p:cNvPr>
@@ -14067,7 +14933,7 @@
         </p:nvSpPr>
         <p:spPr>
           <a:xfrm>
-            <a:off x="2251168" y="4200687"/>
+            <a:off x="4609106" y="3590500"/>
             <a:ext cx="280422" cy="369332"/>
           </a:xfrm>
           <a:prstGeom prst="rect">
@@ -14082,7 +14948,7 @@
           <a:lstStyle/>
           <a:p>
             <a:r>
-              <a:rPr lang="es-CO" dirty="0">
+              <a:rPr lang="es-ES" dirty="0">
                 <a:solidFill>
                   <a:srgbClr val="FFC000"/>
                 </a:solidFill>
@@ -14090,15 +14956,21 @@
               </a:rPr>
               <a:t>8</a:t>
             </a:r>
+            <a:endParaRPr lang="es-CO" dirty="0">
+              <a:solidFill>
+                <a:srgbClr val="FFC000"/>
+              </a:solidFill>
+              <a:latin typeface="Algerian" panose="04020705040A02060702" pitchFamily="82" charset="0"/>
+            </a:endParaRPr>
           </a:p>
         </p:txBody>
       </p:sp>
       <p:sp>
         <p:nvSpPr>
-          <p:cNvPr id="81" name="CuadroTexto 80">
+          <p:cNvPr id="1024" name="CuadroTexto 1023">
             <a:extLst>
               <a:ext uri="{FF2B5EF4-FFF2-40B4-BE49-F238E27FC236}">
-                <a16:creationId xmlns:a16="http://schemas.microsoft.com/office/drawing/2014/main" id="{A5CD53C3-18D0-4DF6-9013-3E4FAF695904}"/>
+                <a16:creationId xmlns:a16="http://schemas.microsoft.com/office/drawing/2014/main" id="{4978DC01-F3BA-431C-B899-FABCBDF0B300}"/>
               </a:ext>
             </a:extLst>
           </p:cNvPr>
@@ -14107,47 +14979,7 @@
         </p:nvSpPr>
         <p:spPr>
           <a:xfrm>
-            <a:off x="438124" y="3316701"/>
-            <a:ext cx="604514" cy="369332"/>
-          </a:xfrm>
-          <a:prstGeom prst="rect">
-            <a:avLst/>
-          </a:prstGeom>
-          <a:noFill/>
-        </p:spPr>
-        <p:txBody>
-          <a:bodyPr wrap="square" rtlCol="0">
-            <a:spAutoFit/>
-          </a:bodyPr>
-          <a:lstStyle/>
-          <a:p>
-            <a:r>
-              <a:rPr lang="es-CO" dirty="0">
-                <a:solidFill>
-                  <a:srgbClr val="FFC000"/>
-                </a:solidFill>
-                <a:latin typeface="Algerian" panose="04020705040A02060702" pitchFamily="82" charset="0"/>
-              </a:rPr>
-              <a:t>10</a:t>
-            </a:r>
-          </a:p>
-        </p:txBody>
-      </p:sp>
-      <p:sp>
-        <p:nvSpPr>
-          <p:cNvPr id="82" name="CuadroTexto 81">
-            <a:extLst>
-              <a:ext uri="{FF2B5EF4-FFF2-40B4-BE49-F238E27FC236}">
-                <a16:creationId xmlns:a16="http://schemas.microsoft.com/office/drawing/2014/main" id="{C14DD89A-8D04-4FFF-A784-035D8F6586D9}"/>
-              </a:ext>
-            </a:extLst>
-          </p:cNvPr>
-          <p:cNvSpPr txBox="1"/>
-          <p:nvPr/>
-        </p:nvSpPr>
-        <p:spPr>
-          <a:xfrm>
-            <a:off x="2080686" y="5340332"/>
+            <a:off x="5868677" y="4399030"/>
             <a:ext cx="280422" cy="369332"/>
           </a:xfrm>
           <a:prstGeom prst="rect">
@@ -14162,7 +14994,7 @@
           <a:lstStyle/>
           <a:p>
             <a:r>
-              <a:rPr lang="es-CO" dirty="0">
+              <a:rPr lang="es-ES" dirty="0">
                 <a:solidFill>
                   <a:srgbClr val="FFC000"/>
                 </a:solidFill>
@@ -14170,15 +15002,21 @@
               </a:rPr>
               <a:t>9</a:t>
             </a:r>
+            <a:endParaRPr lang="es-CO" dirty="0">
+              <a:solidFill>
+                <a:srgbClr val="FFC000"/>
+              </a:solidFill>
+              <a:latin typeface="Algerian" panose="04020705040A02060702" pitchFamily="82" charset="0"/>
+            </a:endParaRPr>
           </a:p>
         </p:txBody>
       </p:sp>
       <p:sp>
         <p:nvSpPr>
-          <p:cNvPr id="36" name="CuadroTexto 35">
+          <p:cNvPr id="1025" name="CuadroTexto 1024">
             <a:extLst>
               <a:ext uri="{FF2B5EF4-FFF2-40B4-BE49-F238E27FC236}">
-                <a16:creationId xmlns:a16="http://schemas.microsoft.com/office/drawing/2014/main" id="{F7DEBC99-245A-4982-AB20-F879279C5ADD}"/>
+                <a16:creationId xmlns:a16="http://schemas.microsoft.com/office/drawing/2014/main" id="{4B6A84F0-E6DC-43DB-8AE7-A17962EFE9BA}"/>
               </a:ext>
             </a:extLst>
           </p:cNvPr>
@@ -14187,8 +15025,8 @@
         </p:nvSpPr>
         <p:spPr>
           <a:xfrm>
-            <a:off x="3352174" y="541915"/>
-            <a:ext cx="604514" cy="369332"/>
+            <a:off x="6709345" y="4399030"/>
+            <a:ext cx="488485" cy="369332"/>
           </a:xfrm>
           <a:prstGeom prst="rect">
             <a:avLst/>
@@ -14208,7 +15046,424 @@
                 </a:solidFill>
                 <a:latin typeface="Algerian" panose="04020705040A02060702" pitchFamily="82" charset="0"/>
               </a:rPr>
+              <a:t>10</a:t>
+            </a:r>
+          </a:p>
+        </p:txBody>
+      </p:sp>
+      <p:sp>
+        <p:nvSpPr>
+          <p:cNvPr id="1026" name="CuadroTexto 1025">
+            <a:extLst>
+              <a:ext uri="{FF2B5EF4-FFF2-40B4-BE49-F238E27FC236}">
+                <a16:creationId xmlns:a16="http://schemas.microsoft.com/office/drawing/2014/main" id="{A03D6E66-1FA9-434A-9062-09BAC2BA53C5}"/>
+              </a:ext>
+            </a:extLst>
+          </p:cNvPr>
+          <p:cNvSpPr txBox="1"/>
+          <p:nvPr/>
+        </p:nvSpPr>
+        <p:spPr>
+          <a:xfrm>
+            <a:off x="6732369" y="3112782"/>
+            <a:ext cx="601456" cy="369332"/>
+          </a:xfrm>
+          <a:prstGeom prst="rect">
+            <a:avLst/>
+          </a:prstGeom>
+          <a:noFill/>
+        </p:spPr>
+        <p:txBody>
+          <a:bodyPr wrap="square" rtlCol="0">
+            <a:spAutoFit/>
+          </a:bodyPr>
+          <a:lstStyle/>
+          <a:p>
+            <a:r>
+              <a:rPr lang="es-CO" dirty="0">
+                <a:solidFill>
+                  <a:srgbClr val="FFC000"/>
+                </a:solidFill>
+                <a:latin typeface="Algerian" panose="04020705040A02060702" pitchFamily="82" charset="0"/>
+              </a:rPr>
               <a:t>11</a:t>
+            </a:r>
+          </a:p>
+        </p:txBody>
+      </p:sp>
+      <p:sp>
+        <p:nvSpPr>
+          <p:cNvPr id="1027" name="CuadroTexto 1026">
+            <a:extLst>
+              <a:ext uri="{FF2B5EF4-FFF2-40B4-BE49-F238E27FC236}">
+                <a16:creationId xmlns:a16="http://schemas.microsoft.com/office/drawing/2014/main" id="{5A7A8160-B8F2-40BC-962A-ED32B8EF619A}"/>
+              </a:ext>
+            </a:extLst>
+          </p:cNvPr>
+          <p:cNvSpPr txBox="1"/>
+          <p:nvPr/>
+        </p:nvSpPr>
+        <p:spPr>
+          <a:xfrm>
+            <a:off x="7857900" y="3884071"/>
+            <a:ext cx="569887" cy="369332"/>
+          </a:xfrm>
+          <a:prstGeom prst="rect">
+            <a:avLst/>
+          </a:prstGeom>
+          <a:noFill/>
+        </p:spPr>
+        <p:txBody>
+          <a:bodyPr wrap="square" rtlCol="0">
+            <a:spAutoFit/>
+          </a:bodyPr>
+          <a:lstStyle/>
+          <a:p>
+            <a:r>
+              <a:rPr lang="es-CO" dirty="0">
+                <a:solidFill>
+                  <a:srgbClr val="FFC000"/>
+                </a:solidFill>
+                <a:latin typeface="Algerian" panose="04020705040A02060702" pitchFamily="82" charset="0"/>
+              </a:rPr>
+              <a:t>12</a:t>
+            </a:r>
+          </a:p>
+        </p:txBody>
+      </p:sp>
+      <p:sp>
+        <p:nvSpPr>
+          <p:cNvPr id="1028" name="CuadroTexto 1027">
+            <a:extLst>
+              <a:ext uri="{FF2B5EF4-FFF2-40B4-BE49-F238E27FC236}">
+                <a16:creationId xmlns:a16="http://schemas.microsoft.com/office/drawing/2014/main" id="{6A87C944-0E18-482D-957F-719B511029EB}"/>
+              </a:ext>
+            </a:extLst>
+          </p:cNvPr>
+          <p:cNvSpPr txBox="1"/>
+          <p:nvPr/>
+        </p:nvSpPr>
+        <p:spPr>
+          <a:xfrm>
+            <a:off x="8941504" y="5159856"/>
+            <a:ext cx="533211" cy="369332"/>
+          </a:xfrm>
+          <a:prstGeom prst="rect">
+            <a:avLst/>
+          </a:prstGeom>
+          <a:noFill/>
+        </p:spPr>
+        <p:txBody>
+          <a:bodyPr wrap="square" rtlCol="0">
+            <a:spAutoFit/>
+          </a:bodyPr>
+          <a:lstStyle/>
+          <a:p>
+            <a:r>
+              <a:rPr lang="es-CO" dirty="0">
+                <a:solidFill>
+                  <a:srgbClr val="FFC000"/>
+                </a:solidFill>
+                <a:latin typeface="Algerian" panose="04020705040A02060702" pitchFamily="82" charset="0"/>
+              </a:rPr>
+              <a:t>13</a:t>
+            </a:r>
+          </a:p>
+        </p:txBody>
+      </p:sp>
+      <p:sp>
+        <p:nvSpPr>
+          <p:cNvPr id="1029" name="CuadroTexto 1028">
+            <a:extLst>
+              <a:ext uri="{FF2B5EF4-FFF2-40B4-BE49-F238E27FC236}">
+                <a16:creationId xmlns:a16="http://schemas.microsoft.com/office/drawing/2014/main" id="{CA9A0C29-7655-47D5-AEFD-830D8CE0D8E5}"/>
+              </a:ext>
+            </a:extLst>
+          </p:cNvPr>
+          <p:cNvSpPr txBox="1"/>
+          <p:nvPr/>
+        </p:nvSpPr>
+        <p:spPr>
+          <a:xfrm>
+            <a:off x="718828" y="4014571"/>
+            <a:ext cx="507725" cy="369332"/>
+          </a:xfrm>
+          <a:prstGeom prst="rect">
+            <a:avLst/>
+          </a:prstGeom>
+          <a:noFill/>
+        </p:spPr>
+        <p:txBody>
+          <a:bodyPr wrap="square" rtlCol="0">
+            <a:spAutoFit/>
+          </a:bodyPr>
+          <a:lstStyle/>
+          <a:p>
+            <a:r>
+              <a:rPr lang="es-CO" dirty="0">
+                <a:solidFill>
+                  <a:srgbClr val="FFC000"/>
+                </a:solidFill>
+                <a:latin typeface="Algerian" panose="04020705040A02060702" pitchFamily="82" charset="0"/>
+              </a:rPr>
+              <a:t>16</a:t>
+            </a:r>
+          </a:p>
+        </p:txBody>
+      </p:sp>
+      <p:sp>
+        <p:nvSpPr>
+          <p:cNvPr id="1030" name="CuadroTexto 1029">
+            <a:extLst>
+              <a:ext uri="{FF2B5EF4-FFF2-40B4-BE49-F238E27FC236}">
+                <a16:creationId xmlns:a16="http://schemas.microsoft.com/office/drawing/2014/main" id="{9A0C7BF3-D1D8-44F6-B751-EE89EE3B9AE5}"/>
+              </a:ext>
+            </a:extLst>
+          </p:cNvPr>
+          <p:cNvSpPr txBox="1"/>
+          <p:nvPr/>
+        </p:nvSpPr>
+        <p:spPr>
+          <a:xfrm>
+            <a:off x="2380046" y="310544"/>
+            <a:ext cx="507725" cy="369332"/>
+          </a:xfrm>
+          <a:prstGeom prst="rect">
+            <a:avLst/>
+          </a:prstGeom>
+          <a:noFill/>
+        </p:spPr>
+        <p:txBody>
+          <a:bodyPr wrap="square" rtlCol="0">
+            <a:spAutoFit/>
+          </a:bodyPr>
+          <a:lstStyle/>
+          <a:p>
+            <a:r>
+              <a:rPr lang="es-CO" dirty="0">
+                <a:solidFill>
+                  <a:srgbClr val="FFC000"/>
+                </a:solidFill>
+                <a:latin typeface="Algerian" panose="04020705040A02060702" pitchFamily="82" charset="0"/>
+              </a:rPr>
+              <a:t>17</a:t>
+            </a:r>
+          </a:p>
+        </p:txBody>
+      </p:sp>
+      <p:sp>
+        <p:nvSpPr>
+          <p:cNvPr id="1042" name="Elipse 1041">
+            <a:extLst>
+              <a:ext uri="{FF2B5EF4-FFF2-40B4-BE49-F238E27FC236}">
+                <a16:creationId xmlns:a16="http://schemas.microsoft.com/office/drawing/2014/main" id="{E6754543-DF7B-41F2-8B78-C8D35E2D00A5}"/>
+              </a:ext>
+            </a:extLst>
+          </p:cNvPr>
+          <p:cNvSpPr/>
+          <p:nvPr/>
+        </p:nvSpPr>
+        <p:spPr>
+          <a:xfrm>
+            <a:off x="7932032" y="5856288"/>
+            <a:ext cx="785610" cy="772731"/>
+          </a:xfrm>
+          <a:prstGeom prst="ellipse">
+            <a:avLst/>
+          </a:prstGeom>
+          <a:solidFill>
+            <a:srgbClr val="59AFD5"/>
+          </a:solidFill>
+        </p:spPr>
+        <p:style>
+          <a:lnRef idx="2">
+            <a:schemeClr val="accent1">
+              <a:shade val="50000"/>
+            </a:schemeClr>
+          </a:lnRef>
+          <a:fillRef idx="1">
+            <a:schemeClr val="accent1"/>
+          </a:fillRef>
+          <a:effectRef idx="0">
+            <a:schemeClr val="accent1"/>
+          </a:effectRef>
+          <a:fontRef idx="minor">
+            <a:schemeClr val="lt1"/>
+          </a:fontRef>
+        </p:style>
+        <p:txBody>
+          <a:bodyPr rtlCol="0" anchor="ctr"/>
+          <a:lstStyle/>
+          <a:p>
+            <a:pPr algn="ctr"/>
+            <a:r>
+              <a:rPr lang="es-ES" sz="3600" b="1" dirty="0"/>
+              <a:t>J</a:t>
+            </a:r>
+            <a:endParaRPr lang="es-CO" sz="3600" b="1" dirty="0"/>
+          </a:p>
+        </p:txBody>
+      </p:sp>
+      <p:cxnSp>
+        <p:nvCxnSpPr>
+          <p:cNvPr id="158" name="Conector recto de flecha 157">
+            <a:extLst>
+              <a:ext uri="{FF2B5EF4-FFF2-40B4-BE49-F238E27FC236}">
+                <a16:creationId xmlns:a16="http://schemas.microsoft.com/office/drawing/2014/main" id="{2BD927D0-DABD-4F05-B79D-D2307FDF560D}"/>
+              </a:ext>
+            </a:extLst>
+          </p:cNvPr>
+          <p:cNvCxnSpPr>
+            <a:cxnSpLocks/>
+          </p:cNvCxnSpPr>
+          <p:nvPr/>
+        </p:nvCxnSpPr>
+        <p:spPr>
+          <a:xfrm>
+            <a:off x="8070253" y="5285510"/>
+            <a:ext cx="145179" cy="627360"/>
+          </a:xfrm>
+          <a:prstGeom prst="straightConnector1">
+            <a:avLst/>
+          </a:prstGeom>
+          <a:ln w="57150">
+            <a:tailEnd type="triangle"/>
+          </a:ln>
+        </p:spPr>
+        <p:style>
+          <a:lnRef idx="1">
+            <a:schemeClr val="accent1"/>
+          </a:lnRef>
+          <a:fillRef idx="0">
+            <a:schemeClr val="accent1"/>
+          </a:fillRef>
+          <a:effectRef idx="0">
+            <a:schemeClr val="accent1"/>
+          </a:effectRef>
+          <a:fontRef idx="minor">
+            <a:schemeClr val="tx1"/>
+          </a:fontRef>
+        </p:style>
+      </p:cxnSp>
+      <p:cxnSp>
+        <p:nvCxnSpPr>
+          <p:cNvPr id="160" name="Conector recto de flecha 159">
+            <a:extLst>
+              <a:ext uri="{FF2B5EF4-FFF2-40B4-BE49-F238E27FC236}">
+                <a16:creationId xmlns:a16="http://schemas.microsoft.com/office/drawing/2014/main" id="{7B70A3B9-39EA-41B9-9701-134E5D7CE97B}"/>
+              </a:ext>
+            </a:extLst>
+          </p:cNvPr>
+          <p:cNvCxnSpPr>
+            <a:cxnSpLocks/>
+            <a:stCxn id="1042" idx="6"/>
+            <a:endCxn id="6" idx="2"/>
+          </p:cNvCxnSpPr>
+          <p:nvPr/>
+        </p:nvCxnSpPr>
+        <p:spPr>
+          <a:xfrm flipV="1">
+            <a:off x="8717642" y="6087573"/>
+            <a:ext cx="757073" cy="155081"/>
+          </a:xfrm>
+          <a:prstGeom prst="straightConnector1">
+            <a:avLst/>
+          </a:prstGeom>
+          <a:ln w="57150">
+            <a:tailEnd type="triangle"/>
+          </a:ln>
+        </p:spPr>
+        <p:style>
+          <a:lnRef idx="1">
+            <a:schemeClr val="accent1"/>
+          </a:lnRef>
+          <a:fillRef idx="0">
+            <a:schemeClr val="accent1"/>
+          </a:fillRef>
+          <a:effectRef idx="0">
+            <a:schemeClr val="accent1"/>
+          </a:effectRef>
+          <a:fontRef idx="minor">
+            <a:schemeClr val="tx1"/>
+          </a:fontRef>
+        </p:style>
+      </p:cxnSp>
+      <p:sp>
+        <p:nvSpPr>
+          <p:cNvPr id="134" name="CuadroTexto 133">
+            <a:extLst>
+              <a:ext uri="{FF2B5EF4-FFF2-40B4-BE49-F238E27FC236}">
+                <a16:creationId xmlns:a16="http://schemas.microsoft.com/office/drawing/2014/main" id="{50331587-E75E-4966-AF79-8ACBF7F9947B}"/>
+              </a:ext>
+            </a:extLst>
+          </p:cNvPr>
+          <p:cNvSpPr txBox="1"/>
+          <p:nvPr/>
+        </p:nvSpPr>
+        <p:spPr>
+          <a:xfrm>
+            <a:off x="7609631" y="5482709"/>
+            <a:ext cx="533211" cy="369332"/>
+          </a:xfrm>
+          <a:prstGeom prst="rect">
+            <a:avLst/>
+          </a:prstGeom>
+          <a:noFill/>
+        </p:spPr>
+        <p:txBody>
+          <a:bodyPr wrap="square" rtlCol="0">
+            <a:spAutoFit/>
+          </a:bodyPr>
+          <a:lstStyle/>
+          <a:p>
+            <a:r>
+              <a:rPr lang="es-CO" dirty="0">
+                <a:solidFill>
+                  <a:srgbClr val="FFC000"/>
+                </a:solidFill>
+                <a:latin typeface="Algerian" panose="04020705040A02060702" pitchFamily="82" charset="0"/>
+              </a:rPr>
+              <a:t>14</a:t>
+            </a:r>
+          </a:p>
+        </p:txBody>
+      </p:sp>
+      <p:sp>
+        <p:nvSpPr>
+          <p:cNvPr id="136" name="CuadroTexto 135">
+            <a:extLst>
+              <a:ext uri="{FF2B5EF4-FFF2-40B4-BE49-F238E27FC236}">
+                <a16:creationId xmlns:a16="http://schemas.microsoft.com/office/drawing/2014/main" id="{CD062AA7-70BE-48A2-A4EC-1DD9D2D82046}"/>
+              </a:ext>
+            </a:extLst>
+          </p:cNvPr>
+          <p:cNvSpPr txBox="1"/>
+          <p:nvPr/>
+        </p:nvSpPr>
+        <p:spPr>
+          <a:xfrm>
+            <a:off x="8829572" y="6190617"/>
+            <a:ext cx="533211" cy="369332"/>
+          </a:xfrm>
+          <a:prstGeom prst="rect">
+            <a:avLst/>
+          </a:prstGeom>
+          <a:noFill/>
+        </p:spPr>
+        <p:txBody>
+          <a:bodyPr wrap="square" rtlCol="0">
+            <a:spAutoFit/>
+          </a:bodyPr>
+          <a:lstStyle/>
+          <a:p>
+            <a:r>
+              <a:rPr lang="es-CO" dirty="0">
+                <a:solidFill>
+                  <a:srgbClr val="FFC000"/>
+                </a:solidFill>
+                <a:latin typeface="Algerian" panose="04020705040A02060702" pitchFamily="82" charset="0"/>
+              </a:rPr>
+              <a:t>15</a:t>
             </a:r>
           </a:p>
         </p:txBody>
@@ -14216,7 +15471,595 @@
     </p:spTree>
     <p:extLst>
       <p:ext uri="{BB962C8B-B14F-4D97-AF65-F5344CB8AC3E}">
-        <p14:creationId xmlns:p14="http://schemas.microsoft.com/office/powerpoint/2010/main" val="1403402099"/>
+        <p14:creationId xmlns:p14="http://schemas.microsoft.com/office/powerpoint/2010/main" val="541754181"/>
+      </p:ext>
+    </p:extLst>
+  </p:cSld>
+  <p:clrMapOvr>
+    <a:masterClrMapping/>
+  </p:clrMapOvr>
+</p:sld>
+</file>
+
+<file path=ppt/slides/slide4.xml><?xml version="1.0" encoding="utf-8"?>
+<p:sld xmlns:a="http://schemas.openxmlformats.org/drawingml/2006/main" xmlns:r="http://schemas.openxmlformats.org/officeDocument/2006/relationships" xmlns:p="http://schemas.openxmlformats.org/presentationml/2006/main">
+  <p:cSld>
+    <p:spTree>
+      <p:nvGrpSpPr>
+        <p:cNvPr id="1" name=""/>
+        <p:cNvGrpSpPr/>
+        <p:nvPr/>
+      </p:nvGrpSpPr>
+      <p:grpSpPr>
+        <a:xfrm>
+          <a:off x="0" y="0"/>
+          <a:ext cx="0" cy="0"/>
+          <a:chOff x="0" y="0"/>
+          <a:chExt cx="0" cy="0"/>
+        </a:xfrm>
+      </p:grpSpPr>
+      <p:sp>
+        <p:nvSpPr>
+          <p:cNvPr id="2" name="Título 1">
+            <a:extLst>
+              <a:ext uri="{FF2B5EF4-FFF2-40B4-BE49-F238E27FC236}">
+                <a16:creationId xmlns:a16="http://schemas.microsoft.com/office/drawing/2014/main" id="{586D7065-3D59-4157-B528-28390EAD2B4E}"/>
+              </a:ext>
+            </a:extLst>
+          </p:cNvPr>
+          <p:cNvSpPr>
+            <a:spLocks noGrp="1"/>
+          </p:cNvSpPr>
+          <p:nvPr>
+            <p:ph type="title"/>
+          </p:nvPr>
+        </p:nvSpPr>
+        <p:spPr>
+          <a:xfrm>
+            <a:off x="1894223" y="631771"/>
+            <a:ext cx="8400375" cy="1130769"/>
+          </a:xfrm>
+        </p:spPr>
+        <p:txBody>
+          <a:bodyPr/>
+          <a:lstStyle/>
+          <a:p>
+            <a:r>
+              <a:rPr lang="es-ES" dirty="0"/>
+              <a:t>B. </a:t>
+            </a:r>
+            <a:r>
+              <a:rPr lang="es-ES" cap="none" dirty="0"/>
+              <a:t>El correo, el nombre de usuario o N.º de   documento ya existen.</a:t>
+            </a:r>
+            <a:endParaRPr lang="es-CO" dirty="0"/>
+          </a:p>
+        </p:txBody>
+      </p:sp>
+      <p:pic>
+        <p:nvPicPr>
+          <p:cNvPr id="3" name="Imagen 2">
+            <a:extLst>
+              <a:ext uri="{FF2B5EF4-FFF2-40B4-BE49-F238E27FC236}">
+                <a16:creationId xmlns:a16="http://schemas.microsoft.com/office/drawing/2014/main" id="{7BBDF76A-6040-48D7-A1C5-CCB629F30B0D}"/>
+              </a:ext>
+            </a:extLst>
+          </p:cNvPr>
+          <p:cNvPicPr>
+            <a:picLocks noChangeAspect="1"/>
+          </p:cNvPicPr>
+          <p:nvPr/>
+        </p:nvPicPr>
+        <p:blipFill>
+          <a:blip r:embed="rId2"/>
+          <a:stretch>
+            <a:fillRect/>
+          </a:stretch>
+        </p:blipFill>
+        <p:spPr>
+          <a:xfrm>
+            <a:off x="2647035" y="2067411"/>
+            <a:ext cx="6894753" cy="4561007"/>
+          </a:xfrm>
+          <a:prstGeom prst="rect">
+            <a:avLst/>
+          </a:prstGeom>
+        </p:spPr>
+      </p:pic>
+    </p:spTree>
+    <p:extLst>
+      <p:ext uri="{BB962C8B-B14F-4D97-AF65-F5344CB8AC3E}">
+        <p14:creationId xmlns:p14="http://schemas.microsoft.com/office/powerpoint/2010/main" val="4176981734"/>
+      </p:ext>
+    </p:extLst>
+  </p:cSld>
+  <p:clrMapOvr>
+    <a:masterClrMapping/>
+  </p:clrMapOvr>
+</p:sld>
+</file>
+
+<file path=ppt/slides/slide5.xml><?xml version="1.0" encoding="utf-8"?>
+<p:sld xmlns:a="http://schemas.openxmlformats.org/drawingml/2006/main" xmlns:r="http://schemas.openxmlformats.org/officeDocument/2006/relationships" xmlns:p="http://schemas.openxmlformats.org/presentationml/2006/main">
+  <p:cSld>
+    <p:spTree>
+      <p:nvGrpSpPr>
+        <p:cNvPr id="1" name=""/>
+        <p:cNvGrpSpPr/>
+        <p:nvPr/>
+      </p:nvGrpSpPr>
+      <p:grpSpPr>
+        <a:xfrm>
+          <a:off x="0" y="0"/>
+          <a:ext cx="0" cy="0"/>
+          <a:chOff x="0" y="0"/>
+          <a:chExt cx="0" cy="0"/>
+        </a:xfrm>
+      </p:grpSpPr>
+      <p:sp>
+        <p:nvSpPr>
+          <p:cNvPr id="2" name="Título 1">
+            <a:extLst>
+              <a:ext uri="{FF2B5EF4-FFF2-40B4-BE49-F238E27FC236}">
+                <a16:creationId xmlns:a16="http://schemas.microsoft.com/office/drawing/2014/main" id="{586D7065-3D59-4157-B528-28390EAD2B4E}"/>
+              </a:ext>
+            </a:extLst>
+          </p:cNvPr>
+          <p:cNvSpPr>
+            <a:spLocks noGrp="1"/>
+          </p:cNvSpPr>
+          <p:nvPr>
+            <p:ph type="title"/>
+          </p:nvPr>
+        </p:nvSpPr>
+        <p:spPr>
+          <a:xfrm>
+            <a:off x="1795250" y="631771"/>
+            <a:ext cx="8601499" cy="1130769"/>
+          </a:xfrm>
+        </p:spPr>
+        <p:txBody>
+          <a:bodyPr/>
+          <a:lstStyle/>
+          <a:p>
+            <a:r>
+              <a:rPr lang="es-ES" dirty="0"/>
+              <a:t>D. </a:t>
+            </a:r>
+            <a:r>
+              <a:rPr lang="es-ES" cap="none" dirty="0"/>
+              <a:t>El número de documento debe ser numérico</a:t>
+            </a:r>
+            <a:endParaRPr lang="es-CO" dirty="0"/>
+          </a:p>
+        </p:txBody>
+      </p:sp>
+      <p:pic>
+        <p:nvPicPr>
+          <p:cNvPr id="4" name="Imagen 3">
+            <a:extLst>
+              <a:ext uri="{FF2B5EF4-FFF2-40B4-BE49-F238E27FC236}">
+                <a16:creationId xmlns:a16="http://schemas.microsoft.com/office/drawing/2014/main" id="{0D5F207C-CF33-4D14-B53B-ADC27BA173CA}"/>
+              </a:ext>
+            </a:extLst>
+          </p:cNvPr>
+          <p:cNvPicPr>
+            <a:picLocks noChangeAspect="1"/>
+          </p:cNvPicPr>
+          <p:nvPr/>
+        </p:nvPicPr>
+        <p:blipFill>
+          <a:blip r:embed="rId2"/>
+          <a:stretch>
+            <a:fillRect/>
+          </a:stretch>
+        </p:blipFill>
+        <p:spPr>
+          <a:xfrm>
+            <a:off x="2603010" y="1762540"/>
+            <a:ext cx="6982799" cy="4753638"/>
+          </a:xfrm>
+          <a:prstGeom prst="rect">
+            <a:avLst/>
+          </a:prstGeom>
+        </p:spPr>
+      </p:pic>
+    </p:spTree>
+    <p:extLst>
+      <p:ext uri="{BB962C8B-B14F-4D97-AF65-F5344CB8AC3E}">
+        <p14:creationId xmlns:p14="http://schemas.microsoft.com/office/powerpoint/2010/main" val="3375550923"/>
+      </p:ext>
+    </p:extLst>
+  </p:cSld>
+  <p:clrMapOvr>
+    <a:masterClrMapping/>
+  </p:clrMapOvr>
+</p:sld>
+</file>
+
+<file path=ppt/slides/slide6.xml><?xml version="1.0" encoding="utf-8"?>
+<p:sld xmlns:a="http://schemas.openxmlformats.org/drawingml/2006/main" xmlns:r="http://schemas.openxmlformats.org/officeDocument/2006/relationships" xmlns:p="http://schemas.openxmlformats.org/presentationml/2006/main">
+  <p:cSld>
+    <p:spTree>
+      <p:nvGrpSpPr>
+        <p:cNvPr id="1" name=""/>
+        <p:cNvGrpSpPr/>
+        <p:nvPr/>
+      </p:nvGrpSpPr>
+      <p:grpSpPr>
+        <a:xfrm>
+          <a:off x="0" y="0"/>
+          <a:ext cx="0" cy="0"/>
+          <a:chOff x="0" y="0"/>
+          <a:chExt cx="0" cy="0"/>
+        </a:xfrm>
+      </p:grpSpPr>
+      <p:sp>
+        <p:nvSpPr>
+          <p:cNvPr id="2" name="Título 1">
+            <a:extLst>
+              <a:ext uri="{FF2B5EF4-FFF2-40B4-BE49-F238E27FC236}">
+                <a16:creationId xmlns:a16="http://schemas.microsoft.com/office/drawing/2014/main" id="{586D7065-3D59-4157-B528-28390EAD2B4E}"/>
+              </a:ext>
+            </a:extLst>
+          </p:cNvPr>
+          <p:cNvSpPr>
+            <a:spLocks noGrp="1"/>
+          </p:cNvSpPr>
+          <p:nvPr>
+            <p:ph type="title"/>
+          </p:nvPr>
+        </p:nvSpPr>
+        <p:spPr>
+          <a:xfrm>
+            <a:off x="1795250" y="631771"/>
+            <a:ext cx="8601499" cy="1130769"/>
+          </a:xfrm>
+        </p:spPr>
+        <p:txBody>
+          <a:bodyPr/>
+          <a:lstStyle/>
+          <a:p>
+            <a:r>
+              <a:rPr lang="es-ES" dirty="0"/>
+              <a:t>F. </a:t>
+            </a:r>
+            <a:r>
+              <a:rPr lang="es-ES" cap="none" dirty="0"/>
+              <a:t>El número de teléfono debe ser numérico</a:t>
+            </a:r>
+            <a:endParaRPr lang="es-CO" dirty="0"/>
+          </a:p>
+        </p:txBody>
+      </p:sp>
+      <p:pic>
+        <p:nvPicPr>
+          <p:cNvPr id="3" name="Imagen 2">
+            <a:extLst>
+              <a:ext uri="{FF2B5EF4-FFF2-40B4-BE49-F238E27FC236}">
+                <a16:creationId xmlns:a16="http://schemas.microsoft.com/office/drawing/2014/main" id="{6EFB9430-9AAF-4493-98BF-7415878F0EF5}"/>
+              </a:ext>
+            </a:extLst>
+          </p:cNvPr>
+          <p:cNvPicPr>
+            <a:picLocks noChangeAspect="1"/>
+          </p:cNvPicPr>
+          <p:nvPr/>
+        </p:nvPicPr>
+        <p:blipFill>
+          <a:blip r:embed="rId2"/>
+          <a:stretch>
+            <a:fillRect/>
+          </a:stretch>
+        </p:blipFill>
+        <p:spPr>
+          <a:xfrm>
+            <a:off x="2761783" y="1762540"/>
+            <a:ext cx="6668431" cy="4801270"/>
+          </a:xfrm>
+          <a:prstGeom prst="rect">
+            <a:avLst/>
+          </a:prstGeom>
+        </p:spPr>
+      </p:pic>
+    </p:spTree>
+    <p:extLst>
+      <p:ext uri="{BB962C8B-B14F-4D97-AF65-F5344CB8AC3E}">
+        <p14:creationId xmlns:p14="http://schemas.microsoft.com/office/powerpoint/2010/main" val="3581783397"/>
+      </p:ext>
+    </p:extLst>
+  </p:cSld>
+  <p:clrMapOvr>
+    <a:masterClrMapping/>
+  </p:clrMapOvr>
+</p:sld>
+</file>
+
+<file path=ppt/slides/slide7.xml><?xml version="1.0" encoding="utf-8"?>
+<p:sld xmlns:a="http://schemas.openxmlformats.org/drawingml/2006/main" xmlns:r="http://schemas.openxmlformats.org/officeDocument/2006/relationships" xmlns:p="http://schemas.openxmlformats.org/presentationml/2006/main">
+  <p:cSld>
+    <p:spTree>
+      <p:nvGrpSpPr>
+        <p:cNvPr id="1" name=""/>
+        <p:cNvGrpSpPr/>
+        <p:nvPr/>
+      </p:nvGrpSpPr>
+      <p:grpSpPr>
+        <a:xfrm>
+          <a:off x="0" y="0"/>
+          <a:ext cx="0" cy="0"/>
+          <a:chOff x="0" y="0"/>
+          <a:chExt cx="0" cy="0"/>
+        </a:xfrm>
+      </p:grpSpPr>
+      <p:sp>
+        <p:nvSpPr>
+          <p:cNvPr id="2" name="Título 1">
+            <a:extLst>
+              <a:ext uri="{FF2B5EF4-FFF2-40B4-BE49-F238E27FC236}">
+                <a16:creationId xmlns:a16="http://schemas.microsoft.com/office/drawing/2014/main" id="{586D7065-3D59-4157-B528-28390EAD2B4E}"/>
+              </a:ext>
+            </a:extLst>
+          </p:cNvPr>
+          <p:cNvSpPr>
+            <a:spLocks noGrp="1"/>
+          </p:cNvSpPr>
+          <p:nvPr>
+            <p:ph type="title"/>
+          </p:nvPr>
+        </p:nvSpPr>
+        <p:spPr>
+          <a:xfrm>
+            <a:off x="3104111" y="631771"/>
+            <a:ext cx="5983776" cy="1130769"/>
+          </a:xfrm>
+        </p:spPr>
+        <p:txBody>
+          <a:bodyPr/>
+          <a:lstStyle/>
+          <a:p>
+            <a:r>
+              <a:rPr lang="es-ES" dirty="0"/>
+              <a:t>H. </a:t>
+            </a:r>
+            <a:r>
+              <a:rPr lang="es-ES" cap="none" dirty="0"/>
+              <a:t>Las contraseñas no coinciden</a:t>
+            </a:r>
+            <a:endParaRPr lang="es-CO" dirty="0"/>
+          </a:p>
+        </p:txBody>
+      </p:sp>
+      <p:pic>
+        <p:nvPicPr>
+          <p:cNvPr id="4" name="Imagen 3">
+            <a:extLst>
+              <a:ext uri="{FF2B5EF4-FFF2-40B4-BE49-F238E27FC236}">
+                <a16:creationId xmlns:a16="http://schemas.microsoft.com/office/drawing/2014/main" id="{FDBF78F9-2A33-4005-8563-3D1A3284F90F}"/>
+              </a:ext>
+            </a:extLst>
+          </p:cNvPr>
+          <p:cNvPicPr>
+            <a:picLocks noChangeAspect="1"/>
+          </p:cNvPicPr>
+          <p:nvPr/>
+        </p:nvPicPr>
+        <p:blipFill>
+          <a:blip r:embed="rId2"/>
+          <a:stretch>
+            <a:fillRect/>
+          </a:stretch>
+        </p:blipFill>
+        <p:spPr>
+          <a:xfrm>
+            <a:off x="2742731" y="1762540"/>
+            <a:ext cx="6706536" cy="4725059"/>
+          </a:xfrm>
+          <a:prstGeom prst="rect">
+            <a:avLst/>
+          </a:prstGeom>
+        </p:spPr>
+      </p:pic>
+    </p:spTree>
+    <p:extLst>
+      <p:ext uri="{BB962C8B-B14F-4D97-AF65-F5344CB8AC3E}">
+        <p14:creationId xmlns:p14="http://schemas.microsoft.com/office/powerpoint/2010/main" val="648586683"/>
+      </p:ext>
+    </p:extLst>
+  </p:cSld>
+  <p:clrMapOvr>
+    <a:masterClrMapping/>
+  </p:clrMapOvr>
+</p:sld>
+</file>
+
+<file path=ppt/slides/slide8.xml><?xml version="1.0" encoding="utf-8"?>
+<p:sld xmlns:a="http://schemas.openxmlformats.org/drawingml/2006/main" xmlns:r="http://schemas.openxmlformats.org/officeDocument/2006/relationships" xmlns:p="http://schemas.openxmlformats.org/presentationml/2006/main">
+  <p:cSld>
+    <p:spTree>
+      <p:nvGrpSpPr>
+        <p:cNvPr id="1" name=""/>
+        <p:cNvGrpSpPr/>
+        <p:nvPr/>
+      </p:nvGrpSpPr>
+      <p:grpSpPr>
+        <a:xfrm>
+          <a:off x="0" y="0"/>
+          <a:ext cx="0" cy="0"/>
+          <a:chOff x="0" y="0"/>
+          <a:chExt cx="0" cy="0"/>
+        </a:xfrm>
+      </p:grpSpPr>
+      <p:sp>
+        <p:nvSpPr>
+          <p:cNvPr id="2" name="Título 1">
+            <a:extLst>
+              <a:ext uri="{FF2B5EF4-FFF2-40B4-BE49-F238E27FC236}">
+                <a16:creationId xmlns:a16="http://schemas.microsoft.com/office/drawing/2014/main" id="{586D7065-3D59-4157-B528-28390EAD2B4E}"/>
+              </a:ext>
+            </a:extLst>
+          </p:cNvPr>
+          <p:cNvSpPr>
+            <a:spLocks noGrp="1"/>
+          </p:cNvSpPr>
+          <p:nvPr>
+            <p:ph type="title"/>
+          </p:nvPr>
+        </p:nvSpPr>
+        <p:spPr>
+          <a:xfrm>
+            <a:off x="2992452" y="631771"/>
+            <a:ext cx="6207093" cy="1130769"/>
+          </a:xfrm>
+        </p:spPr>
+        <p:txBody>
+          <a:bodyPr/>
+          <a:lstStyle/>
+          <a:p>
+            <a:r>
+              <a:rPr lang="es-ES" dirty="0"/>
+              <a:t>J. </a:t>
+            </a:r>
+            <a:r>
+              <a:rPr lang="es-ES" cap="none" dirty="0"/>
+              <a:t>Usuario creado correctamente</a:t>
+            </a:r>
+            <a:endParaRPr lang="es-CO" dirty="0"/>
+          </a:p>
+        </p:txBody>
+      </p:sp>
+      <p:pic>
+        <p:nvPicPr>
+          <p:cNvPr id="3" name="Imagen 2">
+            <a:extLst>
+              <a:ext uri="{FF2B5EF4-FFF2-40B4-BE49-F238E27FC236}">
+                <a16:creationId xmlns:a16="http://schemas.microsoft.com/office/drawing/2014/main" id="{74CC178B-0313-4198-98A4-EB17D8DD7146}"/>
+              </a:ext>
+            </a:extLst>
+          </p:cNvPr>
+          <p:cNvPicPr>
+            <a:picLocks noChangeAspect="1"/>
+          </p:cNvPicPr>
+          <p:nvPr/>
+        </p:nvPicPr>
+        <p:blipFill>
+          <a:blip r:embed="rId2"/>
+          <a:stretch>
+            <a:fillRect/>
+          </a:stretch>
+        </p:blipFill>
+        <p:spPr>
+          <a:xfrm>
+            <a:off x="2847519" y="1762540"/>
+            <a:ext cx="6496957" cy="4439270"/>
+          </a:xfrm>
+          <a:prstGeom prst="rect">
+            <a:avLst/>
+          </a:prstGeom>
+        </p:spPr>
+      </p:pic>
+    </p:spTree>
+    <p:extLst>
+      <p:ext uri="{BB962C8B-B14F-4D97-AF65-F5344CB8AC3E}">
+        <p14:creationId xmlns:p14="http://schemas.microsoft.com/office/powerpoint/2010/main" val="1014559418"/>
+      </p:ext>
+    </p:extLst>
+  </p:cSld>
+  <p:clrMapOvr>
+    <a:masterClrMapping/>
+  </p:clrMapOvr>
+</p:sld>
+</file>
+
+<file path=ppt/slides/slide9.xml><?xml version="1.0" encoding="utf-8"?>
+<p:sld xmlns:a="http://schemas.openxmlformats.org/drawingml/2006/main" xmlns:r="http://schemas.openxmlformats.org/officeDocument/2006/relationships" xmlns:p="http://schemas.openxmlformats.org/presentationml/2006/main">
+  <p:cSld>
+    <p:spTree>
+      <p:nvGrpSpPr>
+        <p:cNvPr id="1" name=""/>
+        <p:cNvGrpSpPr/>
+        <p:nvPr/>
+      </p:nvGrpSpPr>
+      <p:grpSpPr>
+        <a:xfrm>
+          <a:off x="0" y="0"/>
+          <a:ext cx="0" cy="0"/>
+          <a:chOff x="0" y="0"/>
+          <a:chExt cx="0" cy="0"/>
+        </a:xfrm>
+      </p:grpSpPr>
+      <p:sp>
+        <p:nvSpPr>
+          <p:cNvPr id="2" name="Título 1">
+            <a:extLst>
+              <a:ext uri="{FF2B5EF4-FFF2-40B4-BE49-F238E27FC236}">
+                <a16:creationId xmlns:a16="http://schemas.microsoft.com/office/drawing/2014/main" id="{586D7065-3D59-4157-B528-28390EAD2B4E}"/>
+              </a:ext>
+            </a:extLst>
+          </p:cNvPr>
+          <p:cNvSpPr>
+            <a:spLocks noGrp="1"/>
+          </p:cNvSpPr>
+          <p:nvPr>
+            <p:ph type="title"/>
+          </p:nvPr>
+        </p:nvSpPr>
+        <p:spPr>
+          <a:xfrm>
+            <a:off x="3762345" y="631771"/>
+            <a:ext cx="4667305" cy="1130769"/>
+          </a:xfrm>
+        </p:spPr>
+        <p:txBody>
+          <a:bodyPr/>
+          <a:lstStyle/>
+          <a:p>
+            <a:r>
+              <a:rPr lang="es-ES" dirty="0"/>
+              <a:t>k. </a:t>
+            </a:r>
+            <a:r>
+              <a:rPr lang="es-ES" cap="none" dirty="0"/>
+              <a:t>Error al crear usuario</a:t>
+            </a:r>
+            <a:endParaRPr lang="es-CO" dirty="0"/>
+          </a:p>
+        </p:txBody>
+      </p:sp>
+      <p:pic>
+        <p:nvPicPr>
+          <p:cNvPr id="5" name="Imagen 4">
+            <a:extLst>
+              <a:ext uri="{FF2B5EF4-FFF2-40B4-BE49-F238E27FC236}">
+                <a16:creationId xmlns:a16="http://schemas.microsoft.com/office/drawing/2014/main" id="{2B22E2C7-9E8E-4471-8A43-76EC0DC8DD94}"/>
+              </a:ext>
+            </a:extLst>
+          </p:cNvPr>
+          <p:cNvPicPr>
+            <a:picLocks noChangeAspect="1"/>
+          </p:cNvPicPr>
+          <p:nvPr/>
+        </p:nvPicPr>
+        <p:blipFill>
+          <a:blip r:embed="rId2"/>
+          <a:stretch>
+            <a:fillRect/>
+          </a:stretch>
+        </p:blipFill>
+        <p:spPr>
+          <a:xfrm>
+            <a:off x="2366440" y="1762540"/>
+            <a:ext cx="7459116" cy="4477375"/>
+          </a:xfrm>
+          <a:prstGeom prst="rect">
+            <a:avLst/>
+          </a:prstGeom>
+        </p:spPr>
+      </p:pic>
+    </p:spTree>
+    <p:extLst>
+      <p:ext uri="{BB962C8B-B14F-4D97-AF65-F5344CB8AC3E}">
+        <p14:creationId xmlns:p14="http://schemas.microsoft.com/office/powerpoint/2010/main" val="3267021291"/>
       </p:ext>
     </p:extLst>
   </p:cSld>

</xml_diff>